<commit_message>
finalized venafi lab plus other things
</commit_message>
<xml_diff>
--- a/docs/pptx/BlueprintDiag.pptx
+++ b/docs/pptx/BlueprintDiag.pptx
@@ -198,7 +198,7 @@
           <a:p>
             <a:fld id="{5E8AE13A-5A80-4F17-971D-03F4C3B28A8B}" type="datetimeFigureOut">
               <a:rPr lang="en-US" smtClean="0"/>
-              <a:t>7/27/20</a:t>
+              <a:t>7/30/20</a:t>
             </a:fld>
             <a:endParaRPr lang="en-US"/>
           </a:p>
@@ -1922,7 +1922,7 @@
           <a:p>
             <a:fld id="{24AFE612-74AD-4B6F-8D78-7C42EB8A6CD6}" type="datetimeFigureOut">
               <a:rPr lang="en-US" smtClean="0"/>
-              <a:t>7/27/20</a:t>
+              <a:t>7/30/20</a:t>
             </a:fld>
             <a:endParaRPr lang="en-US"/>
           </a:p>
@@ -2092,7 +2092,7 @@
           <a:p>
             <a:fld id="{24AFE612-74AD-4B6F-8D78-7C42EB8A6CD6}" type="datetimeFigureOut">
               <a:rPr lang="en-US" smtClean="0"/>
-              <a:t>7/27/20</a:t>
+              <a:t>7/30/20</a:t>
             </a:fld>
             <a:endParaRPr lang="en-US"/>
           </a:p>
@@ -2634,7 +2634,7 @@
           <a:p>
             <a:fld id="{24AFE612-74AD-4B6F-8D78-7C42EB8A6CD6}" type="datetimeFigureOut">
               <a:rPr lang="en-US" smtClean="0"/>
-              <a:t>7/27/20</a:t>
+              <a:t>7/30/20</a:t>
             </a:fld>
             <a:endParaRPr lang="en-US"/>
           </a:p>
@@ -2866,7 +2866,7 @@
           <a:p>
             <a:fld id="{24AFE612-74AD-4B6F-8D78-7C42EB8A6CD6}" type="datetimeFigureOut">
               <a:rPr lang="en-US" smtClean="0"/>
-              <a:t>7/27/20</a:t>
+              <a:t>7/30/20</a:t>
             </a:fld>
             <a:endParaRPr lang="en-US"/>
           </a:p>
@@ -3233,7 +3233,7 @@
           <a:p>
             <a:fld id="{24AFE612-74AD-4B6F-8D78-7C42EB8A6CD6}" type="datetimeFigureOut">
               <a:rPr lang="en-US" smtClean="0"/>
-              <a:t>7/27/20</a:t>
+              <a:t>7/30/20</a:t>
             </a:fld>
             <a:endParaRPr lang="en-US"/>
           </a:p>
@@ -3351,7 +3351,7 @@
           <a:p>
             <a:fld id="{24AFE612-74AD-4B6F-8D78-7C42EB8A6CD6}" type="datetimeFigureOut">
               <a:rPr lang="en-US" smtClean="0"/>
-              <a:t>7/27/20</a:t>
+              <a:t>7/30/20</a:t>
             </a:fld>
             <a:endParaRPr lang="en-US"/>
           </a:p>
@@ -3446,7 +3446,7 @@
           <a:p>
             <a:fld id="{24AFE612-74AD-4B6F-8D78-7C42EB8A6CD6}" type="datetimeFigureOut">
               <a:rPr lang="en-US" smtClean="0"/>
-              <a:t>7/27/20</a:t>
+              <a:t>7/30/20</a:t>
             </a:fld>
             <a:endParaRPr lang="en-US"/>
           </a:p>
@@ -3723,7 +3723,7 @@
           <a:p>
             <a:fld id="{24AFE612-74AD-4B6F-8D78-7C42EB8A6CD6}" type="datetimeFigureOut">
               <a:rPr lang="en-US" smtClean="0"/>
-              <a:t>7/27/20</a:t>
+              <a:t>7/30/20</a:t>
             </a:fld>
             <a:endParaRPr lang="en-US"/>
           </a:p>
@@ -3980,7 +3980,7 @@
           <a:p>
             <a:fld id="{24AFE612-74AD-4B6F-8D78-7C42EB8A6CD6}" type="datetimeFigureOut">
               <a:rPr lang="en-US" smtClean="0"/>
-              <a:t>7/27/20</a:t>
+              <a:t>7/30/20</a:t>
             </a:fld>
             <a:endParaRPr lang="en-US"/>
           </a:p>
@@ -4150,7 +4150,7 @@
           <a:p>
             <a:fld id="{24AFE612-74AD-4B6F-8D78-7C42EB8A6CD6}" type="datetimeFigureOut">
               <a:rPr lang="en-US" smtClean="0"/>
-              <a:t>7/27/20</a:t>
+              <a:t>7/30/20</a:t>
             </a:fld>
             <a:endParaRPr lang="en-US"/>
           </a:p>
@@ -4330,7 +4330,7 @@
           <a:p>
             <a:fld id="{24AFE612-74AD-4B6F-8D78-7C42EB8A6CD6}" type="datetimeFigureOut">
               <a:rPr lang="en-US" smtClean="0"/>
-              <a:t>7/27/20</a:t>
+              <a:t>7/30/20</a:t>
             </a:fld>
             <a:endParaRPr lang="en-US"/>
           </a:p>
@@ -7589,7 +7589,7 @@
           <a:p>
             <a:fld id="{24AFE612-74AD-4B6F-8D78-7C42EB8A6CD6}" type="datetimeFigureOut">
               <a:rPr lang="en-US" smtClean="0"/>
-              <a:t>7/27/20</a:t>
+              <a:t>7/30/20</a:t>
             </a:fld>
             <a:endParaRPr lang="en-US"/>
           </a:p>
@@ -9938,7 +9938,7 @@
                 </a:ln>
                 <a:extLst>
                   <a:ext uri="{91240B29-F687-4f45-9708-019B960494DF}">
-                    <a14:hiddenLine xmlns="" xmlns:a14="http://schemas.microsoft.com/office/drawing/2010/main" w="9525">
+                    <a14:hiddenLine xmlns:a14="http://schemas.microsoft.com/office/drawing/2010/main" xmlns="" w="9525">
                       <a:solidFill>
                         <a:srgbClr val="000000"/>
                       </a:solidFill>
@@ -10091,7 +10091,7 @@
                 </a:ln>
                 <a:extLst>
                   <a:ext uri="{91240B29-F687-4f45-9708-019B960494DF}">
-                    <a14:hiddenLine xmlns="" xmlns:a14="http://schemas.microsoft.com/office/drawing/2010/main" w="9525">
+                    <a14:hiddenLine xmlns:a14="http://schemas.microsoft.com/office/drawing/2010/main" xmlns="" w="9525">
                       <a:solidFill>
                         <a:srgbClr val="000000"/>
                       </a:solidFill>
@@ -10244,7 +10244,7 @@
                 </a:ln>
                 <a:extLst>
                   <a:ext uri="{91240B29-F687-4f45-9708-019B960494DF}">
-                    <a14:hiddenLine xmlns="" xmlns:a14="http://schemas.microsoft.com/office/drawing/2010/main" w="9525">
+                    <a14:hiddenLine xmlns:a14="http://schemas.microsoft.com/office/drawing/2010/main" xmlns="" w="9525">
                       <a:solidFill>
                         <a:srgbClr val="000000"/>
                       </a:solidFill>
@@ -10397,7 +10397,7 @@
                 </a:ln>
                 <a:extLst>
                   <a:ext uri="{91240B29-F687-4f45-9708-019B960494DF}">
-                    <a14:hiddenLine xmlns="" xmlns:a14="http://schemas.microsoft.com/office/drawing/2010/main" w="9525">
+                    <a14:hiddenLine xmlns:a14="http://schemas.microsoft.com/office/drawing/2010/main" xmlns="" w="9525">
                       <a:solidFill>
                         <a:srgbClr val="000000"/>
                       </a:solidFill>
@@ -10550,7 +10550,7 @@
                 </a:ln>
                 <a:extLst>
                   <a:ext uri="{91240B29-F687-4f45-9708-019B960494DF}">
-                    <a14:hiddenLine xmlns="" xmlns:a14="http://schemas.microsoft.com/office/drawing/2010/main" w="9525">
+                    <a14:hiddenLine xmlns:a14="http://schemas.microsoft.com/office/drawing/2010/main" xmlns="" w="9525">
                       <a:solidFill>
                         <a:srgbClr val="000000"/>
                       </a:solidFill>
@@ -10703,7 +10703,7 @@
                 </a:ln>
                 <a:extLst>
                   <a:ext uri="{91240B29-F687-4f45-9708-019B960494DF}">
-                    <a14:hiddenLine xmlns="" xmlns:a14="http://schemas.microsoft.com/office/drawing/2010/main" w="9525">
+                    <a14:hiddenLine xmlns:a14="http://schemas.microsoft.com/office/drawing/2010/main" xmlns="" w="9525">
                       <a:solidFill>
                         <a:srgbClr val="000000"/>
                       </a:solidFill>
@@ -10856,7 +10856,7 @@
                 </a:ln>
                 <a:extLst>
                   <a:ext uri="{91240B29-F687-4f45-9708-019B960494DF}">
-                    <a14:hiddenLine xmlns="" xmlns:a14="http://schemas.microsoft.com/office/drawing/2010/main" w="9525">
+                    <a14:hiddenLine xmlns:a14="http://schemas.microsoft.com/office/drawing/2010/main" xmlns="" w="9525">
                       <a:solidFill>
                         <a:srgbClr val="000000"/>
                       </a:solidFill>
@@ -11009,7 +11009,7 @@
                 </a:ln>
                 <a:extLst>
                   <a:ext uri="{91240B29-F687-4f45-9708-019B960494DF}">
-                    <a14:hiddenLine xmlns="" xmlns:a14="http://schemas.microsoft.com/office/drawing/2010/main" w="9525">
+                    <a14:hiddenLine xmlns:a14="http://schemas.microsoft.com/office/drawing/2010/main" xmlns="" w="9525">
                       <a:solidFill>
                         <a:srgbClr val="000000"/>
                       </a:solidFill>
@@ -11162,7 +11162,7 @@
                 </a:ln>
                 <a:extLst>
                   <a:ext uri="{91240B29-F687-4f45-9708-019B960494DF}">
-                    <a14:hiddenLine xmlns="" xmlns:a14="http://schemas.microsoft.com/office/drawing/2010/main" w="9525">
+                    <a14:hiddenLine xmlns:a14="http://schemas.microsoft.com/office/drawing/2010/main" xmlns="" w="9525">
                       <a:solidFill>
                         <a:srgbClr val="000000"/>
                       </a:solidFill>
@@ -11315,7 +11315,7 @@
                 </a:ln>
                 <a:extLst>
                   <a:ext uri="{91240B29-F687-4f45-9708-019B960494DF}">
-                    <a14:hiddenLine xmlns="" xmlns:a14="http://schemas.microsoft.com/office/drawing/2010/main" w="9525">
+                    <a14:hiddenLine xmlns:a14="http://schemas.microsoft.com/office/drawing/2010/main" xmlns="" w="9525">
                       <a:solidFill>
                         <a:srgbClr val="000000"/>
                       </a:solidFill>
@@ -11468,7 +11468,7 @@
                 </a:ln>
                 <a:extLst>
                   <a:ext uri="{91240B29-F687-4f45-9708-019B960494DF}">
-                    <a14:hiddenLine xmlns="" xmlns:a14="http://schemas.microsoft.com/office/drawing/2010/main" w="9525">
+                    <a14:hiddenLine xmlns:a14="http://schemas.microsoft.com/office/drawing/2010/main" xmlns="" w="9525">
                       <a:solidFill>
                         <a:srgbClr val="000000"/>
                       </a:solidFill>
@@ -11621,7 +11621,7 @@
                 </a:ln>
                 <a:extLst>
                   <a:ext uri="{91240B29-F687-4f45-9708-019B960494DF}">
-                    <a14:hiddenLine xmlns="" xmlns:a14="http://schemas.microsoft.com/office/drawing/2010/main" w="9525">
+                    <a14:hiddenLine xmlns:a14="http://schemas.microsoft.com/office/drawing/2010/main" xmlns="" w="9525">
                       <a:solidFill>
                         <a:srgbClr val="000000"/>
                       </a:solidFill>
@@ -11945,7 +11945,7 @@
           </a:ln>
           <a:extLst>
             <a:ext uri="{91240B29-F687-4f45-9708-019B960494DF}">
-              <a14:hiddenLine xmlns:a14="http://schemas.microsoft.com/office/drawing/2010/main" xmlns="" w="9525">
+              <a14:hiddenLine xmlns="" xmlns:a14="http://schemas.microsoft.com/office/drawing/2010/main" w="9525">
                 <a:solidFill>
                   <a:srgbClr val="000000"/>
                 </a:solidFill>
@@ -12113,14 +12113,14 @@
           </a:ln>
           <a:extLst>
             <a:ext uri="{909E8E84-426E-40dd-AFC4-6F175D3DCCD1}">
-              <a14:hiddenFill xmlns:a14="http://schemas.microsoft.com/office/drawing/2010/main" xmlns="">
+              <a14:hiddenFill xmlns="" xmlns:a14="http://schemas.microsoft.com/office/drawing/2010/main">
                 <a:solidFill>
                   <a:srgbClr val="FFFFFF"/>
                 </a:solidFill>
               </a14:hiddenFill>
             </a:ext>
             <a:ext uri="{91240B29-F687-4f45-9708-019B960494DF}">
-              <a14:hiddenLine xmlns:a14="http://schemas.microsoft.com/office/drawing/2010/main" xmlns="" w="9525">
+              <a14:hiddenLine xmlns="" xmlns:a14="http://schemas.microsoft.com/office/drawing/2010/main" w="9525">
                 <a:solidFill>
                   <a:srgbClr val="000000"/>
                 </a:solidFill>
@@ -12681,8 +12681,8 @@
         </p:nvSpPr>
         <p:spPr>
           <a:xfrm>
-            <a:off x="2949055" y="8069496"/>
-            <a:ext cx="1163264" cy="213937"/>
+            <a:off x="2949055" y="8037212"/>
+            <a:ext cx="1599038" cy="246221"/>
           </a:xfrm>
           <a:prstGeom prst="roundRect">
             <a:avLst>
@@ -13337,7 +13337,7 @@
           </a:ln>
           <a:extLst>
             <a:ext uri="{91240B29-F687-4f45-9708-019B960494DF}">
-              <a14:hiddenLine xmlns:a14="http://schemas.microsoft.com/office/drawing/2010/main" xmlns="" w="9525">
+              <a14:hiddenLine xmlns="" xmlns:a14="http://schemas.microsoft.com/office/drawing/2010/main" w="9525">
                 <a:solidFill>
                   <a:srgbClr val="000000"/>
                 </a:solidFill>
@@ -13619,7 +13619,7 @@
           </a:ln>
           <a:extLst>
             <a:ext uri="{91240B29-F687-4f45-9708-019B960494DF}">
-              <a14:hiddenLine xmlns:a14="http://schemas.microsoft.com/office/drawing/2010/main" xmlns="" w="9525">
+              <a14:hiddenLine xmlns="" xmlns:a14="http://schemas.microsoft.com/office/drawing/2010/main" w="9525">
                 <a:solidFill>
                   <a:srgbClr val="000000"/>
                 </a:solidFill>
@@ -13882,8 +13882,8 @@
         </p:nvSpPr>
         <p:spPr>
           <a:xfrm>
-            <a:off x="3008919" y="8050614"/>
-            <a:ext cx="1010864" cy="246221"/>
+            <a:off x="3029437" y="8020274"/>
+            <a:ext cx="1448627" cy="246221"/>
           </a:xfrm>
           <a:prstGeom prst="rect">
             <a:avLst/>
@@ -13905,7 +13905,7 @@
                 <a:latin typeface="Arial" panose="020B0604020202020204" pitchFamily="34" charset="0"/>
                 <a:cs typeface="Arial" panose="020B0604020202020204" pitchFamily="34" charset="0"/>
               </a:rPr>
-              <a:t>UDF Ravello</a:t>
+              <a:t>Lab Environment</a:t>
             </a:r>
           </a:p>
         </p:txBody>
@@ -14022,7 +14022,7 @@
                   <a:latin typeface="Arial" panose="020B0604020202020204" pitchFamily="34" charset="0"/>
                   <a:cs typeface="Arial" panose="020B0604020202020204" pitchFamily="34" charset="0"/>
                 </a:rPr>
-                <a:t>San Jose</a:t>
+                <a:t>San Jose DC</a:t>
               </a:r>
             </a:p>
           </p:txBody>
@@ -14120,7 +14120,7 @@
                 <a:latin typeface="Arial" panose="020B0604020202020204" pitchFamily="34" charset="0"/>
                 <a:cs typeface="Arial" panose="020B0604020202020204" pitchFamily="34" charset="0"/>
               </a:rPr>
-              <a:t> Boston </a:t>
+              <a:t> Boston DC </a:t>
             </a:r>
           </a:p>
         </p:txBody>
@@ -14217,7 +14217,7 @@
                 <a:latin typeface="Arial" panose="020B0604020202020204" pitchFamily="34" charset="0"/>
                 <a:cs typeface="Arial" panose="020B0604020202020204" pitchFamily="34" charset="0"/>
               </a:rPr>
-              <a:t>Seattle </a:t>
+              <a:t>Seattle DC </a:t>
             </a:r>
           </a:p>
         </p:txBody>
@@ -14413,7 +14413,7 @@
             </a:ln>
             <a:extLst>
               <a:ext uri="{91240B29-F687-4f45-9708-019B960494DF}">
-                <a14:hiddenLine xmlns:a14="http://schemas.microsoft.com/office/drawing/2010/main" xmlns="" w="9525">
+                <a14:hiddenLine xmlns="" xmlns:a14="http://schemas.microsoft.com/office/drawing/2010/main" w="9525">
                   <a:solidFill>
                     <a:srgbClr val="000000"/>
                   </a:solidFill>
@@ -14473,14 +14473,14 @@
             </a:ln>
             <a:extLst>
               <a:ext uri="{909E8E84-426E-40dd-AFC4-6F175D3DCCD1}">
-                <a14:hiddenFill xmlns:a14="http://schemas.microsoft.com/office/drawing/2010/main" xmlns="">
+                <a14:hiddenFill xmlns="" xmlns:a14="http://schemas.microsoft.com/office/drawing/2010/main">
                   <a:solidFill>
                     <a:srgbClr val="FFFFFF"/>
                   </a:solidFill>
                 </a14:hiddenFill>
               </a:ext>
               <a:ext uri="{91240B29-F687-4f45-9708-019B960494DF}">
-                <a14:hiddenLine xmlns:a14="http://schemas.microsoft.com/office/drawing/2010/main" xmlns="" w="9525">
+                <a14:hiddenLine xmlns="" xmlns:a14="http://schemas.microsoft.com/office/drawing/2010/main" w="9525">
                   <a:solidFill>
                     <a:srgbClr val="000000"/>
                   </a:solidFill>
@@ -14609,7 +14609,7 @@
             </a:ln>
             <a:extLst>
               <a:ext uri="{91240B29-F687-4f45-9708-019B960494DF}">
-                <a14:hiddenLine xmlns:a14="http://schemas.microsoft.com/office/drawing/2010/main" xmlns="" w="9525">
+                <a14:hiddenLine xmlns="" xmlns:a14="http://schemas.microsoft.com/office/drawing/2010/main" w="9525">
                   <a:solidFill>
                     <a:srgbClr val="000000"/>
                   </a:solidFill>
@@ -14754,7 +14754,7 @@
             </a:ln>
             <a:extLst>
               <a:ext uri="{91240B29-F687-4f45-9708-019B960494DF}">
-                <a14:hiddenLine xmlns:a14="http://schemas.microsoft.com/office/drawing/2010/main" xmlns="" w="9525">
+                <a14:hiddenLine xmlns="" xmlns:a14="http://schemas.microsoft.com/office/drawing/2010/main" w="9525">
                   <a:solidFill>
                     <a:srgbClr val="000000"/>
                   </a:solidFill>
@@ -14963,7 +14963,7 @@
             </a:ln>
             <a:extLst>
               <a:ext uri="{91240B29-F687-4f45-9708-019B960494DF}">
-                <a14:hiddenLine xmlns:a14="http://schemas.microsoft.com/office/drawing/2010/main" xmlns="" w="9525">
+                <a14:hiddenLine xmlns="" xmlns:a14="http://schemas.microsoft.com/office/drawing/2010/main" w="9525">
                   <a:solidFill>
                     <a:srgbClr val="000000"/>
                   </a:solidFill>
@@ -15123,7 +15123,7 @@
           </a:ln>
           <a:extLst>
             <a:ext uri="{91240B29-F687-4f45-9708-019B960494DF}">
-              <a14:hiddenLine xmlns:a14="http://schemas.microsoft.com/office/drawing/2010/main" xmlns="" w="9525">
+              <a14:hiddenLine xmlns="" xmlns:a14="http://schemas.microsoft.com/office/drawing/2010/main" w="9525">
                 <a:solidFill>
                   <a:srgbClr val="000000"/>
                 </a:solidFill>
@@ -15309,7 +15309,7 @@
           </a:ln>
           <a:extLst>
             <a:ext uri="{91240B29-F687-4f45-9708-019B960494DF}">
-              <a14:hiddenLine xmlns:a14="http://schemas.microsoft.com/office/drawing/2010/main" xmlns="" w="9525">
+              <a14:hiddenLine xmlns="" xmlns:a14="http://schemas.microsoft.com/office/drawing/2010/main" w="9525">
                 <a:solidFill>
                   <a:srgbClr val="000000"/>
                 </a:solidFill>
@@ -15528,7 +15528,7 @@
           </a:ln>
           <a:extLst>
             <a:ext uri="{91240B29-F687-4f45-9708-019B960494DF}">
-              <a14:hiddenLine xmlns:a14="http://schemas.microsoft.com/office/drawing/2010/main" xmlns="" w="9525">
+              <a14:hiddenLine xmlns="" xmlns:a14="http://schemas.microsoft.com/office/drawing/2010/main" w="9525">
                 <a:solidFill>
                   <a:srgbClr val="000000"/>
                 </a:solidFill>
@@ -15737,7 +15737,7 @@
           </a:ln>
           <a:extLst>
             <a:ext uri="{91240B29-F687-4f45-9708-019B960494DF}">
-              <a14:hiddenLine xmlns:a14="http://schemas.microsoft.com/office/drawing/2010/main" xmlns="" w="9525">
+              <a14:hiddenLine xmlns="" xmlns:a14="http://schemas.microsoft.com/office/drawing/2010/main" w="9525">
                 <a:solidFill>
                   <a:srgbClr val="000000"/>
                 </a:solidFill>
@@ -16229,7 +16229,7 @@
             </a:ln>
             <a:extLst>
               <a:ext uri="{91240B29-F687-4f45-9708-019B960494DF}">
-                <a14:hiddenLine xmlns:a14="http://schemas.microsoft.com/office/drawing/2010/main" xmlns="" w="9525">
+                <a14:hiddenLine xmlns="" xmlns:a14="http://schemas.microsoft.com/office/drawing/2010/main" w="9525">
                   <a:solidFill>
                     <a:srgbClr val="000000"/>
                   </a:solidFill>
@@ -16289,14 +16289,14 @@
             </a:ln>
             <a:extLst>
               <a:ext uri="{909E8E84-426E-40dd-AFC4-6F175D3DCCD1}">
-                <a14:hiddenFill xmlns:a14="http://schemas.microsoft.com/office/drawing/2010/main" xmlns="">
+                <a14:hiddenFill xmlns="" xmlns:a14="http://schemas.microsoft.com/office/drawing/2010/main">
                   <a:solidFill>
                     <a:srgbClr val="FFFFFF"/>
                   </a:solidFill>
                 </a14:hiddenFill>
               </a:ext>
               <a:ext uri="{91240B29-F687-4f45-9708-019B960494DF}">
-                <a14:hiddenLine xmlns:a14="http://schemas.microsoft.com/office/drawing/2010/main" xmlns="" w="9525">
+                <a14:hiddenLine xmlns="" xmlns:a14="http://schemas.microsoft.com/office/drawing/2010/main" w="9525">
                   <a:solidFill>
                     <a:srgbClr val="000000"/>
                   </a:solidFill>
@@ -16425,7 +16425,7 @@
             </a:ln>
             <a:extLst>
               <a:ext uri="{91240B29-F687-4f45-9708-019B960494DF}">
-                <a14:hiddenLine xmlns:a14="http://schemas.microsoft.com/office/drawing/2010/main" xmlns="" w="9525">
+                <a14:hiddenLine xmlns="" xmlns:a14="http://schemas.microsoft.com/office/drawing/2010/main" w="9525">
                   <a:solidFill>
                     <a:srgbClr val="000000"/>
                   </a:solidFill>
@@ -16570,7 +16570,7 @@
             </a:ln>
             <a:extLst>
               <a:ext uri="{91240B29-F687-4f45-9708-019B960494DF}">
-                <a14:hiddenLine xmlns:a14="http://schemas.microsoft.com/office/drawing/2010/main" xmlns="" w="9525">
+                <a14:hiddenLine xmlns="" xmlns:a14="http://schemas.microsoft.com/office/drawing/2010/main" w="9525">
                   <a:solidFill>
                     <a:srgbClr val="000000"/>
                   </a:solidFill>
@@ -16779,7 +16779,7 @@
             </a:ln>
             <a:extLst>
               <a:ext uri="{91240B29-F687-4f45-9708-019B960494DF}">
-                <a14:hiddenLine xmlns:a14="http://schemas.microsoft.com/office/drawing/2010/main" xmlns="" w="9525">
+                <a14:hiddenLine xmlns="" xmlns:a14="http://schemas.microsoft.com/office/drawing/2010/main" w="9525">
                   <a:solidFill>
                     <a:srgbClr val="000000"/>
                   </a:solidFill>
@@ -16862,14 +16862,14 @@
             </a:ln>
             <a:extLst>
               <a:ext uri="{909E8E84-426E-40dd-AFC4-6F175D3DCCD1}">
-                <a14:hiddenFill xmlns:a14="http://schemas.microsoft.com/office/drawing/2010/main" xmlns="">
+                <a14:hiddenFill xmlns="" xmlns:a14="http://schemas.microsoft.com/office/drawing/2010/main">
                   <a:solidFill>
                     <a:srgbClr val="FFFFFF"/>
                   </a:solidFill>
                 </a14:hiddenFill>
               </a:ext>
               <a:ext uri="{91240B29-F687-4f45-9708-019B960494DF}">
-                <a14:hiddenLine xmlns:a14="http://schemas.microsoft.com/office/drawing/2010/main" xmlns="" w="9525">
+                <a14:hiddenLine xmlns="" xmlns:a14="http://schemas.microsoft.com/office/drawing/2010/main" w="9525">
                   <a:solidFill>
                     <a:srgbClr val="000000"/>
                   </a:solidFill>
@@ -17028,7 +17028,7 @@
             </a:ln>
             <a:extLst>
               <a:ext uri="{91240B29-F687-4f45-9708-019B960494DF}">
-                <a14:hiddenLine xmlns:a14="http://schemas.microsoft.com/office/drawing/2010/main" xmlns="" w="9525">
+                <a14:hiddenLine xmlns="" xmlns:a14="http://schemas.microsoft.com/office/drawing/2010/main" w="9525">
                   <a:solidFill>
                     <a:srgbClr val="000000"/>
                   </a:solidFill>
@@ -17214,7 +17214,7 @@
             </a:ln>
             <a:extLst>
               <a:ext uri="{91240B29-F687-4f45-9708-019B960494DF}">
-                <a14:hiddenLine xmlns:a14="http://schemas.microsoft.com/office/drawing/2010/main" xmlns="" w="9525">
+                <a14:hiddenLine xmlns="" xmlns:a14="http://schemas.microsoft.com/office/drawing/2010/main" w="9525">
                   <a:solidFill>
                     <a:srgbClr val="000000"/>
                   </a:solidFill>
@@ -17420,7 +17420,7 @@
             </a:ln>
             <a:extLst>
               <a:ext uri="{91240B29-F687-4f45-9708-019B960494DF}">
-                <a14:hiddenLine xmlns:a14="http://schemas.microsoft.com/office/drawing/2010/main" xmlns="" w="9525">
+                <a14:hiddenLine xmlns="" xmlns:a14="http://schemas.microsoft.com/office/drawing/2010/main" w="9525">
                   <a:solidFill>
                     <a:srgbClr val="000000"/>
                   </a:solidFill>
@@ -17629,7 +17629,7 @@
             </a:ln>
             <a:extLst>
               <a:ext uri="{91240B29-F687-4f45-9708-019B960494DF}">
-                <a14:hiddenLine xmlns:a14="http://schemas.microsoft.com/office/drawing/2010/main" xmlns="" w="9525">
+                <a14:hiddenLine xmlns="" xmlns:a14="http://schemas.microsoft.com/office/drawing/2010/main" w="9525">
                   <a:solidFill>
                     <a:srgbClr val="000000"/>
                   </a:solidFill>
@@ -17712,14 +17712,14 @@
             </a:ln>
             <a:extLst>
               <a:ext uri="{909E8E84-426E-40dd-AFC4-6F175D3DCCD1}">
-                <a14:hiddenFill xmlns:a14="http://schemas.microsoft.com/office/drawing/2010/main" xmlns="">
+                <a14:hiddenFill xmlns="" xmlns:a14="http://schemas.microsoft.com/office/drawing/2010/main">
                   <a:solidFill>
                     <a:srgbClr val="FFFFFF"/>
                   </a:solidFill>
                 </a14:hiddenFill>
               </a:ext>
               <a:ext uri="{91240B29-F687-4f45-9708-019B960494DF}">
-                <a14:hiddenLine xmlns:a14="http://schemas.microsoft.com/office/drawing/2010/main" xmlns="" w="9525">
+                <a14:hiddenLine xmlns="" xmlns:a14="http://schemas.microsoft.com/office/drawing/2010/main" w="9525">
                   <a:solidFill>
                     <a:srgbClr val="000000"/>
                   </a:solidFill>
@@ -17878,7 +17878,7 @@
             </a:ln>
             <a:extLst>
               <a:ext uri="{91240B29-F687-4f45-9708-019B960494DF}">
-                <a14:hiddenLine xmlns:a14="http://schemas.microsoft.com/office/drawing/2010/main" xmlns="" w="9525">
+                <a14:hiddenLine xmlns="" xmlns:a14="http://schemas.microsoft.com/office/drawing/2010/main" w="9525">
                   <a:solidFill>
                     <a:srgbClr val="000000"/>
                   </a:solidFill>
@@ -18064,7 +18064,7 @@
             </a:ln>
             <a:extLst>
               <a:ext uri="{91240B29-F687-4f45-9708-019B960494DF}">
-                <a14:hiddenLine xmlns:a14="http://schemas.microsoft.com/office/drawing/2010/main" xmlns="" w="9525">
+                <a14:hiddenLine xmlns="" xmlns:a14="http://schemas.microsoft.com/office/drawing/2010/main" w="9525">
                   <a:solidFill>
                     <a:srgbClr val="000000"/>
                   </a:solidFill>
@@ -18283,7 +18283,7 @@
             </a:ln>
             <a:extLst>
               <a:ext uri="{91240B29-F687-4f45-9708-019B960494DF}">
-                <a14:hiddenLine xmlns:a14="http://schemas.microsoft.com/office/drawing/2010/main" xmlns="" w="9525">
+                <a14:hiddenLine xmlns="" xmlns:a14="http://schemas.microsoft.com/office/drawing/2010/main" w="9525">
                   <a:solidFill>
                     <a:srgbClr val="000000"/>
                   </a:solidFill>
@@ -18492,7 +18492,7 @@
             </a:ln>
             <a:extLst>
               <a:ext uri="{91240B29-F687-4f45-9708-019B960494DF}">
-                <a14:hiddenLine xmlns:a14="http://schemas.microsoft.com/office/drawing/2010/main" xmlns="" w="9525">
+                <a14:hiddenLine xmlns="" xmlns:a14="http://schemas.microsoft.com/office/drawing/2010/main" w="9525">
                   <a:solidFill>
                     <a:srgbClr val="000000"/>
                   </a:solidFill>
@@ -18573,14 +18573,14 @@
             </a:ln>
             <a:extLst>
               <a:ext uri="{909E8E84-426E-40dd-AFC4-6F175D3DCCD1}">
-                <a14:hiddenFill xmlns="" xmlns:a14="http://schemas.microsoft.com/office/drawing/2010/main">
+                <a14:hiddenFill xmlns:a14="http://schemas.microsoft.com/office/drawing/2010/main" xmlns="">
                   <a:solidFill>
                     <a:srgbClr val="FFFFFF"/>
                   </a:solidFill>
                 </a14:hiddenFill>
               </a:ext>
               <a:ext uri="{91240B29-F687-4f45-9708-019B960494DF}">
-                <a14:hiddenLine xmlns="" xmlns:a14="http://schemas.microsoft.com/office/drawing/2010/main" w="9525">
+                <a14:hiddenLine xmlns:a14="http://schemas.microsoft.com/office/drawing/2010/main" xmlns="" w="9525">
                   <a:solidFill>
                     <a:srgbClr val="000000"/>
                   </a:solidFill>
@@ -18736,7 +18736,7 @@
             </a:ln>
             <a:extLst>
               <a:ext uri="{91240B29-F687-4f45-9708-019B960494DF}">
-                <a14:hiddenLine xmlns="" xmlns:a14="http://schemas.microsoft.com/office/drawing/2010/main" w="9525">
+                <a14:hiddenLine xmlns:a14="http://schemas.microsoft.com/office/drawing/2010/main" xmlns="" w="9525">
                   <a:solidFill>
                     <a:srgbClr val="000000"/>
                   </a:solidFill>
@@ -18852,14 +18852,14 @@
             </a:ln>
             <a:extLst>
               <a:ext uri="{909E8E84-426E-40dd-AFC4-6F175D3DCCD1}">
-                <a14:hiddenFill xmlns="" xmlns:a14="http://schemas.microsoft.com/office/drawing/2010/main">
+                <a14:hiddenFill xmlns:a14="http://schemas.microsoft.com/office/drawing/2010/main" xmlns="">
                   <a:solidFill>
                     <a:srgbClr val="FFFFFF"/>
                   </a:solidFill>
                 </a14:hiddenFill>
               </a:ext>
               <a:ext uri="{91240B29-F687-4f45-9708-019B960494DF}">
-                <a14:hiddenLine xmlns="" xmlns:a14="http://schemas.microsoft.com/office/drawing/2010/main" w="9525">
+                <a14:hiddenLine xmlns:a14="http://schemas.microsoft.com/office/drawing/2010/main" xmlns="" w="9525">
                   <a:solidFill>
                     <a:srgbClr val="000000"/>
                   </a:solidFill>
@@ -19015,7 +19015,7 @@
             </a:ln>
             <a:extLst>
               <a:ext uri="{91240B29-F687-4f45-9708-019B960494DF}">
-                <a14:hiddenLine xmlns="" xmlns:a14="http://schemas.microsoft.com/office/drawing/2010/main" w="9525">
+                <a14:hiddenLine xmlns:a14="http://schemas.microsoft.com/office/drawing/2010/main" xmlns="" w="9525">
                   <a:solidFill>
                     <a:srgbClr val="000000"/>
                   </a:solidFill>
@@ -19198,7 +19198,7 @@
             </a:ln>
             <a:extLst>
               <a:ext uri="{91240B29-F687-4f45-9708-019B960494DF}">
-                <a14:hiddenLine xmlns="" xmlns:a14="http://schemas.microsoft.com/office/drawing/2010/main" w="9525">
+                <a14:hiddenLine xmlns:a14="http://schemas.microsoft.com/office/drawing/2010/main" xmlns="" w="9525">
                   <a:solidFill>
                     <a:srgbClr val="000000"/>
                   </a:solidFill>
@@ -19356,7 +19356,7 @@
             </a:ln>
             <a:extLst>
               <a:ext uri="{91240B29-F687-4f45-9708-019B960494DF}">
-                <a14:hiddenLine xmlns="" xmlns:a14="http://schemas.microsoft.com/office/drawing/2010/main" w="9525">
+                <a14:hiddenLine xmlns:a14="http://schemas.microsoft.com/office/drawing/2010/main" xmlns="" w="9525">
                   <a:solidFill>
                     <a:srgbClr val="000000"/>
                   </a:solidFill>
@@ -19562,7 +19562,7 @@
             </a:ln>
             <a:extLst>
               <a:ext uri="{91240B29-F687-4f45-9708-019B960494DF}">
-                <a14:hiddenLine xmlns="" xmlns:a14="http://schemas.microsoft.com/office/drawing/2010/main" w="9525">
+                <a14:hiddenLine xmlns:a14="http://schemas.microsoft.com/office/drawing/2010/main" xmlns="" w="9525">
                   <a:solidFill>
                     <a:srgbClr val="000000"/>
                   </a:solidFill>
@@ -19911,14 +19911,14 @@
             </a:ln>
             <a:extLst>
               <a:ext uri="{909E8E84-426E-40dd-AFC4-6F175D3DCCD1}">
-                <a14:hiddenFill xmlns="" xmlns:a14="http://schemas.microsoft.com/office/drawing/2010/main">
+                <a14:hiddenFill xmlns:a14="http://schemas.microsoft.com/office/drawing/2010/main" xmlns="">
                   <a:solidFill>
                     <a:srgbClr val="FFFFFF"/>
                   </a:solidFill>
                 </a14:hiddenFill>
               </a:ext>
               <a:ext uri="{91240B29-F687-4f45-9708-019B960494DF}">
-                <a14:hiddenLine xmlns="" xmlns:a14="http://schemas.microsoft.com/office/drawing/2010/main" w="9525">
+                <a14:hiddenLine xmlns:a14="http://schemas.microsoft.com/office/drawing/2010/main" xmlns="" w="9525">
                   <a:solidFill>
                     <a:srgbClr val="000000"/>
                   </a:solidFill>
@@ -20074,7 +20074,7 @@
             </a:ln>
             <a:extLst>
               <a:ext uri="{91240B29-F687-4f45-9708-019B960494DF}">
-                <a14:hiddenLine xmlns="" xmlns:a14="http://schemas.microsoft.com/office/drawing/2010/main" w="9525">
+                <a14:hiddenLine xmlns:a14="http://schemas.microsoft.com/office/drawing/2010/main" xmlns="" w="9525">
                   <a:solidFill>
                     <a:srgbClr val="000000"/>
                   </a:solidFill>
@@ -20154,14 +20154,14 @@
             </a:ln>
             <a:extLst>
               <a:ext uri="{909E8E84-426E-40dd-AFC4-6F175D3DCCD1}">
-                <a14:hiddenFill xmlns:a14="http://schemas.microsoft.com/office/drawing/2010/main" xmlns="">
+                <a14:hiddenFill xmlns="" xmlns:a14="http://schemas.microsoft.com/office/drawing/2010/main">
                   <a:solidFill>
                     <a:srgbClr val="FFFFFF"/>
                   </a:solidFill>
                 </a14:hiddenFill>
               </a:ext>
               <a:ext uri="{91240B29-F687-4f45-9708-019B960494DF}">
-                <a14:hiddenLine xmlns:a14="http://schemas.microsoft.com/office/drawing/2010/main" xmlns="" w="9525">
+                <a14:hiddenLine xmlns="" xmlns:a14="http://schemas.microsoft.com/office/drawing/2010/main" w="9525">
                   <a:solidFill>
                     <a:srgbClr val="000000"/>
                   </a:solidFill>
@@ -20320,7 +20320,7 @@
             </a:ln>
             <a:extLst>
               <a:ext uri="{91240B29-F687-4f45-9708-019B960494DF}">
-                <a14:hiddenLine xmlns:a14="http://schemas.microsoft.com/office/drawing/2010/main" xmlns="" w="9525">
+                <a14:hiddenLine xmlns="" xmlns:a14="http://schemas.microsoft.com/office/drawing/2010/main" w="9525">
                   <a:solidFill>
                     <a:srgbClr val="000000"/>
                   </a:solidFill>
@@ -20506,7 +20506,7 @@
             </a:ln>
             <a:extLst>
               <a:ext uri="{91240B29-F687-4f45-9708-019B960494DF}">
-                <a14:hiddenLine xmlns:a14="http://schemas.microsoft.com/office/drawing/2010/main" xmlns="" w="9525">
+                <a14:hiddenLine xmlns="" xmlns:a14="http://schemas.microsoft.com/office/drawing/2010/main" w="9525">
                   <a:solidFill>
                     <a:srgbClr val="000000"/>
                   </a:solidFill>
@@ -20725,7 +20725,7 @@
             </a:ln>
             <a:extLst>
               <a:ext uri="{91240B29-F687-4f45-9708-019B960494DF}">
-                <a14:hiddenLine xmlns:a14="http://schemas.microsoft.com/office/drawing/2010/main" xmlns="" w="9525">
+                <a14:hiddenLine xmlns="" xmlns:a14="http://schemas.microsoft.com/office/drawing/2010/main" w="9525">
                   <a:solidFill>
                     <a:srgbClr val="000000"/>
                   </a:solidFill>
@@ -20934,7 +20934,7 @@
             </a:ln>
             <a:extLst>
               <a:ext uri="{91240B29-F687-4f45-9708-019B960494DF}">
-                <a14:hiddenLine xmlns:a14="http://schemas.microsoft.com/office/drawing/2010/main" xmlns="" w="9525">
+                <a14:hiddenLine xmlns="" xmlns:a14="http://schemas.microsoft.com/office/drawing/2010/main" w="9525">
                   <a:solidFill>
                     <a:srgbClr val="000000"/>
                   </a:solidFill>
@@ -21015,14 +21015,14 @@
             </a:ln>
             <a:extLst>
               <a:ext uri="{909E8E84-426E-40dd-AFC4-6F175D3DCCD1}">
-                <a14:hiddenFill xmlns="" xmlns:a14="http://schemas.microsoft.com/office/drawing/2010/main">
+                <a14:hiddenFill xmlns:a14="http://schemas.microsoft.com/office/drawing/2010/main" xmlns="">
                   <a:solidFill>
                     <a:srgbClr val="FFFFFF"/>
                   </a:solidFill>
                 </a14:hiddenFill>
               </a:ext>
               <a:ext uri="{91240B29-F687-4f45-9708-019B960494DF}">
-                <a14:hiddenLine xmlns="" xmlns:a14="http://schemas.microsoft.com/office/drawing/2010/main" w="9525">
+                <a14:hiddenLine xmlns:a14="http://schemas.microsoft.com/office/drawing/2010/main" xmlns="" w="9525">
                   <a:solidFill>
                     <a:srgbClr val="000000"/>
                   </a:solidFill>
@@ -21178,7 +21178,7 @@
             </a:ln>
             <a:extLst>
               <a:ext uri="{91240B29-F687-4f45-9708-019B960494DF}">
-                <a14:hiddenLine xmlns="" xmlns:a14="http://schemas.microsoft.com/office/drawing/2010/main" w="9525">
+                <a14:hiddenLine xmlns:a14="http://schemas.microsoft.com/office/drawing/2010/main" xmlns="" w="9525">
                   <a:solidFill>
                     <a:srgbClr val="000000"/>
                   </a:solidFill>
@@ -21333,14 +21333,14 @@
             </a:ln>
             <a:extLst>
               <a:ext uri="{909E8E84-426E-40dd-AFC4-6F175D3DCCD1}">
-                <a14:hiddenFill xmlns:a14="http://schemas.microsoft.com/office/drawing/2010/main" xmlns="">
+                <a14:hiddenFill xmlns="" xmlns:a14="http://schemas.microsoft.com/office/drawing/2010/main">
                   <a:solidFill>
                     <a:srgbClr val="FFFFFF"/>
                   </a:solidFill>
                 </a14:hiddenFill>
               </a:ext>
               <a:ext uri="{91240B29-F687-4f45-9708-019B960494DF}">
-                <a14:hiddenLine xmlns:a14="http://schemas.microsoft.com/office/drawing/2010/main" xmlns="" w="9525">
+                <a14:hiddenLine xmlns="" xmlns:a14="http://schemas.microsoft.com/office/drawing/2010/main" w="9525">
                   <a:solidFill>
                     <a:srgbClr val="000000"/>
                   </a:solidFill>
@@ -21499,7 +21499,7 @@
             </a:ln>
             <a:extLst>
               <a:ext uri="{91240B29-F687-4f45-9708-019B960494DF}">
-                <a14:hiddenLine xmlns:a14="http://schemas.microsoft.com/office/drawing/2010/main" xmlns="" w="9525">
+                <a14:hiddenLine xmlns="" xmlns:a14="http://schemas.microsoft.com/office/drawing/2010/main" w="9525">
                   <a:solidFill>
                     <a:srgbClr val="000000"/>
                   </a:solidFill>
@@ -21685,7 +21685,7 @@
             </a:ln>
             <a:extLst>
               <a:ext uri="{91240B29-F687-4f45-9708-019B960494DF}">
-                <a14:hiddenLine xmlns:a14="http://schemas.microsoft.com/office/drawing/2010/main" xmlns="" w="9525">
+                <a14:hiddenLine xmlns="" xmlns:a14="http://schemas.microsoft.com/office/drawing/2010/main" w="9525">
                   <a:solidFill>
                     <a:srgbClr val="000000"/>
                   </a:solidFill>
@@ -21891,7 +21891,7 @@
             </a:ln>
             <a:extLst>
               <a:ext uri="{91240B29-F687-4f45-9708-019B960494DF}">
-                <a14:hiddenLine xmlns:a14="http://schemas.microsoft.com/office/drawing/2010/main" xmlns="" w="9525">
+                <a14:hiddenLine xmlns="" xmlns:a14="http://schemas.microsoft.com/office/drawing/2010/main" w="9525">
                   <a:solidFill>
                     <a:srgbClr val="000000"/>
                   </a:solidFill>
@@ -22100,7 +22100,7 @@
             </a:ln>
             <a:extLst>
               <a:ext uri="{91240B29-F687-4f45-9708-019B960494DF}">
-                <a14:hiddenLine xmlns:a14="http://schemas.microsoft.com/office/drawing/2010/main" xmlns="" w="9525">
+                <a14:hiddenLine xmlns="" xmlns:a14="http://schemas.microsoft.com/office/drawing/2010/main" w="9525">
                   <a:solidFill>
                     <a:srgbClr val="000000"/>
                   </a:solidFill>
@@ -22280,7 +22280,7 @@
             </a:ln>
             <a:extLst>
               <a:ext uri="{91240B29-F687-4f45-9708-019B960494DF}">
-                <a14:hiddenLine xmlns:a14="http://schemas.microsoft.com/office/drawing/2010/main" xmlns="" w="9525">
+                <a14:hiddenLine xmlns="" xmlns:a14="http://schemas.microsoft.com/office/drawing/2010/main" w="9525">
                   <a:solidFill>
                     <a:srgbClr val="000000"/>
                   </a:solidFill>
@@ -22340,14 +22340,14 @@
             </a:ln>
             <a:extLst>
               <a:ext uri="{909E8E84-426E-40dd-AFC4-6F175D3DCCD1}">
-                <a14:hiddenFill xmlns:a14="http://schemas.microsoft.com/office/drawing/2010/main" xmlns="">
+                <a14:hiddenFill xmlns="" xmlns:a14="http://schemas.microsoft.com/office/drawing/2010/main">
                   <a:solidFill>
                     <a:srgbClr val="FFFFFF"/>
                   </a:solidFill>
                 </a14:hiddenFill>
               </a:ext>
               <a:ext uri="{91240B29-F687-4f45-9708-019B960494DF}">
-                <a14:hiddenLine xmlns:a14="http://schemas.microsoft.com/office/drawing/2010/main" xmlns="" w="9525">
+                <a14:hiddenLine xmlns="" xmlns:a14="http://schemas.microsoft.com/office/drawing/2010/main" w="9525">
                   <a:solidFill>
                     <a:srgbClr val="000000"/>
                   </a:solidFill>
@@ -22476,7 +22476,7 @@
             </a:ln>
             <a:extLst>
               <a:ext uri="{91240B29-F687-4f45-9708-019B960494DF}">
-                <a14:hiddenLine xmlns:a14="http://schemas.microsoft.com/office/drawing/2010/main" xmlns="" w="9525">
+                <a14:hiddenLine xmlns="" xmlns:a14="http://schemas.microsoft.com/office/drawing/2010/main" w="9525">
                   <a:solidFill>
                     <a:srgbClr val="000000"/>
                   </a:solidFill>
@@ -22621,7 +22621,7 @@
             </a:ln>
             <a:extLst>
               <a:ext uri="{91240B29-F687-4f45-9708-019B960494DF}">
-                <a14:hiddenLine xmlns:a14="http://schemas.microsoft.com/office/drawing/2010/main" xmlns="" w="9525">
+                <a14:hiddenLine xmlns="" xmlns:a14="http://schemas.microsoft.com/office/drawing/2010/main" w="9525">
                   <a:solidFill>
                     <a:srgbClr val="000000"/>
                   </a:solidFill>
@@ -22830,7 +22830,7 @@
             </a:ln>
             <a:extLst>
               <a:ext uri="{91240B29-F687-4f45-9708-019B960494DF}">
-                <a14:hiddenLine xmlns:a14="http://schemas.microsoft.com/office/drawing/2010/main" xmlns="" w="9525">
+                <a14:hiddenLine xmlns="" xmlns:a14="http://schemas.microsoft.com/office/drawing/2010/main" w="9525">
                   <a:solidFill>
                     <a:srgbClr val="000000"/>
                   </a:solidFill>
@@ -27568,7 +27568,7 @@
             </a:ln>
             <a:extLst>
               <a:ext uri="{91240B29-F687-4f45-9708-019B960494DF}">
-                <a14:hiddenLine xmlns:a14="http://schemas.microsoft.com/office/drawing/2010/main" xmlns="" w="9525">
+                <a14:hiddenLine xmlns="" xmlns:a14="http://schemas.microsoft.com/office/drawing/2010/main" w="9525">
                   <a:solidFill>
                     <a:srgbClr val="000000"/>
                   </a:solidFill>
@@ -29493,14 +29493,14 @@
             </a:ln>
             <a:extLst>
               <a:ext uri="{909E8E84-426E-40dd-AFC4-6F175D3DCCD1}">
-                <a14:hiddenFill xmlns:a14="http://schemas.microsoft.com/office/drawing/2010/main" xmlns="">
+                <a14:hiddenFill xmlns="" xmlns:a14="http://schemas.microsoft.com/office/drawing/2010/main">
                   <a:solidFill>
                     <a:srgbClr val="FFFFFF"/>
                   </a:solidFill>
                 </a14:hiddenFill>
               </a:ext>
               <a:ext uri="{91240B29-F687-4f45-9708-019B960494DF}">
-                <a14:hiddenLine xmlns:a14="http://schemas.microsoft.com/office/drawing/2010/main" xmlns="" w="9525">
+                <a14:hiddenLine xmlns="" xmlns:a14="http://schemas.microsoft.com/office/drawing/2010/main" w="9525">
                   <a:solidFill>
                     <a:srgbClr val="000000"/>
                   </a:solidFill>
@@ -29659,7 +29659,7 @@
             </a:ln>
             <a:extLst>
               <a:ext uri="{91240B29-F687-4f45-9708-019B960494DF}">
-                <a14:hiddenLine xmlns:a14="http://schemas.microsoft.com/office/drawing/2010/main" xmlns="" w="9525">
+                <a14:hiddenLine xmlns="" xmlns:a14="http://schemas.microsoft.com/office/drawing/2010/main" w="9525">
                   <a:solidFill>
                     <a:srgbClr val="000000"/>
                   </a:solidFill>
@@ -29817,14 +29817,14 @@
           </a:ln>
           <a:extLst>
             <a:ext uri="{909E8E84-426E-40dd-AFC4-6F175D3DCCD1}">
-              <a14:hiddenFill xmlns:a14="http://schemas.microsoft.com/office/drawing/2010/main" xmlns="">
+              <a14:hiddenFill xmlns="" xmlns:a14="http://schemas.microsoft.com/office/drawing/2010/main">
                 <a:solidFill>
                   <a:srgbClr val="FFFFFF"/>
                 </a:solidFill>
               </a14:hiddenFill>
             </a:ext>
             <a:ext uri="{91240B29-F687-4f45-9708-019B960494DF}">
-              <a14:hiddenLine xmlns:a14="http://schemas.microsoft.com/office/drawing/2010/main" xmlns="" w="9525">
+              <a14:hiddenLine xmlns="" xmlns:a14="http://schemas.microsoft.com/office/drawing/2010/main" w="9525">
                 <a:solidFill>
                   <a:srgbClr val="000000"/>
                 </a:solidFill>
@@ -29968,7 +29968,7 @@
                   <a:latin typeface="Arial" panose="020B0604020202020204" pitchFamily="34" charset="0"/>
                   <a:cs typeface="Arial" panose="020B0604020202020204" pitchFamily="34" charset="0"/>
                 </a:rPr>
-                <a:t>Paris</a:t>
+                <a:t>Paris DC</a:t>
               </a:r>
             </a:p>
           </p:txBody>
@@ -30165,7 +30165,7 @@
             </a:ln>
             <a:extLst>
               <a:ext uri="{91240B29-F687-4f45-9708-019B960494DF}">
-                <a14:hiddenLine xmlns:a14="http://schemas.microsoft.com/office/drawing/2010/main" xmlns="" w="9525">
+                <a14:hiddenLine xmlns="" xmlns:a14="http://schemas.microsoft.com/office/drawing/2010/main" w="9525">
                   <a:solidFill>
                     <a:srgbClr val="000000"/>
                   </a:solidFill>
@@ -30225,14 +30225,14 @@
             </a:ln>
             <a:extLst>
               <a:ext uri="{909E8E84-426E-40dd-AFC4-6F175D3DCCD1}">
-                <a14:hiddenFill xmlns:a14="http://schemas.microsoft.com/office/drawing/2010/main" xmlns="">
+                <a14:hiddenFill xmlns="" xmlns:a14="http://schemas.microsoft.com/office/drawing/2010/main">
                   <a:solidFill>
                     <a:srgbClr val="FFFFFF"/>
                   </a:solidFill>
                 </a14:hiddenFill>
               </a:ext>
               <a:ext uri="{91240B29-F687-4f45-9708-019B960494DF}">
-                <a14:hiddenLine xmlns:a14="http://schemas.microsoft.com/office/drawing/2010/main" xmlns="" w="9525">
+                <a14:hiddenLine xmlns="" xmlns:a14="http://schemas.microsoft.com/office/drawing/2010/main" w="9525">
                   <a:solidFill>
                     <a:srgbClr val="000000"/>
                   </a:solidFill>
@@ -30361,7 +30361,7 @@
             </a:ln>
             <a:extLst>
               <a:ext uri="{91240B29-F687-4f45-9708-019B960494DF}">
-                <a14:hiddenLine xmlns:a14="http://schemas.microsoft.com/office/drawing/2010/main" xmlns="" w="9525">
+                <a14:hiddenLine xmlns="" xmlns:a14="http://schemas.microsoft.com/office/drawing/2010/main" w="9525">
                   <a:solidFill>
                     <a:srgbClr val="000000"/>
                   </a:solidFill>
@@ -30506,7 +30506,7 @@
             </a:ln>
             <a:extLst>
               <a:ext uri="{91240B29-F687-4f45-9708-019B960494DF}">
-                <a14:hiddenLine xmlns:a14="http://schemas.microsoft.com/office/drawing/2010/main" xmlns="" w="9525">
+                <a14:hiddenLine xmlns="" xmlns:a14="http://schemas.microsoft.com/office/drawing/2010/main" w="9525">
                   <a:solidFill>
                     <a:srgbClr val="000000"/>
                   </a:solidFill>
@@ -30715,7 +30715,7 @@
             </a:ln>
             <a:extLst>
               <a:ext uri="{91240B29-F687-4f45-9708-019B960494DF}">
-                <a14:hiddenLine xmlns:a14="http://schemas.microsoft.com/office/drawing/2010/main" xmlns="" w="9525">
+                <a14:hiddenLine xmlns="" xmlns:a14="http://schemas.microsoft.com/office/drawing/2010/main" w="9525">
                   <a:solidFill>
                     <a:srgbClr val="000000"/>
                   </a:solidFill>
@@ -30902,7 +30902,7 @@
           </a:ln>
           <a:extLst>
             <a:ext uri="{91240B29-F687-4f45-9708-019B960494DF}">
-              <a14:hiddenLine xmlns:a14="http://schemas.microsoft.com/office/drawing/2010/main" xmlns="" w="9525">
+              <a14:hiddenLine xmlns="" xmlns:a14="http://schemas.microsoft.com/office/drawing/2010/main" w="9525">
                 <a:solidFill>
                   <a:srgbClr val="000000"/>
                 </a:solidFill>
@@ -31121,7 +31121,7 @@
           </a:ln>
           <a:extLst>
             <a:ext uri="{91240B29-F687-4f45-9708-019B960494DF}">
-              <a14:hiddenLine xmlns:a14="http://schemas.microsoft.com/office/drawing/2010/main" xmlns="" w="9525">
+              <a14:hiddenLine xmlns="" xmlns:a14="http://schemas.microsoft.com/office/drawing/2010/main" w="9525">
                 <a:solidFill>
                   <a:srgbClr val="000000"/>
                 </a:solidFill>
@@ -31330,7 +31330,7 @@
           </a:ln>
           <a:extLst>
             <a:ext uri="{91240B29-F687-4f45-9708-019B960494DF}">
-              <a14:hiddenLine xmlns:a14="http://schemas.microsoft.com/office/drawing/2010/main" xmlns="" w="9525">
+              <a14:hiddenLine xmlns="" xmlns:a14="http://schemas.microsoft.com/office/drawing/2010/main" w="9525">
                 <a:solidFill>
                   <a:srgbClr val="000000"/>
                 </a:solidFill>
@@ -31636,14 +31636,14 @@
             </a:ln>
             <a:extLst>
               <a:ext uri="{909E8E84-426E-40dd-AFC4-6F175D3DCCD1}">
-                <a14:hiddenFill xmlns:a14="http://schemas.microsoft.com/office/drawing/2010/main" xmlns="">
+                <a14:hiddenFill xmlns="" xmlns:a14="http://schemas.microsoft.com/office/drawing/2010/main">
                   <a:solidFill>
                     <a:srgbClr val="FFFFFF"/>
                   </a:solidFill>
                 </a14:hiddenFill>
               </a:ext>
               <a:ext uri="{91240B29-F687-4f45-9708-019B960494DF}">
-                <a14:hiddenLine xmlns:a14="http://schemas.microsoft.com/office/drawing/2010/main" xmlns="" w="9525">
+                <a14:hiddenLine xmlns="" xmlns:a14="http://schemas.microsoft.com/office/drawing/2010/main" w="9525">
                   <a:solidFill>
                     <a:srgbClr val="000000"/>
                   </a:solidFill>
@@ -31802,7 +31802,7 @@
             </a:ln>
             <a:extLst>
               <a:ext uri="{91240B29-F687-4f45-9708-019B960494DF}">
-                <a14:hiddenLine xmlns:a14="http://schemas.microsoft.com/office/drawing/2010/main" xmlns="" w="9525">
+                <a14:hiddenLine xmlns="" xmlns:a14="http://schemas.microsoft.com/office/drawing/2010/main" w="9525">
                   <a:solidFill>
                     <a:srgbClr val="000000"/>
                   </a:solidFill>
@@ -32709,14 +32709,14 @@
             </a:ln>
             <a:extLst>
               <a:ext uri="{909E8E84-426E-40dd-AFC4-6F175D3DCCD1}">
-                <a14:hiddenFill xmlns="" xmlns:a14="http://schemas.microsoft.com/office/drawing/2010/main">
+                <a14:hiddenFill xmlns:a14="http://schemas.microsoft.com/office/drawing/2010/main" xmlns="">
                   <a:solidFill>
                     <a:srgbClr val="FFFFFF"/>
                   </a:solidFill>
                 </a14:hiddenFill>
               </a:ext>
               <a:ext uri="{91240B29-F687-4f45-9708-019B960494DF}">
-                <a14:hiddenLine xmlns="" xmlns:a14="http://schemas.microsoft.com/office/drawing/2010/main" w="9525">
+                <a14:hiddenLine xmlns:a14="http://schemas.microsoft.com/office/drawing/2010/main" xmlns="" w="9525">
                   <a:solidFill>
                     <a:srgbClr val="000000"/>
                   </a:solidFill>
@@ -32776,14 +32776,14 @@
             </a:ln>
             <a:extLst>
               <a:ext uri="{909E8E84-426E-40dd-AFC4-6F175D3DCCD1}">
-                <a14:hiddenFill xmlns="" xmlns:a14="http://schemas.microsoft.com/office/drawing/2010/main">
+                <a14:hiddenFill xmlns:a14="http://schemas.microsoft.com/office/drawing/2010/main" xmlns="">
                   <a:solidFill>
                     <a:srgbClr val="FFFFFF"/>
                   </a:solidFill>
                 </a14:hiddenFill>
               </a:ext>
               <a:ext uri="{91240B29-F687-4f45-9708-019B960494DF}">
-                <a14:hiddenLine xmlns="" xmlns:a14="http://schemas.microsoft.com/office/drawing/2010/main" w="9525">
+                <a14:hiddenLine xmlns:a14="http://schemas.microsoft.com/office/drawing/2010/main" xmlns="" w="9525">
                   <a:solidFill>
                     <a:srgbClr val="000000"/>
                   </a:solidFill>
@@ -32843,14 +32843,14 @@
             </a:ln>
             <a:extLst>
               <a:ext uri="{909E8E84-426E-40dd-AFC4-6F175D3DCCD1}">
-                <a14:hiddenFill xmlns="" xmlns:a14="http://schemas.microsoft.com/office/drawing/2010/main">
+                <a14:hiddenFill xmlns:a14="http://schemas.microsoft.com/office/drawing/2010/main" xmlns="">
                   <a:solidFill>
                     <a:srgbClr val="FFFFFF"/>
                   </a:solidFill>
                 </a14:hiddenFill>
               </a:ext>
               <a:ext uri="{91240B29-F687-4f45-9708-019B960494DF}">
-                <a14:hiddenLine xmlns="" xmlns:a14="http://schemas.microsoft.com/office/drawing/2010/main" w="9525">
+                <a14:hiddenLine xmlns:a14="http://schemas.microsoft.com/office/drawing/2010/main" xmlns="" w="9525">
                   <a:solidFill>
                     <a:srgbClr val="000000"/>
                   </a:solidFill>
@@ -32910,14 +32910,14 @@
             </a:ln>
             <a:extLst>
               <a:ext uri="{909E8E84-426E-40dd-AFC4-6F175D3DCCD1}">
-                <a14:hiddenFill xmlns="" xmlns:a14="http://schemas.microsoft.com/office/drawing/2010/main">
+                <a14:hiddenFill xmlns:a14="http://schemas.microsoft.com/office/drawing/2010/main" xmlns="">
                   <a:solidFill>
                     <a:srgbClr val="FFFFFF"/>
                   </a:solidFill>
                 </a14:hiddenFill>
               </a:ext>
               <a:ext uri="{91240B29-F687-4f45-9708-019B960494DF}">
-                <a14:hiddenLine xmlns="" xmlns:a14="http://schemas.microsoft.com/office/drawing/2010/main" w="9525">
+                <a14:hiddenLine xmlns:a14="http://schemas.microsoft.com/office/drawing/2010/main" xmlns="" w="9525">
                   <a:solidFill>
                     <a:srgbClr val="000000"/>
                   </a:solidFill>
@@ -32998,14 +32998,14 @@
             </a:ln>
             <a:extLst>
               <a:ext uri="{909E8E84-426E-40dd-AFC4-6F175D3DCCD1}">
-                <a14:hiddenFill xmlns="" xmlns:a14="http://schemas.microsoft.com/office/drawing/2010/main">
+                <a14:hiddenFill xmlns:a14="http://schemas.microsoft.com/office/drawing/2010/main" xmlns="">
                   <a:solidFill>
                     <a:srgbClr val="FFFFFF"/>
                   </a:solidFill>
                 </a14:hiddenFill>
               </a:ext>
               <a:ext uri="{91240B29-F687-4f45-9708-019B960494DF}">
-                <a14:hiddenLine xmlns="" xmlns:a14="http://schemas.microsoft.com/office/drawing/2010/main" w="9525">
+                <a14:hiddenLine xmlns:a14="http://schemas.microsoft.com/office/drawing/2010/main" xmlns="" w="9525">
                   <a:solidFill>
                     <a:srgbClr val="000000"/>
                   </a:solidFill>
@@ -33065,14 +33065,14 @@
             </a:ln>
             <a:extLst>
               <a:ext uri="{909E8E84-426E-40dd-AFC4-6F175D3DCCD1}">
-                <a14:hiddenFill xmlns="" xmlns:a14="http://schemas.microsoft.com/office/drawing/2010/main">
+                <a14:hiddenFill xmlns:a14="http://schemas.microsoft.com/office/drawing/2010/main" xmlns="">
                   <a:solidFill>
                     <a:srgbClr val="FFFFFF"/>
                   </a:solidFill>
                 </a14:hiddenFill>
               </a:ext>
               <a:ext uri="{91240B29-F687-4f45-9708-019B960494DF}">
-                <a14:hiddenLine xmlns="" xmlns:a14="http://schemas.microsoft.com/office/drawing/2010/main" w="9525">
+                <a14:hiddenLine xmlns:a14="http://schemas.microsoft.com/office/drawing/2010/main" xmlns="" w="9525">
                   <a:solidFill>
                     <a:srgbClr val="000000"/>
                   </a:solidFill>
@@ -33132,14 +33132,14 @@
             </a:ln>
             <a:extLst>
               <a:ext uri="{909E8E84-426E-40dd-AFC4-6F175D3DCCD1}">
-                <a14:hiddenFill xmlns="" xmlns:a14="http://schemas.microsoft.com/office/drawing/2010/main">
+                <a14:hiddenFill xmlns:a14="http://schemas.microsoft.com/office/drawing/2010/main" xmlns="">
                   <a:solidFill>
                     <a:srgbClr val="FFFFFF"/>
                   </a:solidFill>
                 </a14:hiddenFill>
               </a:ext>
               <a:ext uri="{91240B29-F687-4f45-9708-019B960494DF}">
-                <a14:hiddenLine xmlns="" xmlns:a14="http://schemas.microsoft.com/office/drawing/2010/main" w="9525">
+                <a14:hiddenLine xmlns:a14="http://schemas.microsoft.com/office/drawing/2010/main" xmlns="" w="9525">
                   <a:solidFill>
                     <a:srgbClr val="000000"/>
                   </a:solidFill>
@@ -33199,14 +33199,14 @@
             </a:ln>
             <a:extLst>
               <a:ext uri="{909E8E84-426E-40dd-AFC4-6F175D3DCCD1}">
-                <a14:hiddenFill xmlns="" xmlns:a14="http://schemas.microsoft.com/office/drawing/2010/main">
+                <a14:hiddenFill xmlns:a14="http://schemas.microsoft.com/office/drawing/2010/main" xmlns="">
                   <a:solidFill>
                     <a:srgbClr val="FFFFFF"/>
                   </a:solidFill>
                 </a14:hiddenFill>
               </a:ext>
               <a:ext uri="{91240B29-F687-4f45-9708-019B960494DF}">
-                <a14:hiddenLine xmlns="" xmlns:a14="http://schemas.microsoft.com/office/drawing/2010/main" w="9525">
+                <a14:hiddenLine xmlns:a14="http://schemas.microsoft.com/office/drawing/2010/main" xmlns="" w="9525">
                   <a:solidFill>
                     <a:srgbClr val="000000"/>
                   </a:solidFill>
@@ -33602,7 +33602,7 @@
           </a:ln>
           <a:extLst>
             <a:ext uri="{91240B29-F687-4f45-9708-019B960494DF}">
-              <a14:hiddenLine xmlns="" xmlns:a14="http://schemas.microsoft.com/office/drawing/2010/main" w="9525">
+              <a14:hiddenLine xmlns:a14="http://schemas.microsoft.com/office/drawing/2010/main" xmlns="" w="9525">
                 <a:solidFill>
                   <a:srgbClr val="000000"/>
                 </a:solidFill>
@@ -33662,14 +33662,14 @@
           </a:ln>
           <a:extLst>
             <a:ext uri="{909E8E84-426E-40dd-AFC4-6F175D3DCCD1}">
-              <a14:hiddenFill xmlns="" xmlns:a14="http://schemas.microsoft.com/office/drawing/2010/main">
+              <a14:hiddenFill xmlns:a14="http://schemas.microsoft.com/office/drawing/2010/main" xmlns="">
                 <a:solidFill>
                   <a:srgbClr val="FFFFFF"/>
                 </a:solidFill>
               </a14:hiddenFill>
             </a:ext>
             <a:ext uri="{91240B29-F687-4f45-9708-019B960494DF}">
-              <a14:hiddenLine xmlns="" xmlns:a14="http://schemas.microsoft.com/office/drawing/2010/main" w="9525">
+              <a14:hiddenLine xmlns:a14="http://schemas.microsoft.com/office/drawing/2010/main" xmlns="" w="9525">
                 <a:solidFill>
                   <a:srgbClr val="000000"/>
                 </a:solidFill>
@@ -33798,7 +33798,7 @@
           </a:ln>
           <a:extLst>
             <a:ext uri="{91240B29-F687-4f45-9708-019B960494DF}">
-              <a14:hiddenLine xmlns="" xmlns:a14="http://schemas.microsoft.com/office/drawing/2010/main" w="9525">
+              <a14:hiddenLine xmlns:a14="http://schemas.microsoft.com/office/drawing/2010/main" xmlns="" w="9525">
                 <a:solidFill>
                   <a:srgbClr val="000000"/>
                 </a:solidFill>
@@ -33943,7 +33943,7 @@
           </a:ln>
           <a:extLst>
             <a:ext uri="{91240B29-F687-4f45-9708-019B960494DF}">
-              <a14:hiddenLine xmlns="" xmlns:a14="http://schemas.microsoft.com/office/drawing/2010/main" w="9525">
+              <a14:hiddenLine xmlns:a14="http://schemas.microsoft.com/office/drawing/2010/main" xmlns="" w="9525">
                 <a:solidFill>
                   <a:srgbClr val="000000"/>
                 </a:solidFill>
@@ -34152,7 +34152,7 @@
           </a:ln>
           <a:extLst>
             <a:ext uri="{91240B29-F687-4f45-9708-019B960494DF}">
-              <a14:hiddenLine xmlns="" xmlns:a14="http://schemas.microsoft.com/office/drawing/2010/main" w="9525">
+              <a14:hiddenLine xmlns:a14="http://schemas.microsoft.com/office/drawing/2010/main" xmlns="" w="9525">
                 <a:solidFill>
                   <a:srgbClr val="000000"/>
                 </a:solidFill>
@@ -34212,14 +34212,14 @@
           </a:ln>
           <a:extLst>
             <a:ext uri="{909E8E84-426E-40dd-AFC4-6F175D3DCCD1}">
-              <a14:hiddenFill xmlns="" xmlns:a14="http://schemas.microsoft.com/office/drawing/2010/main">
+              <a14:hiddenFill xmlns:a14="http://schemas.microsoft.com/office/drawing/2010/main" xmlns="">
                 <a:solidFill>
                   <a:srgbClr val="FFFFFF"/>
                 </a:solidFill>
               </a14:hiddenFill>
             </a:ext>
             <a:ext uri="{91240B29-F687-4f45-9708-019B960494DF}">
-              <a14:hiddenLine xmlns="" xmlns:a14="http://schemas.microsoft.com/office/drawing/2010/main" w="9525">
+              <a14:hiddenLine xmlns:a14="http://schemas.microsoft.com/office/drawing/2010/main" xmlns="" w="9525">
                 <a:solidFill>
                   <a:srgbClr val="000000"/>
                 </a:solidFill>
@@ -34378,7 +34378,7 @@
           </a:ln>
           <a:extLst>
             <a:ext uri="{91240B29-F687-4f45-9708-019B960494DF}">
-              <a14:hiddenLine xmlns="" xmlns:a14="http://schemas.microsoft.com/office/drawing/2010/main" w="9525">
+              <a14:hiddenLine xmlns:a14="http://schemas.microsoft.com/office/drawing/2010/main" xmlns="" w="9525">
                 <a:solidFill>
                   <a:srgbClr val="000000"/>
                 </a:solidFill>
@@ -34564,7 +34564,7 @@
           </a:ln>
           <a:extLst>
             <a:ext uri="{91240B29-F687-4f45-9708-019B960494DF}">
-              <a14:hiddenLine xmlns="" xmlns:a14="http://schemas.microsoft.com/office/drawing/2010/main" w="9525">
+              <a14:hiddenLine xmlns:a14="http://schemas.microsoft.com/office/drawing/2010/main" xmlns="" w="9525">
                 <a:solidFill>
                   <a:srgbClr val="000000"/>
                 </a:solidFill>
@@ -34783,7 +34783,7 @@
           </a:ln>
           <a:extLst>
             <a:ext uri="{91240B29-F687-4f45-9708-019B960494DF}">
-              <a14:hiddenLine xmlns="" xmlns:a14="http://schemas.microsoft.com/office/drawing/2010/main" w="9525">
+              <a14:hiddenLine xmlns:a14="http://schemas.microsoft.com/office/drawing/2010/main" xmlns="" w="9525">
                 <a:solidFill>
                   <a:srgbClr val="000000"/>
                 </a:solidFill>
@@ -34992,7 +34992,7 @@
           </a:ln>
           <a:extLst>
             <a:ext uri="{91240B29-F687-4f45-9708-019B960494DF}">
-              <a14:hiddenLine xmlns="" xmlns:a14="http://schemas.microsoft.com/office/drawing/2010/main" w="9525">
+              <a14:hiddenLine xmlns:a14="http://schemas.microsoft.com/office/drawing/2010/main" xmlns="" w="9525">
                 <a:solidFill>
                   <a:srgbClr val="000000"/>
                 </a:solidFill>
@@ -35887,14 +35887,14 @@
               </a:ln>
               <a:extLst>
                 <a:ext uri="{909E8E84-426E-40dd-AFC4-6F175D3DCCD1}">
-                  <a14:hiddenFill xmlns:a14="http://schemas.microsoft.com/office/drawing/2010/main" xmlns="">
+                  <a14:hiddenFill xmlns="" xmlns:a14="http://schemas.microsoft.com/office/drawing/2010/main">
                     <a:solidFill>
                       <a:srgbClr val="FFFFFF"/>
                     </a:solidFill>
                   </a14:hiddenFill>
                 </a:ext>
                 <a:ext uri="{91240B29-F687-4f45-9708-019B960494DF}">
-                  <a14:hiddenLine xmlns:a14="http://schemas.microsoft.com/office/drawing/2010/main" xmlns="" w="9525">
+                  <a14:hiddenLine xmlns="" xmlns:a14="http://schemas.microsoft.com/office/drawing/2010/main" w="9525">
                     <a:solidFill>
                       <a:srgbClr val="000000"/>
                     </a:solidFill>
@@ -37063,14 +37063,14 @@
               </a:ln>
               <a:extLst>
                 <a:ext uri="{909E8E84-426E-40dd-AFC4-6F175D3DCCD1}">
-                  <a14:hiddenFill xmlns:a14="http://schemas.microsoft.com/office/drawing/2010/main" xmlns="">
+                  <a14:hiddenFill xmlns="" xmlns:a14="http://schemas.microsoft.com/office/drawing/2010/main">
                     <a:solidFill>
                       <a:srgbClr val="FFFFFF"/>
                     </a:solidFill>
                   </a14:hiddenFill>
                 </a:ext>
                 <a:ext uri="{91240B29-F687-4f45-9708-019B960494DF}">
-                  <a14:hiddenLine xmlns:a14="http://schemas.microsoft.com/office/drawing/2010/main" xmlns="" w="9525">
+                  <a14:hiddenLine xmlns="" xmlns:a14="http://schemas.microsoft.com/office/drawing/2010/main" w="9525">
                     <a:solidFill>
                       <a:srgbClr val="000000"/>
                     </a:solidFill>
@@ -37807,7 +37807,7 @@
           </a:ln>
           <a:extLst>
             <a:ext uri="{91240B29-F687-4f45-9708-019B960494DF}">
-              <a14:hiddenLine xmlns:a14="http://schemas.microsoft.com/office/drawing/2010/main" xmlns="" w="9525">
+              <a14:hiddenLine xmlns="" xmlns:a14="http://schemas.microsoft.com/office/drawing/2010/main" w="9525">
                 <a:solidFill>
                   <a:srgbClr val="000000"/>
                 </a:solidFill>
@@ -38206,14 +38206,14 @@
             </a:ln>
             <a:extLst>
               <a:ext uri="{909E8E84-426E-40dd-AFC4-6F175D3DCCD1}">
-                <a14:hiddenFill xmlns="" xmlns:a14="http://schemas.microsoft.com/office/drawing/2010/main">
+                <a14:hiddenFill xmlns:a14="http://schemas.microsoft.com/office/drawing/2010/main" xmlns="">
                   <a:solidFill>
                     <a:srgbClr val="FFFFFF"/>
                   </a:solidFill>
                 </a14:hiddenFill>
               </a:ext>
               <a:ext uri="{91240B29-F687-4f45-9708-019B960494DF}">
-                <a14:hiddenLine xmlns="" xmlns:a14="http://schemas.microsoft.com/office/drawing/2010/main" w="9525">
+                <a14:hiddenLine xmlns:a14="http://schemas.microsoft.com/office/drawing/2010/main" xmlns="" w="9525">
                   <a:solidFill>
                     <a:srgbClr val="000000"/>
                   </a:solidFill>
@@ -38273,14 +38273,14 @@
             </a:ln>
             <a:extLst>
               <a:ext uri="{909E8E84-426E-40dd-AFC4-6F175D3DCCD1}">
-                <a14:hiddenFill xmlns="" xmlns:a14="http://schemas.microsoft.com/office/drawing/2010/main">
+                <a14:hiddenFill xmlns:a14="http://schemas.microsoft.com/office/drawing/2010/main" xmlns="">
                   <a:solidFill>
                     <a:srgbClr val="FFFFFF"/>
                   </a:solidFill>
                 </a14:hiddenFill>
               </a:ext>
               <a:ext uri="{91240B29-F687-4f45-9708-019B960494DF}">
-                <a14:hiddenLine xmlns="" xmlns:a14="http://schemas.microsoft.com/office/drawing/2010/main" w="9525">
+                <a14:hiddenLine xmlns:a14="http://schemas.microsoft.com/office/drawing/2010/main" xmlns="" w="9525">
                   <a:solidFill>
                     <a:srgbClr val="000000"/>
                   </a:solidFill>
@@ -38340,14 +38340,14 @@
             </a:ln>
             <a:extLst>
               <a:ext uri="{909E8E84-426E-40dd-AFC4-6F175D3DCCD1}">
-                <a14:hiddenFill xmlns="" xmlns:a14="http://schemas.microsoft.com/office/drawing/2010/main">
+                <a14:hiddenFill xmlns:a14="http://schemas.microsoft.com/office/drawing/2010/main" xmlns="">
                   <a:solidFill>
                     <a:srgbClr val="FFFFFF"/>
                   </a:solidFill>
                 </a14:hiddenFill>
               </a:ext>
               <a:ext uri="{91240B29-F687-4f45-9708-019B960494DF}">
-                <a14:hiddenLine xmlns="" xmlns:a14="http://schemas.microsoft.com/office/drawing/2010/main" w="9525">
+                <a14:hiddenLine xmlns:a14="http://schemas.microsoft.com/office/drawing/2010/main" xmlns="" w="9525">
                   <a:solidFill>
                     <a:srgbClr val="000000"/>
                   </a:solidFill>
@@ -38407,14 +38407,14 @@
             </a:ln>
             <a:extLst>
               <a:ext uri="{909E8E84-426E-40dd-AFC4-6F175D3DCCD1}">
-                <a14:hiddenFill xmlns="" xmlns:a14="http://schemas.microsoft.com/office/drawing/2010/main">
+                <a14:hiddenFill xmlns:a14="http://schemas.microsoft.com/office/drawing/2010/main" xmlns="">
                   <a:solidFill>
                     <a:srgbClr val="FFFFFF"/>
                   </a:solidFill>
                 </a14:hiddenFill>
               </a:ext>
               <a:ext uri="{91240B29-F687-4f45-9708-019B960494DF}">
-                <a14:hiddenLine xmlns="" xmlns:a14="http://schemas.microsoft.com/office/drawing/2010/main" w="9525">
+                <a14:hiddenLine xmlns:a14="http://schemas.microsoft.com/office/drawing/2010/main" xmlns="" w="9525">
                   <a:solidFill>
                     <a:srgbClr val="000000"/>
                   </a:solidFill>
@@ -38495,14 +38495,14 @@
             </a:ln>
             <a:extLst>
               <a:ext uri="{909E8E84-426E-40dd-AFC4-6F175D3DCCD1}">
-                <a14:hiddenFill xmlns="" xmlns:a14="http://schemas.microsoft.com/office/drawing/2010/main">
+                <a14:hiddenFill xmlns:a14="http://schemas.microsoft.com/office/drawing/2010/main" xmlns="">
                   <a:solidFill>
                     <a:srgbClr val="FFFFFF"/>
                   </a:solidFill>
                 </a14:hiddenFill>
               </a:ext>
               <a:ext uri="{91240B29-F687-4f45-9708-019B960494DF}">
-                <a14:hiddenLine xmlns="" xmlns:a14="http://schemas.microsoft.com/office/drawing/2010/main" w="9525">
+                <a14:hiddenLine xmlns:a14="http://schemas.microsoft.com/office/drawing/2010/main" xmlns="" w="9525">
                   <a:solidFill>
                     <a:srgbClr val="000000"/>
                   </a:solidFill>
@@ -38562,14 +38562,14 @@
             </a:ln>
             <a:extLst>
               <a:ext uri="{909E8E84-426E-40dd-AFC4-6F175D3DCCD1}">
-                <a14:hiddenFill xmlns="" xmlns:a14="http://schemas.microsoft.com/office/drawing/2010/main">
+                <a14:hiddenFill xmlns:a14="http://schemas.microsoft.com/office/drawing/2010/main" xmlns="">
                   <a:solidFill>
                     <a:srgbClr val="FFFFFF"/>
                   </a:solidFill>
                 </a14:hiddenFill>
               </a:ext>
               <a:ext uri="{91240B29-F687-4f45-9708-019B960494DF}">
-                <a14:hiddenLine xmlns="" xmlns:a14="http://schemas.microsoft.com/office/drawing/2010/main" w="9525">
+                <a14:hiddenLine xmlns:a14="http://schemas.microsoft.com/office/drawing/2010/main" xmlns="" w="9525">
                   <a:solidFill>
                     <a:srgbClr val="000000"/>
                   </a:solidFill>
@@ -38629,14 +38629,14 @@
             </a:ln>
             <a:extLst>
               <a:ext uri="{909E8E84-426E-40dd-AFC4-6F175D3DCCD1}">
-                <a14:hiddenFill xmlns="" xmlns:a14="http://schemas.microsoft.com/office/drawing/2010/main">
+                <a14:hiddenFill xmlns:a14="http://schemas.microsoft.com/office/drawing/2010/main" xmlns="">
                   <a:solidFill>
                     <a:srgbClr val="FFFFFF"/>
                   </a:solidFill>
                 </a14:hiddenFill>
               </a:ext>
               <a:ext uri="{91240B29-F687-4f45-9708-019B960494DF}">
-                <a14:hiddenLine xmlns="" xmlns:a14="http://schemas.microsoft.com/office/drawing/2010/main" w="9525">
+                <a14:hiddenLine xmlns:a14="http://schemas.microsoft.com/office/drawing/2010/main" xmlns="" w="9525">
                   <a:solidFill>
                     <a:srgbClr val="000000"/>
                   </a:solidFill>
@@ -38696,14 +38696,14 @@
             </a:ln>
             <a:extLst>
               <a:ext uri="{909E8E84-426E-40dd-AFC4-6F175D3DCCD1}">
-                <a14:hiddenFill xmlns="" xmlns:a14="http://schemas.microsoft.com/office/drawing/2010/main">
+                <a14:hiddenFill xmlns:a14="http://schemas.microsoft.com/office/drawing/2010/main" xmlns="">
                   <a:solidFill>
                     <a:srgbClr val="FFFFFF"/>
                   </a:solidFill>
                 </a14:hiddenFill>
               </a:ext>
               <a:ext uri="{91240B29-F687-4f45-9708-019B960494DF}">
-                <a14:hiddenLine xmlns="" xmlns:a14="http://schemas.microsoft.com/office/drawing/2010/main" w="9525">
+                <a14:hiddenLine xmlns:a14="http://schemas.microsoft.com/office/drawing/2010/main" xmlns="" w="9525">
                   <a:solidFill>
                     <a:srgbClr val="000000"/>
                   </a:solidFill>
@@ -39099,7 +39099,7 @@
           </a:ln>
           <a:extLst>
             <a:ext uri="{91240B29-F687-4f45-9708-019B960494DF}">
-              <a14:hiddenLine xmlns="" xmlns:a14="http://schemas.microsoft.com/office/drawing/2010/main" w="9525">
+              <a14:hiddenLine xmlns:a14="http://schemas.microsoft.com/office/drawing/2010/main" xmlns="" w="9525">
                 <a:solidFill>
                   <a:srgbClr val="000000"/>
                 </a:solidFill>
@@ -39159,14 +39159,14 @@
           </a:ln>
           <a:extLst>
             <a:ext uri="{909E8E84-426E-40dd-AFC4-6F175D3DCCD1}">
-              <a14:hiddenFill xmlns="" xmlns:a14="http://schemas.microsoft.com/office/drawing/2010/main">
+              <a14:hiddenFill xmlns:a14="http://schemas.microsoft.com/office/drawing/2010/main" xmlns="">
                 <a:solidFill>
                   <a:srgbClr val="FFFFFF"/>
                 </a:solidFill>
               </a14:hiddenFill>
             </a:ext>
             <a:ext uri="{91240B29-F687-4f45-9708-019B960494DF}">
-              <a14:hiddenLine xmlns="" xmlns:a14="http://schemas.microsoft.com/office/drawing/2010/main" w="9525">
+              <a14:hiddenLine xmlns:a14="http://schemas.microsoft.com/office/drawing/2010/main" xmlns="" w="9525">
                 <a:solidFill>
                   <a:srgbClr val="000000"/>
                 </a:solidFill>
@@ -39295,7 +39295,7 @@
           </a:ln>
           <a:extLst>
             <a:ext uri="{91240B29-F687-4f45-9708-019B960494DF}">
-              <a14:hiddenLine xmlns="" xmlns:a14="http://schemas.microsoft.com/office/drawing/2010/main" w="9525">
+              <a14:hiddenLine xmlns:a14="http://schemas.microsoft.com/office/drawing/2010/main" xmlns="" w="9525">
                 <a:solidFill>
                   <a:srgbClr val="000000"/>
                 </a:solidFill>
@@ -39440,7 +39440,7 @@
           </a:ln>
           <a:extLst>
             <a:ext uri="{91240B29-F687-4f45-9708-019B960494DF}">
-              <a14:hiddenLine xmlns="" xmlns:a14="http://schemas.microsoft.com/office/drawing/2010/main" w="9525">
+              <a14:hiddenLine xmlns:a14="http://schemas.microsoft.com/office/drawing/2010/main" xmlns="" w="9525">
                 <a:solidFill>
                   <a:srgbClr val="000000"/>
                 </a:solidFill>
@@ -39649,7 +39649,7 @@
           </a:ln>
           <a:extLst>
             <a:ext uri="{91240B29-F687-4f45-9708-019B960494DF}">
-              <a14:hiddenLine xmlns="" xmlns:a14="http://schemas.microsoft.com/office/drawing/2010/main" w="9525">
+              <a14:hiddenLine xmlns:a14="http://schemas.microsoft.com/office/drawing/2010/main" xmlns="" w="9525">
                 <a:solidFill>
                   <a:srgbClr val="000000"/>
                 </a:solidFill>
@@ -39709,14 +39709,14 @@
           </a:ln>
           <a:extLst>
             <a:ext uri="{909E8E84-426E-40dd-AFC4-6F175D3DCCD1}">
-              <a14:hiddenFill xmlns="" xmlns:a14="http://schemas.microsoft.com/office/drawing/2010/main">
+              <a14:hiddenFill xmlns:a14="http://schemas.microsoft.com/office/drawing/2010/main" xmlns="">
                 <a:solidFill>
                   <a:srgbClr val="FFFFFF"/>
                 </a:solidFill>
               </a14:hiddenFill>
             </a:ext>
             <a:ext uri="{91240B29-F687-4f45-9708-019B960494DF}">
-              <a14:hiddenLine xmlns="" xmlns:a14="http://schemas.microsoft.com/office/drawing/2010/main" w="9525">
+              <a14:hiddenLine xmlns:a14="http://schemas.microsoft.com/office/drawing/2010/main" xmlns="" w="9525">
                 <a:solidFill>
                   <a:srgbClr val="000000"/>
                 </a:solidFill>
@@ -39875,7 +39875,7 @@
           </a:ln>
           <a:extLst>
             <a:ext uri="{91240B29-F687-4f45-9708-019B960494DF}">
-              <a14:hiddenLine xmlns="" xmlns:a14="http://schemas.microsoft.com/office/drawing/2010/main" w="9525">
+              <a14:hiddenLine xmlns:a14="http://schemas.microsoft.com/office/drawing/2010/main" xmlns="" w="9525">
                 <a:solidFill>
                   <a:srgbClr val="000000"/>
                 </a:solidFill>
@@ -40061,7 +40061,7 @@
           </a:ln>
           <a:extLst>
             <a:ext uri="{91240B29-F687-4f45-9708-019B960494DF}">
-              <a14:hiddenLine xmlns="" xmlns:a14="http://schemas.microsoft.com/office/drawing/2010/main" w="9525">
+              <a14:hiddenLine xmlns:a14="http://schemas.microsoft.com/office/drawing/2010/main" xmlns="" w="9525">
                 <a:solidFill>
                   <a:srgbClr val="000000"/>
                 </a:solidFill>
@@ -40280,7 +40280,7 @@
           </a:ln>
           <a:extLst>
             <a:ext uri="{91240B29-F687-4f45-9708-019B960494DF}">
-              <a14:hiddenLine xmlns="" xmlns:a14="http://schemas.microsoft.com/office/drawing/2010/main" w="9525">
+              <a14:hiddenLine xmlns:a14="http://schemas.microsoft.com/office/drawing/2010/main" xmlns="" w="9525">
                 <a:solidFill>
                   <a:srgbClr val="000000"/>
                 </a:solidFill>
@@ -40489,7 +40489,7 @@
           </a:ln>
           <a:extLst>
             <a:ext uri="{91240B29-F687-4f45-9708-019B960494DF}">
-              <a14:hiddenLine xmlns="" xmlns:a14="http://schemas.microsoft.com/office/drawing/2010/main" w="9525">
+              <a14:hiddenLine xmlns:a14="http://schemas.microsoft.com/office/drawing/2010/main" xmlns="" w="9525">
                 <a:solidFill>
                   <a:srgbClr val="000000"/>
                 </a:solidFill>
@@ -41420,14 +41420,14 @@
               </a:ln>
               <a:extLst>
                 <a:ext uri="{909E8E84-426E-40dd-AFC4-6F175D3DCCD1}">
-                  <a14:hiddenFill xmlns:a14="http://schemas.microsoft.com/office/drawing/2010/main" xmlns="">
+                  <a14:hiddenFill xmlns="" xmlns:a14="http://schemas.microsoft.com/office/drawing/2010/main">
                     <a:solidFill>
                       <a:srgbClr val="FFFFFF"/>
                     </a:solidFill>
                   </a14:hiddenFill>
                 </a:ext>
                 <a:ext uri="{91240B29-F687-4f45-9708-019B960494DF}">
-                  <a14:hiddenLine xmlns:a14="http://schemas.microsoft.com/office/drawing/2010/main" xmlns="" w="9525">
+                  <a14:hiddenLine xmlns="" xmlns:a14="http://schemas.microsoft.com/office/drawing/2010/main" w="9525">
                     <a:solidFill>
                       <a:srgbClr val="000000"/>
                     </a:solidFill>
@@ -42596,14 +42596,14 @@
               </a:ln>
               <a:extLst>
                 <a:ext uri="{909E8E84-426E-40dd-AFC4-6F175D3DCCD1}">
-                  <a14:hiddenFill xmlns:a14="http://schemas.microsoft.com/office/drawing/2010/main" xmlns="">
+                  <a14:hiddenFill xmlns="" xmlns:a14="http://schemas.microsoft.com/office/drawing/2010/main">
                     <a:solidFill>
                       <a:srgbClr val="FFFFFF"/>
                     </a:solidFill>
                   </a14:hiddenFill>
                 </a:ext>
                 <a:ext uri="{91240B29-F687-4f45-9708-019B960494DF}">
-                  <a14:hiddenLine xmlns:a14="http://schemas.microsoft.com/office/drawing/2010/main" xmlns="" w="9525">
+                  <a14:hiddenLine xmlns="" xmlns:a14="http://schemas.microsoft.com/office/drawing/2010/main" w="9525">
                     <a:solidFill>
                       <a:srgbClr val="000000"/>
                     </a:solidFill>
@@ -43360,7 +43360,7 @@
             </a:ln>
             <a:extLst>
               <a:ext uri="{91240B29-F687-4f45-9708-019B960494DF}">
-                <a14:hiddenLine xmlns:a14="http://schemas.microsoft.com/office/drawing/2010/main" xmlns="" w="9525">
+                <a14:hiddenLine xmlns="" xmlns:a14="http://schemas.microsoft.com/office/drawing/2010/main" w="9525">
                   <a:solidFill>
                     <a:srgbClr val="000000"/>
                   </a:solidFill>
@@ -43891,7 +43891,7 @@
             </a:ln>
             <a:extLst>
               <a:ext uri="{91240B29-F687-4f45-9708-019B960494DF}">
-                <a14:hiddenLine xmlns:a14="http://schemas.microsoft.com/office/drawing/2010/main" xmlns="" w="9525">
+                <a14:hiddenLine xmlns="" xmlns:a14="http://schemas.microsoft.com/office/drawing/2010/main" w="9525">
                   <a:solidFill>
                     <a:srgbClr val="000000"/>
                   </a:solidFill>
@@ -44307,14 +44307,14 @@
               </a:ln>
               <a:extLst>
                 <a:ext uri="{909E8E84-426E-40dd-AFC4-6F175D3DCCD1}">
-                  <a14:hiddenFill xmlns:a14="http://schemas.microsoft.com/office/drawing/2010/main" xmlns="">
+                  <a14:hiddenFill xmlns="" xmlns:a14="http://schemas.microsoft.com/office/drawing/2010/main">
                     <a:solidFill>
                       <a:srgbClr val="FFFFFF"/>
                     </a:solidFill>
                   </a14:hiddenFill>
                 </a:ext>
                 <a:ext uri="{91240B29-F687-4f45-9708-019B960494DF}">
-                  <a14:hiddenLine xmlns:a14="http://schemas.microsoft.com/office/drawing/2010/main" xmlns="" w="9525">
+                  <a14:hiddenLine xmlns="" xmlns:a14="http://schemas.microsoft.com/office/drawing/2010/main" w="9525">
                     <a:solidFill>
                       <a:srgbClr val="000000"/>
                     </a:solidFill>
@@ -44828,14 +44828,14 @@
               </a:ln>
               <a:extLst>
                 <a:ext uri="{909E8E84-426E-40dd-AFC4-6F175D3DCCD1}">
-                  <a14:hiddenFill xmlns:a14="http://schemas.microsoft.com/office/drawing/2010/main" xmlns="">
+                  <a14:hiddenFill xmlns="" xmlns:a14="http://schemas.microsoft.com/office/drawing/2010/main">
                     <a:solidFill>
                       <a:srgbClr val="FFFFFF"/>
                     </a:solidFill>
                   </a14:hiddenFill>
                 </a:ext>
                 <a:ext uri="{91240B29-F687-4f45-9708-019B960494DF}">
-                  <a14:hiddenLine xmlns:a14="http://schemas.microsoft.com/office/drawing/2010/main" xmlns="" w="9525">
+                  <a14:hiddenLine xmlns="" xmlns:a14="http://schemas.microsoft.com/office/drawing/2010/main" w="9525">
                     <a:solidFill>
                       <a:srgbClr val="000000"/>
                     </a:solidFill>
@@ -45670,7 +45670,7 @@
               </a:ln>
               <a:extLst>
                 <a:ext uri="{91240B29-F687-4f45-9708-019B960494DF}">
-                  <a14:hiddenLine xmlns:a14="http://schemas.microsoft.com/office/drawing/2010/main" xmlns="" w="9525">
+                  <a14:hiddenLine xmlns="" xmlns:a14="http://schemas.microsoft.com/office/drawing/2010/main" w="9525">
                     <a:solidFill>
                       <a:srgbClr val="000000"/>
                     </a:solidFill>
@@ -45730,14 +45730,14 @@
               </a:ln>
               <a:extLst>
                 <a:ext uri="{909E8E84-426E-40dd-AFC4-6F175D3DCCD1}">
-                  <a14:hiddenFill xmlns:a14="http://schemas.microsoft.com/office/drawing/2010/main" xmlns="">
+                  <a14:hiddenFill xmlns="" xmlns:a14="http://schemas.microsoft.com/office/drawing/2010/main">
                     <a:solidFill>
                       <a:srgbClr val="FFFFFF"/>
                     </a:solidFill>
                   </a14:hiddenFill>
                 </a:ext>
                 <a:ext uri="{91240B29-F687-4f45-9708-019B960494DF}">
-                  <a14:hiddenLine xmlns:a14="http://schemas.microsoft.com/office/drawing/2010/main" xmlns="" w="9525">
+                  <a14:hiddenLine xmlns="" xmlns:a14="http://schemas.microsoft.com/office/drawing/2010/main" w="9525">
                     <a:solidFill>
                       <a:srgbClr val="000000"/>
                     </a:solidFill>
@@ -45866,7 +45866,7 @@
               </a:ln>
               <a:extLst>
                 <a:ext uri="{91240B29-F687-4f45-9708-019B960494DF}">
-                  <a14:hiddenLine xmlns:a14="http://schemas.microsoft.com/office/drawing/2010/main" xmlns="" w="9525">
+                  <a14:hiddenLine xmlns="" xmlns:a14="http://schemas.microsoft.com/office/drawing/2010/main" w="9525">
                     <a:solidFill>
                       <a:srgbClr val="000000"/>
                     </a:solidFill>
@@ -46011,7 +46011,7 @@
               </a:ln>
               <a:extLst>
                 <a:ext uri="{91240B29-F687-4f45-9708-019B960494DF}">
-                  <a14:hiddenLine xmlns:a14="http://schemas.microsoft.com/office/drawing/2010/main" xmlns="" w="9525">
+                  <a14:hiddenLine xmlns="" xmlns:a14="http://schemas.microsoft.com/office/drawing/2010/main" w="9525">
                     <a:solidFill>
                       <a:srgbClr val="000000"/>
                     </a:solidFill>
@@ -46220,7 +46220,7 @@
               </a:ln>
               <a:extLst>
                 <a:ext uri="{91240B29-F687-4f45-9708-019B960494DF}">
-                  <a14:hiddenLine xmlns:a14="http://schemas.microsoft.com/office/drawing/2010/main" xmlns="" w="9525">
+                  <a14:hiddenLine xmlns="" xmlns:a14="http://schemas.microsoft.com/office/drawing/2010/main" w="9525">
                     <a:solidFill>
                       <a:srgbClr val="000000"/>
                     </a:solidFill>
@@ -46400,7 +46400,7 @@
               </a:ln>
               <a:extLst>
                 <a:ext uri="{91240B29-F687-4f45-9708-019B960494DF}">
-                  <a14:hiddenLine xmlns:a14="http://schemas.microsoft.com/office/drawing/2010/main" xmlns="" w="9525">
+                  <a14:hiddenLine xmlns="" xmlns:a14="http://schemas.microsoft.com/office/drawing/2010/main" w="9525">
                     <a:solidFill>
                       <a:srgbClr val="000000"/>
                     </a:solidFill>
@@ -46586,7 +46586,7 @@
               </a:ln>
               <a:extLst>
                 <a:ext uri="{91240B29-F687-4f45-9708-019B960494DF}">
-                  <a14:hiddenLine xmlns:a14="http://schemas.microsoft.com/office/drawing/2010/main" xmlns="" w="9525">
+                  <a14:hiddenLine xmlns="" xmlns:a14="http://schemas.microsoft.com/office/drawing/2010/main" w="9525">
                     <a:solidFill>
                       <a:srgbClr val="000000"/>
                     </a:solidFill>
@@ -46805,7 +46805,7 @@
               </a:ln>
               <a:extLst>
                 <a:ext uri="{91240B29-F687-4f45-9708-019B960494DF}">
-                  <a14:hiddenLine xmlns:a14="http://schemas.microsoft.com/office/drawing/2010/main" xmlns="" w="9525">
+                  <a14:hiddenLine xmlns="" xmlns:a14="http://schemas.microsoft.com/office/drawing/2010/main" w="9525">
                     <a:solidFill>
                       <a:srgbClr val="000000"/>
                     </a:solidFill>
@@ -47014,7 +47014,7 @@
               </a:ln>
               <a:extLst>
                 <a:ext uri="{91240B29-F687-4f45-9708-019B960494DF}">
-                  <a14:hiddenLine xmlns:a14="http://schemas.microsoft.com/office/drawing/2010/main" xmlns="" w="9525">
+                  <a14:hiddenLine xmlns="" xmlns:a14="http://schemas.microsoft.com/office/drawing/2010/main" w="9525">
                     <a:solidFill>
                       <a:srgbClr val="000000"/>
                     </a:solidFill>

</xml_diff>

<commit_message>
add draft gitlab lab
</commit_message>
<xml_diff>
--- a/docs/pptx/BlueprintDiag.pptx
+++ b/docs/pptx/BlueprintDiag.pptx
@@ -198,7 +198,7 @@
           <a:p>
             <a:fld id="{5E8AE13A-5A80-4F17-971D-03F4C3B28A8B}" type="datetimeFigureOut">
               <a:rPr lang="en-US" smtClean="0"/>
-              <a:t>7/30/20</a:t>
+              <a:t>8/13/20</a:t>
             </a:fld>
             <a:endParaRPr lang="en-US"/>
           </a:p>
@@ -1922,7 +1922,7 @@
           <a:p>
             <a:fld id="{24AFE612-74AD-4B6F-8D78-7C42EB8A6CD6}" type="datetimeFigureOut">
               <a:rPr lang="en-US" smtClean="0"/>
-              <a:t>7/30/20</a:t>
+              <a:t>8/13/20</a:t>
             </a:fld>
             <a:endParaRPr lang="en-US"/>
           </a:p>
@@ -2092,7 +2092,7 @@
           <a:p>
             <a:fld id="{24AFE612-74AD-4B6F-8D78-7C42EB8A6CD6}" type="datetimeFigureOut">
               <a:rPr lang="en-US" smtClean="0"/>
-              <a:t>7/30/20</a:t>
+              <a:t>8/13/20</a:t>
             </a:fld>
             <a:endParaRPr lang="en-US"/>
           </a:p>
@@ -2634,7 +2634,7 @@
           <a:p>
             <a:fld id="{24AFE612-74AD-4B6F-8D78-7C42EB8A6CD6}" type="datetimeFigureOut">
               <a:rPr lang="en-US" smtClean="0"/>
-              <a:t>7/30/20</a:t>
+              <a:t>8/13/20</a:t>
             </a:fld>
             <a:endParaRPr lang="en-US"/>
           </a:p>
@@ -2866,7 +2866,7 @@
           <a:p>
             <a:fld id="{24AFE612-74AD-4B6F-8D78-7C42EB8A6CD6}" type="datetimeFigureOut">
               <a:rPr lang="en-US" smtClean="0"/>
-              <a:t>7/30/20</a:t>
+              <a:t>8/13/20</a:t>
             </a:fld>
             <a:endParaRPr lang="en-US"/>
           </a:p>
@@ -3233,7 +3233,7 @@
           <a:p>
             <a:fld id="{24AFE612-74AD-4B6F-8D78-7C42EB8A6CD6}" type="datetimeFigureOut">
               <a:rPr lang="en-US" smtClean="0"/>
-              <a:t>7/30/20</a:t>
+              <a:t>8/13/20</a:t>
             </a:fld>
             <a:endParaRPr lang="en-US"/>
           </a:p>
@@ -3351,7 +3351,7 @@
           <a:p>
             <a:fld id="{24AFE612-74AD-4B6F-8D78-7C42EB8A6CD6}" type="datetimeFigureOut">
               <a:rPr lang="en-US" smtClean="0"/>
-              <a:t>7/30/20</a:t>
+              <a:t>8/13/20</a:t>
             </a:fld>
             <a:endParaRPr lang="en-US"/>
           </a:p>
@@ -3446,7 +3446,7 @@
           <a:p>
             <a:fld id="{24AFE612-74AD-4B6F-8D78-7C42EB8A6CD6}" type="datetimeFigureOut">
               <a:rPr lang="en-US" smtClean="0"/>
-              <a:t>7/30/20</a:t>
+              <a:t>8/13/20</a:t>
             </a:fld>
             <a:endParaRPr lang="en-US"/>
           </a:p>
@@ -3723,7 +3723,7 @@
           <a:p>
             <a:fld id="{24AFE612-74AD-4B6F-8D78-7C42EB8A6CD6}" type="datetimeFigureOut">
               <a:rPr lang="en-US" smtClean="0"/>
-              <a:t>7/30/20</a:t>
+              <a:t>8/13/20</a:t>
             </a:fld>
             <a:endParaRPr lang="en-US"/>
           </a:p>
@@ -3980,7 +3980,7 @@
           <a:p>
             <a:fld id="{24AFE612-74AD-4B6F-8D78-7C42EB8A6CD6}" type="datetimeFigureOut">
               <a:rPr lang="en-US" smtClean="0"/>
-              <a:t>7/30/20</a:t>
+              <a:t>8/13/20</a:t>
             </a:fld>
             <a:endParaRPr lang="en-US"/>
           </a:p>
@@ -4150,7 +4150,7 @@
           <a:p>
             <a:fld id="{24AFE612-74AD-4B6F-8D78-7C42EB8A6CD6}" type="datetimeFigureOut">
               <a:rPr lang="en-US" smtClean="0"/>
-              <a:t>7/30/20</a:t>
+              <a:t>8/13/20</a:t>
             </a:fld>
             <a:endParaRPr lang="en-US"/>
           </a:p>
@@ -4330,7 +4330,7 @@
           <a:p>
             <a:fld id="{24AFE612-74AD-4B6F-8D78-7C42EB8A6CD6}" type="datetimeFigureOut">
               <a:rPr lang="en-US" smtClean="0"/>
-              <a:t>7/30/20</a:t>
+              <a:t>8/13/20</a:t>
             </a:fld>
             <a:endParaRPr lang="en-US"/>
           </a:p>
@@ -7589,7 +7589,7 @@
           <a:p>
             <a:fld id="{24AFE612-74AD-4B6F-8D78-7C42EB8A6CD6}" type="datetimeFigureOut">
               <a:rPr lang="en-US" smtClean="0"/>
-              <a:t>7/30/20</a:t>
+              <a:t>8/13/20</a:t>
             </a:fld>
             <a:endParaRPr lang="en-US"/>
           </a:p>
@@ -9938,7 +9938,7 @@
                 </a:ln>
                 <a:extLst>
                   <a:ext uri="{91240B29-F687-4f45-9708-019B960494DF}">
-                    <a14:hiddenLine xmlns:a14="http://schemas.microsoft.com/office/drawing/2010/main" xmlns="" w="9525">
+                    <a14:hiddenLine xmlns="" xmlns:a14="http://schemas.microsoft.com/office/drawing/2010/main" w="9525">
                       <a:solidFill>
                         <a:srgbClr val="000000"/>
                       </a:solidFill>
@@ -10091,7 +10091,7 @@
                 </a:ln>
                 <a:extLst>
                   <a:ext uri="{91240B29-F687-4f45-9708-019B960494DF}">
-                    <a14:hiddenLine xmlns:a14="http://schemas.microsoft.com/office/drawing/2010/main" xmlns="" w="9525">
+                    <a14:hiddenLine xmlns="" xmlns:a14="http://schemas.microsoft.com/office/drawing/2010/main" w="9525">
                       <a:solidFill>
                         <a:srgbClr val="000000"/>
                       </a:solidFill>
@@ -10244,7 +10244,7 @@
                 </a:ln>
                 <a:extLst>
                   <a:ext uri="{91240B29-F687-4f45-9708-019B960494DF}">
-                    <a14:hiddenLine xmlns:a14="http://schemas.microsoft.com/office/drawing/2010/main" xmlns="" w="9525">
+                    <a14:hiddenLine xmlns="" xmlns:a14="http://schemas.microsoft.com/office/drawing/2010/main" w="9525">
                       <a:solidFill>
                         <a:srgbClr val="000000"/>
                       </a:solidFill>
@@ -10397,7 +10397,7 @@
                 </a:ln>
                 <a:extLst>
                   <a:ext uri="{91240B29-F687-4f45-9708-019B960494DF}">
-                    <a14:hiddenLine xmlns:a14="http://schemas.microsoft.com/office/drawing/2010/main" xmlns="" w="9525">
+                    <a14:hiddenLine xmlns="" xmlns:a14="http://schemas.microsoft.com/office/drawing/2010/main" w="9525">
                       <a:solidFill>
                         <a:srgbClr val="000000"/>
                       </a:solidFill>
@@ -10550,7 +10550,7 @@
                 </a:ln>
                 <a:extLst>
                   <a:ext uri="{91240B29-F687-4f45-9708-019B960494DF}">
-                    <a14:hiddenLine xmlns:a14="http://schemas.microsoft.com/office/drawing/2010/main" xmlns="" w="9525">
+                    <a14:hiddenLine xmlns="" xmlns:a14="http://schemas.microsoft.com/office/drawing/2010/main" w="9525">
                       <a:solidFill>
                         <a:srgbClr val="000000"/>
                       </a:solidFill>
@@ -10703,7 +10703,7 @@
                 </a:ln>
                 <a:extLst>
                   <a:ext uri="{91240B29-F687-4f45-9708-019B960494DF}">
-                    <a14:hiddenLine xmlns:a14="http://schemas.microsoft.com/office/drawing/2010/main" xmlns="" w="9525">
+                    <a14:hiddenLine xmlns="" xmlns:a14="http://schemas.microsoft.com/office/drawing/2010/main" w="9525">
                       <a:solidFill>
                         <a:srgbClr val="000000"/>
                       </a:solidFill>
@@ -10856,7 +10856,7 @@
                 </a:ln>
                 <a:extLst>
                   <a:ext uri="{91240B29-F687-4f45-9708-019B960494DF}">
-                    <a14:hiddenLine xmlns:a14="http://schemas.microsoft.com/office/drawing/2010/main" xmlns="" w="9525">
+                    <a14:hiddenLine xmlns="" xmlns:a14="http://schemas.microsoft.com/office/drawing/2010/main" w="9525">
                       <a:solidFill>
                         <a:srgbClr val="000000"/>
                       </a:solidFill>
@@ -11009,7 +11009,7 @@
                 </a:ln>
                 <a:extLst>
                   <a:ext uri="{91240B29-F687-4f45-9708-019B960494DF}">
-                    <a14:hiddenLine xmlns:a14="http://schemas.microsoft.com/office/drawing/2010/main" xmlns="" w="9525">
+                    <a14:hiddenLine xmlns="" xmlns:a14="http://schemas.microsoft.com/office/drawing/2010/main" w="9525">
                       <a:solidFill>
                         <a:srgbClr val="000000"/>
                       </a:solidFill>
@@ -11162,7 +11162,7 @@
                 </a:ln>
                 <a:extLst>
                   <a:ext uri="{91240B29-F687-4f45-9708-019B960494DF}">
-                    <a14:hiddenLine xmlns:a14="http://schemas.microsoft.com/office/drawing/2010/main" xmlns="" w="9525">
+                    <a14:hiddenLine xmlns="" xmlns:a14="http://schemas.microsoft.com/office/drawing/2010/main" w="9525">
                       <a:solidFill>
                         <a:srgbClr val="000000"/>
                       </a:solidFill>
@@ -11315,7 +11315,7 @@
                 </a:ln>
                 <a:extLst>
                   <a:ext uri="{91240B29-F687-4f45-9708-019B960494DF}">
-                    <a14:hiddenLine xmlns:a14="http://schemas.microsoft.com/office/drawing/2010/main" xmlns="" w="9525">
+                    <a14:hiddenLine xmlns="" xmlns:a14="http://schemas.microsoft.com/office/drawing/2010/main" w="9525">
                       <a:solidFill>
                         <a:srgbClr val="000000"/>
                       </a:solidFill>
@@ -11468,7 +11468,7 @@
                 </a:ln>
                 <a:extLst>
                   <a:ext uri="{91240B29-F687-4f45-9708-019B960494DF}">
-                    <a14:hiddenLine xmlns:a14="http://schemas.microsoft.com/office/drawing/2010/main" xmlns="" w="9525">
+                    <a14:hiddenLine xmlns="" xmlns:a14="http://schemas.microsoft.com/office/drawing/2010/main" w="9525">
                       <a:solidFill>
                         <a:srgbClr val="000000"/>
                       </a:solidFill>
@@ -11621,7 +11621,7 @@
                 </a:ln>
                 <a:extLst>
                   <a:ext uri="{91240B29-F687-4f45-9708-019B960494DF}">
-                    <a14:hiddenLine xmlns:a14="http://schemas.microsoft.com/office/drawing/2010/main" xmlns="" w="9525">
+                    <a14:hiddenLine xmlns="" xmlns:a14="http://schemas.microsoft.com/office/drawing/2010/main" w="9525">
                       <a:solidFill>
                         <a:srgbClr val="000000"/>
                       </a:solidFill>
@@ -11945,7 +11945,7 @@
           </a:ln>
           <a:extLst>
             <a:ext uri="{91240B29-F687-4f45-9708-019B960494DF}">
-              <a14:hiddenLine xmlns="" xmlns:a14="http://schemas.microsoft.com/office/drawing/2010/main" w="9525">
+              <a14:hiddenLine xmlns:a14="http://schemas.microsoft.com/office/drawing/2010/main" xmlns="" w="9525">
                 <a:solidFill>
                   <a:srgbClr val="000000"/>
                 </a:solidFill>
@@ -12046,7 +12046,7 @@
         <p:spPr>
           <a:xfrm>
             <a:off x="7054623" y="8586626"/>
-            <a:ext cx="3997239" cy="4335744"/>
+            <a:ext cx="3997239" cy="4449436"/>
           </a:xfrm>
           <a:prstGeom prst="roundRect">
             <a:avLst>
@@ -12113,14 +12113,14 @@
           </a:ln>
           <a:extLst>
             <a:ext uri="{909E8E84-426E-40dd-AFC4-6F175D3DCCD1}">
-              <a14:hiddenFill xmlns="" xmlns:a14="http://schemas.microsoft.com/office/drawing/2010/main">
+              <a14:hiddenFill xmlns:a14="http://schemas.microsoft.com/office/drawing/2010/main" xmlns="">
                 <a:solidFill>
                   <a:srgbClr val="FFFFFF"/>
                 </a:solidFill>
               </a14:hiddenFill>
             </a:ext>
             <a:ext uri="{91240B29-F687-4f45-9708-019B960494DF}">
-              <a14:hiddenLine xmlns="" xmlns:a14="http://schemas.microsoft.com/office/drawing/2010/main" w="9525">
+              <a14:hiddenLine xmlns:a14="http://schemas.microsoft.com/office/drawing/2010/main" xmlns="" w="9525">
                 <a:solidFill>
                   <a:srgbClr val="000000"/>
                 </a:solidFill>
@@ -13337,7 +13337,7 @@
           </a:ln>
           <a:extLst>
             <a:ext uri="{91240B29-F687-4f45-9708-019B960494DF}">
-              <a14:hiddenLine xmlns="" xmlns:a14="http://schemas.microsoft.com/office/drawing/2010/main" w="9525">
+              <a14:hiddenLine xmlns:a14="http://schemas.microsoft.com/office/drawing/2010/main" xmlns="" w="9525">
                 <a:solidFill>
                   <a:srgbClr val="000000"/>
                 </a:solidFill>
@@ -13619,7 +13619,7 @@
           </a:ln>
           <a:extLst>
             <a:ext uri="{91240B29-F687-4f45-9708-019B960494DF}">
-              <a14:hiddenLine xmlns="" xmlns:a14="http://schemas.microsoft.com/office/drawing/2010/main" w="9525">
+              <a14:hiddenLine xmlns:a14="http://schemas.microsoft.com/office/drawing/2010/main" xmlns="" w="9525">
                 <a:solidFill>
                   <a:srgbClr val="000000"/>
                 </a:solidFill>
@@ -14413,7 +14413,7 @@
             </a:ln>
             <a:extLst>
               <a:ext uri="{91240B29-F687-4f45-9708-019B960494DF}">
-                <a14:hiddenLine xmlns="" xmlns:a14="http://schemas.microsoft.com/office/drawing/2010/main" w="9525">
+                <a14:hiddenLine xmlns:a14="http://schemas.microsoft.com/office/drawing/2010/main" xmlns="" w="9525">
                   <a:solidFill>
                     <a:srgbClr val="000000"/>
                   </a:solidFill>
@@ -14473,14 +14473,14 @@
             </a:ln>
             <a:extLst>
               <a:ext uri="{909E8E84-426E-40dd-AFC4-6F175D3DCCD1}">
-                <a14:hiddenFill xmlns="" xmlns:a14="http://schemas.microsoft.com/office/drawing/2010/main">
+                <a14:hiddenFill xmlns:a14="http://schemas.microsoft.com/office/drawing/2010/main" xmlns="">
                   <a:solidFill>
                     <a:srgbClr val="FFFFFF"/>
                   </a:solidFill>
                 </a14:hiddenFill>
               </a:ext>
               <a:ext uri="{91240B29-F687-4f45-9708-019B960494DF}">
-                <a14:hiddenLine xmlns="" xmlns:a14="http://schemas.microsoft.com/office/drawing/2010/main" w="9525">
+                <a14:hiddenLine xmlns:a14="http://schemas.microsoft.com/office/drawing/2010/main" xmlns="" w="9525">
                   <a:solidFill>
                     <a:srgbClr val="000000"/>
                   </a:solidFill>
@@ -14609,7 +14609,7 @@
             </a:ln>
             <a:extLst>
               <a:ext uri="{91240B29-F687-4f45-9708-019B960494DF}">
-                <a14:hiddenLine xmlns="" xmlns:a14="http://schemas.microsoft.com/office/drawing/2010/main" w="9525">
+                <a14:hiddenLine xmlns:a14="http://schemas.microsoft.com/office/drawing/2010/main" xmlns="" w="9525">
                   <a:solidFill>
                     <a:srgbClr val="000000"/>
                   </a:solidFill>
@@ -14754,7 +14754,7 @@
             </a:ln>
             <a:extLst>
               <a:ext uri="{91240B29-F687-4f45-9708-019B960494DF}">
-                <a14:hiddenLine xmlns="" xmlns:a14="http://schemas.microsoft.com/office/drawing/2010/main" w="9525">
+                <a14:hiddenLine xmlns:a14="http://schemas.microsoft.com/office/drawing/2010/main" xmlns="" w="9525">
                   <a:solidFill>
                     <a:srgbClr val="000000"/>
                   </a:solidFill>
@@ -14963,7 +14963,7 @@
             </a:ln>
             <a:extLst>
               <a:ext uri="{91240B29-F687-4f45-9708-019B960494DF}">
-                <a14:hiddenLine xmlns="" xmlns:a14="http://schemas.microsoft.com/office/drawing/2010/main" w="9525">
+                <a14:hiddenLine xmlns:a14="http://schemas.microsoft.com/office/drawing/2010/main" xmlns="" w="9525">
                   <a:solidFill>
                     <a:srgbClr val="000000"/>
                   </a:solidFill>
@@ -15123,7 +15123,7 @@
           </a:ln>
           <a:extLst>
             <a:ext uri="{91240B29-F687-4f45-9708-019B960494DF}">
-              <a14:hiddenLine xmlns="" xmlns:a14="http://schemas.microsoft.com/office/drawing/2010/main" w="9525">
+              <a14:hiddenLine xmlns:a14="http://schemas.microsoft.com/office/drawing/2010/main" xmlns="" w="9525">
                 <a:solidFill>
                   <a:srgbClr val="000000"/>
                 </a:solidFill>
@@ -15309,7 +15309,7 @@
           </a:ln>
           <a:extLst>
             <a:ext uri="{91240B29-F687-4f45-9708-019B960494DF}">
-              <a14:hiddenLine xmlns="" xmlns:a14="http://schemas.microsoft.com/office/drawing/2010/main" w="9525">
+              <a14:hiddenLine xmlns:a14="http://schemas.microsoft.com/office/drawing/2010/main" xmlns="" w="9525">
                 <a:solidFill>
                   <a:srgbClr val="000000"/>
                 </a:solidFill>
@@ -15528,7 +15528,7 @@
           </a:ln>
           <a:extLst>
             <a:ext uri="{91240B29-F687-4f45-9708-019B960494DF}">
-              <a14:hiddenLine xmlns="" xmlns:a14="http://schemas.microsoft.com/office/drawing/2010/main" w="9525">
+              <a14:hiddenLine xmlns:a14="http://schemas.microsoft.com/office/drawing/2010/main" xmlns="" w="9525">
                 <a:solidFill>
                   <a:srgbClr val="000000"/>
                 </a:solidFill>
@@ -15737,7 +15737,7 @@
           </a:ln>
           <a:extLst>
             <a:ext uri="{91240B29-F687-4f45-9708-019B960494DF}">
-              <a14:hiddenLine xmlns="" xmlns:a14="http://schemas.microsoft.com/office/drawing/2010/main" w="9525">
+              <a14:hiddenLine xmlns:a14="http://schemas.microsoft.com/office/drawing/2010/main" xmlns="" w="9525">
                 <a:solidFill>
                   <a:srgbClr val="000000"/>
                 </a:solidFill>
@@ -16229,7 +16229,7 @@
             </a:ln>
             <a:extLst>
               <a:ext uri="{91240B29-F687-4f45-9708-019B960494DF}">
-                <a14:hiddenLine xmlns="" xmlns:a14="http://schemas.microsoft.com/office/drawing/2010/main" w="9525">
+                <a14:hiddenLine xmlns:a14="http://schemas.microsoft.com/office/drawing/2010/main" xmlns="" w="9525">
                   <a:solidFill>
                     <a:srgbClr val="000000"/>
                   </a:solidFill>
@@ -16289,14 +16289,14 @@
             </a:ln>
             <a:extLst>
               <a:ext uri="{909E8E84-426E-40dd-AFC4-6F175D3DCCD1}">
-                <a14:hiddenFill xmlns="" xmlns:a14="http://schemas.microsoft.com/office/drawing/2010/main">
+                <a14:hiddenFill xmlns:a14="http://schemas.microsoft.com/office/drawing/2010/main" xmlns="">
                   <a:solidFill>
                     <a:srgbClr val="FFFFFF"/>
                   </a:solidFill>
                 </a14:hiddenFill>
               </a:ext>
               <a:ext uri="{91240B29-F687-4f45-9708-019B960494DF}">
-                <a14:hiddenLine xmlns="" xmlns:a14="http://schemas.microsoft.com/office/drawing/2010/main" w="9525">
+                <a14:hiddenLine xmlns:a14="http://schemas.microsoft.com/office/drawing/2010/main" xmlns="" w="9525">
                   <a:solidFill>
                     <a:srgbClr val="000000"/>
                   </a:solidFill>
@@ -16425,7 +16425,7 @@
             </a:ln>
             <a:extLst>
               <a:ext uri="{91240B29-F687-4f45-9708-019B960494DF}">
-                <a14:hiddenLine xmlns="" xmlns:a14="http://schemas.microsoft.com/office/drawing/2010/main" w="9525">
+                <a14:hiddenLine xmlns:a14="http://schemas.microsoft.com/office/drawing/2010/main" xmlns="" w="9525">
                   <a:solidFill>
                     <a:srgbClr val="000000"/>
                   </a:solidFill>
@@ -16570,7 +16570,7 @@
             </a:ln>
             <a:extLst>
               <a:ext uri="{91240B29-F687-4f45-9708-019B960494DF}">
-                <a14:hiddenLine xmlns="" xmlns:a14="http://schemas.microsoft.com/office/drawing/2010/main" w="9525">
+                <a14:hiddenLine xmlns:a14="http://schemas.microsoft.com/office/drawing/2010/main" xmlns="" w="9525">
                   <a:solidFill>
                     <a:srgbClr val="000000"/>
                   </a:solidFill>
@@ -16779,7 +16779,7 @@
             </a:ln>
             <a:extLst>
               <a:ext uri="{91240B29-F687-4f45-9708-019B960494DF}">
-                <a14:hiddenLine xmlns="" xmlns:a14="http://schemas.microsoft.com/office/drawing/2010/main" w="9525">
+                <a14:hiddenLine xmlns:a14="http://schemas.microsoft.com/office/drawing/2010/main" xmlns="" w="9525">
                   <a:solidFill>
                     <a:srgbClr val="000000"/>
                   </a:solidFill>
@@ -16862,14 +16862,14 @@
             </a:ln>
             <a:extLst>
               <a:ext uri="{909E8E84-426E-40dd-AFC4-6F175D3DCCD1}">
-                <a14:hiddenFill xmlns="" xmlns:a14="http://schemas.microsoft.com/office/drawing/2010/main">
+                <a14:hiddenFill xmlns:a14="http://schemas.microsoft.com/office/drawing/2010/main" xmlns="">
                   <a:solidFill>
                     <a:srgbClr val="FFFFFF"/>
                   </a:solidFill>
                 </a14:hiddenFill>
               </a:ext>
               <a:ext uri="{91240B29-F687-4f45-9708-019B960494DF}">
-                <a14:hiddenLine xmlns="" xmlns:a14="http://schemas.microsoft.com/office/drawing/2010/main" w="9525">
+                <a14:hiddenLine xmlns:a14="http://schemas.microsoft.com/office/drawing/2010/main" xmlns="" w="9525">
                   <a:solidFill>
                     <a:srgbClr val="000000"/>
                   </a:solidFill>
@@ -17028,7 +17028,7 @@
             </a:ln>
             <a:extLst>
               <a:ext uri="{91240B29-F687-4f45-9708-019B960494DF}">
-                <a14:hiddenLine xmlns="" xmlns:a14="http://schemas.microsoft.com/office/drawing/2010/main" w="9525">
+                <a14:hiddenLine xmlns:a14="http://schemas.microsoft.com/office/drawing/2010/main" xmlns="" w="9525">
                   <a:solidFill>
                     <a:srgbClr val="000000"/>
                   </a:solidFill>
@@ -17214,7 +17214,7 @@
             </a:ln>
             <a:extLst>
               <a:ext uri="{91240B29-F687-4f45-9708-019B960494DF}">
-                <a14:hiddenLine xmlns="" xmlns:a14="http://schemas.microsoft.com/office/drawing/2010/main" w="9525">
+                <a14:hiddenLine xmlns:a14="http://schemas.microsoft.com/office/drawing/2010/main" xmlns="" w="9525">
                   <a:solidFill>
                     <a:srgbClr val="000000"/>
                   </a:solidFill>
@@ -17420,7 +17420,7 @@
             </a:ln>
             <a:extLst>
               <a:ext uri="{91240B29-F687-4f45-9708-019B960494DF}">
-                <a14:hiddenLine xmlns="" xmlns:a14="http://schemas.microsoft.com/office/drawing/2010/main" w="9525">
+                <a14:hiddenLine xmlns:a14="http://schemas.microsoft.com/office/drawing/2010/main" xmlns="" w="9525">
                   <a:solidFill>
                     <a:srgbClr val="000000"/>
                   </a:solidFill>
@@ -17629,7 +17629,7 @@
             </a:ln>
             <a:extLst>
               <a:ext uri="{91240B29-F687-4f45-9708-019B960494DF}">
-                <a14:hiddenLine xmlns="" xmlns:a14="http://schemas.microsoft.com/office/drawing/2010/main" w="9525">
+                <a14:hiddenLine xmlns:a14="http://schemas.microsoft.com/office/drawing/2010/main" xmlns="" w="9525">
                   <a:solidFill>
                     <a:srgbClr val="000000"/>
                   </a:solidFill>
@@ -17712,14 +17712,14 @@
             </a:ln>
             <a:extLst>
               <a:ext uri="{909E8E84-426E-40dd-AFC4-6F175D3DCCD1}">
-                <a14:hiddenFill xmlns="" xmlns:a14="http://schemas.microsoft.com/office/drawing/2010/main">
+                <a14:hiddenFill xmlns:a14="http://schemas.microsoft.com/office/drawing/2010/main" xmlns="">
                   <a:solidFill>
                     <a:srgbClr val="FFFFFF"/>
                   </a:solidFill>
                 </a14:hiddenFill>
               </a:ext>
               <a:ext uri="{91240B29-F687-4f45-9708-019B960494DF}">
-                <a14:hiddenLine xmlns="" xmlns:a14="http://schemas.microsoft.com/office/drawing/2010/main" w="9525">
+                <a14:hiddenLine xmlns:a14="http://schemas.microsoft.com/office/drawing/2010/main" xmlns="" w="9525">
                   <a:solidFill>
                     <a:srgbClr val="000000"/>
                   </a:solidFill>
@@ -17878,7 +17878,7 @@
             </a:ln>
             <a:extLst>
               <a:ext uri="{91240B29-F687-4f45-9708-019B960494DF}">
-                <a14:hiddenLine xmlns="" xmlns:a14="http://schemas.microsoft.com/office/drawing/2010/main" w="9525">
+                <a14:hiddenLine xmlns:a14="http://schemas.microsoft.com/office/drawing/2010/main" xmlns="" w="9525">
                   <a:solidFill>
                     <a:srgbClr val="000000"/>
                   </a:solidFill>
@@ -18064,7 +18064,7 @@
             </a:ln>
             <a:extLst>
               <a:ext uri="{91240B29-F687-4f45-9708-019B960494DF}">
-                <a14:hiddenLine xmlns="" xmlns:a14="http://schemas.microsoft.com/office/drawing/2010/main" w="9525">
+                <a14:hiddenLine xmlns:a14="http://schemas.microsoft.com/office/drawing/2010/main" xmlns="" w="9525">
                   <a:solidFill>
                     <a:srgbClr val="000000"/>
                   </a:solidFill>
@@ -18283,7 +18283,7 @@
             </a:ln>
             <a:extLst>
               <a:ext uri="{91240B29-F687-4f45-9708-019B960494DF}">
-                <a14:hiddenLine xmlns="" xmlns:a14="http://schemas.microsoft.com/office/drawing/2010/main" w="9525">
+                <a14:hiddenLine xmlns:a14="http://schemas.microsoft.com/office/drawing/2010/main" xmlns="" w="9525">
                   <a:solidFill>
                     <a:srgbClr val="000000"/>
                   </a:solidFill>
@@ -18492,7 +18492,7 @@
             </a:ln>
             <a:extLst>
               <a:ext uri="{91240B29-F687-4f45-9708-019B960494DF}">
-                <a14:hiddenLine xmlns="" xmlns:a14="http://schemas.microsoft.com/office/drawing/2010/main" w="9525">
+                <a14:hiddenLine xmlns:a14="http://schemas.microsoft.com/office/drawing/2010/main" xmlns="" w="9525">
                   <a:solidFill>
                     <a:srgbClr val="000000"/>
                   </a:solidFill>
@@ -18573,14 +18573,14 @@
             </a:ln>
             <a:extLst>
               <a:ext uri="{909E8E84-426E-40dd-AFC4-6F175D3DCCD1}">
-                <a14:hiddenFill xmlns:a14="http://schemas.microsoft.com/office/drawing/2010/main" xmlns="">
+                <a14:hiddenFill xmlns="" xmlns:a14="http://schemas.microsoft.com/office/drawing/2010/main">
                   <a:solidFill>
                     <a:srgbClr val="FFFFFF"/>
                   </a:solidFill>
                 </a14:hiddenFill>
               </a:ext>
               <a:ext uri="{91240B29-F687-4f45-9708-019B960494DF}">
-                <a14:hiddenLine xmlns:a14="http://schemas.microsoft.com/office/drawing/2010/main" xmlns="" w="9525">
+                <a14:hiddenLine xmlns="" xmlns:a14="http://schemas.microsoft.com/office/drawing/2010/main" w="9525">
                   <a:solidFill>
                     <a:srgbClr val="000000"/>
                   </a:solidFill>
@@ -18736,7 +18736,7 @@
             </a:ln>
             <a:extLst>
               <a:ext uri="{91240B29-F687-4f45-9708-019B960494DF}">
-                <a14:hiddenLine xmlns:a14="http://schemas.microsoft.com/office/drawing/2010/main" xmlns="" w="9525">
+                <a14:hiddenLine xmlns="" xmlns:a14="http://schemas.microsoft.com/office/drawing/2010/main" w="9525">
                   <a:solidFill>
                     <a:srgbClr val="000000"/>
                   </a:solidFill>
@@ -18852,14 +18852,14 @@
             </a:ln>
             <a:extLst>
               <a:ext uri="{909E8E84-426E-40dd-AFC4-6F175D3DCCD1}">
-                <a14:hiddenFill xmlns:a14="http://schemas.microsoft.com/office/drawing/2010/main" xmlns="">
+                <a14:hiddenFill xmlns="" xmlns:a14="http://schemas.microsoft.com/office/drawing/2010/main">
                   <a:solidFill>
                     <a:srgbClr val="FFFFFF"/>
                   </a:solidFill>
                 </a14:hiddenFill>
               </a:ext>
               <a:ext uri="{91240B29-F687-4f45-9708-019B960494DF}">
-                <a14:hiddenLine xmlns:a14="http://schemas.microsoft.com/office/drawing/2010/main" xmlns="" w="9525">
+                <a14:hiddenLine xmlns="" xmlns:a14="http://schemas.microsoft.com/office/drawing/2010/main" w="9525">
                   <a:solidFill>
                     <a:srgbClr val="000000"/>
                   </a:solidFill>
@@ -19015,7 +19015,7 @@
             </a:ln>
             <a:extLst>
               <a:ext uri="{91240B29-F687-4f45-9708-019B960494DF}">
-                <a14:hiddenLine xmlns:a14="http://schemas.microsoft.com/office/drawing/2010/main" xmlns="" w="9525">
+                <a14:hiddenLine xmlns="" xmlns:a14="http://schemas.microsoft.com/office/drawing/2010/main" w="9525">
                   <a:solidFill>
                     <a:srgbClr val="000000"/>
                   </a:solidFill>
@@ -19198,7 +19198,7 @@
             </a:ln>
             <a:extLst>
               <a:ext uri="{91240B29-F687-4f45-9708-019B960494DF}">
-                <a14:hiddenLine xmlns:a14="http://schemas.microsoft.com/office/drawing/2010/main" xmlns="" w="9525">
+                <a14:hiddenLine xmlns="" xmlns:a14="http://schemas.microsoft.com/office/drawing/2010/main" w="9525">
                   <a:solidFill>
                     <a:srgbClr val="000000"/>
                   </a:solidFill>
@@ -19356,7 +19356,7 @@
             </a:ln>
             <a:extLst>
               <a:ext uri="{91240B29-F687-4f45-9708-019B960494DF}">
-                <a14:hiddenLine xmlns:a14="http://schemas.microsoft.com/office/drawing/2010/main" xmlns="" w="9525">
+                <a14:hiddenLine xmlns="" xmlns:a14="http://schemas.microsoft.com/office/drawing/2010/main" w="9525">
                   <a:solidFill>
                     <a:srgbClr val="000000"/>
                   </a:solidFill>
@@ -19562,7 +19562,7 @@
             </a:ln>
             <a:extLst>
               <a:ext uri="{91240B29-F687-4f45-9708-019B960494DF}">
-                <a14:hiddenLine xmlns:a14="http://schemas.microsoft.com/office/drawing/2010/main" xmlns="" w="9525">
+                <a14:hiddenLine xmlns="" xmlns:a14="http://schemas.microsoft.com/office/drawing/2010/main" w="9525">
                   <a:solidFill>
                     <a:srgbClr val="000000"/>
                   </a:solidFill>
@@ -19911,14 +19911,14 @@
             </a:ln>
             <a:extLst>
               <a:ext uri="{909E8E84-426E-40dd-AFC4-6F175D3DCCD1}">
-                <a14:hiddenFill xmlns:a14="http://schemas.microsoft.com/office/drawing/2010/main" xmlns="">
+                <a14:hiddenFill xmlns="" xmlns:a14="http://schemas.microsoft.com/office/drawing/2010/main">
                   <a:solidFill>
                     <a:srgbClr val="FFFFFF"/>
                   </a:solidFill>
                 </a14:hiddenFill>
               </a:ext>
               <a:ext uri="{91240B29-F687-4f45-9708-019B960494DF}">
-                <a14:hiddenLine xmlns:a14="http://schemas.microsoft.com/office/drawing/2010/main" xmlns="" w="9525">
+                <a14:hiddenLine xmlns="" xmlns:a14="http://schemas.microsoft.com/office/drawing/2010/main" w="9525">
                   <a:solidFill>
                     <a:srgbClr val="000000"/>
                   </a:solidFill>
@@ -20074,7 +20074,7 @@
             </a:ln>
             <a:extLst>
               <a:ext uri="{91240B29-F687-4f45-9708-019B960494DF}">
-                <a14:hiddenLine xmlns:a14="http://schemas.microsoft.com/office/drawing/2010/main" xmlns="" w="9525">
+                <a14:hiddenLine xmlns="" xmlns:a14="http://schemas.microsoft.com/office/drawing/2010/main" w="9525">
                   <a:solidFill>
                     <a:srgbClr val="000000"/>
                   </a:solidFill>
@@ -20154,14 +20154,14 @@
             </a:ln>
             <a:extLst>
               <a:ext uri="{909E8E84-426E-40dd-AFC4-6F175D3DCCD1}">
-                <a14:hiddenFill xmlns="" xmlns:a14="http://schemas.microsoft.com/office/drawing/2010/main">
+                <a14:hiddenFill xmlns:a14="http://schemas.microsoft.com/office/drawing/2010/main" xmlns="">
                   <a:solidFill>
                     <a:srgbClr val="FFFFFF"/>
                   </a:solidFill>
                 </a14:hiddenFill>
               </a:ext>
               <a:ext uri="{91240B29-F687-4f45-9708-019B960494DF}">
-                <a14:hiddenLine xmlns="" xmlns:a14="http://schemas.microsoft.com/office/drawing/2010/main" w="9525">
+                <a14:hiddenLine xmlns:a14="http://schemas.microsoft.com/office/drawing/2010/main" xmlns="" w="9525">
                   <a:solidFill>
                     <a:srgbClr val="000000"/>
                   </a:solidFill>
@@ -20320,7 +20320,7 @@
             </a:ln>
             <a:extLst>
               <a:ext uri="{91240B29-F687-4f45-9708-019B960494DF}">
-                <a14:hiddenLine xmlns="" xmlns:a14="http://schemas.microsoft.com/office/drawing/2010/main" w="9525">
+                <a14:hiddenLine xmlns:a14="http://schemas.microsoft.com/office/drawing/2010/main" xmlns="" w="9525">
                   <a:solidFill>
                     <a:srgbClr val="000000"/>
                   </a:solidFill>
@@ -20506,7 +20506,7 @@
             </a:ln>
             <a:extLst>
               <a:ext uri="{91240B29-F687-4f45-9708-019B960494DF}">
-                <a14:hiddenLine xmlns="" xmlns:a14="http://schemas.microsoft.com/office/drawing/2010/main" w="9525">
+                <a14:hiddenLine xmlns:a14="http://schemas.microsoft.com/office/drawing/2010/main" xmlns="" w="9525">
                   <a:solidFill>
                     <a:srgbClr val="000000"/>
                   </a:solidFill>
@@ -20725,7 +20725,7 @@
             </a:ln>
             <a:extLst>
               <a:ext uri="{91240B29-F687-4f45-9708-019B960494DF}">
-                <a14:hiddenLine xmlns="" xmlns:a14="http://schemas.microsoft.com/office/drawing/2010/main" w="9525">
+                <a14:hiddenLine xmlns:a14="http://schemas.microsoft.com/office/drawing/2010/main" xmlns="" w="9525">
                   <a:solidFill>
                     <a:srgbClr val="000000"/>
                   </a:solidFill>
@@ -20934,7 +20934,7 @@
             </a:ln>
             <a:extLst>
               <a:ext uri="{91240B29-F687-4f45-9708-019B960494DF}">
-                <a14:hiddenLine xmlns="" xmlns:a14="http://schemas.microsoft.com/office/drawing/2010/main" w="9525">
+                <a14:hiddenLine xmlns:a14="http://schemas.microsoft.com/office/drawing/2010/main" xmlns="" w="9525">
                   <a:solidFill>
                     <a:srgbClr val="000000"/>
                   </a:solidFill>
@@ -21015,14 +21015,14 @@
             </a:ln>
             <a:extLst>
               <a:ext uri="{909E8E84-426E-40dd-AFC4-6F175D3DCCD1}">
-                <a14:hiddenFill xmlns:a14="http://schemas.microsoft.com/office/drawing/2010/main" xmlns="">
+                <a14:hiddenFill xmlns="" xmlns:a14="http://schemas.microsoft.com/office/drawing/2010/main">
                   <a:solidFill>
                     <a:srgbClr val="FFFFFF"/>
                   </a:solidFill>
                 </a14:hiddenFill>
               </a:ext>
               <a:ext uri="{91240B29-F687-4f45-9708-019B960494DF}">
-                <a14:hiddenLine xmlns:a14="http://schemas.microsoft.com/office/drawing/2010/main" xmlns="" w="9525">
+                <a14:hiddenLine xmlns="" xmlns:a14="http://schemas.microsoft.com/office/drawing/2010/main" w="9525">
                   <a:solidFill>
                     <a:srgbClr val="000000"/>
                   </a:solidFill>
@@ -21178,7 +21178,7 @@
             </a:ln>
             <a:extLst>
               <a:ext uri="{91240B29-F687-4f45-9708-019B960494DF}">
-                <a14:hiddenLine xmlns:a14="http://schemas.microsoft.com/office/drawing/2010/main" xmlns="" w="9525">
+                <a14:hiddenLine xmlns="" xmlns:a14="http://schemas.microsoft.com/office/drawing/2010/main" w="9525">
                   <a:solidFill>
                     <a:srgbClr val="000000"/>
                   </a:solidFill>
@@ -21333,14 +21333,14 @@
             </a:ln>
             <a:extLst>
               <a:ext uri="{909E8E84-426E-40dd-AFC4-6F175D3DCCD1}">
-                <a14:hiddenFill xmlns="" xmlns:a14="http://schemas.microsoft.com/office/drawing/2010/main">
+                <a14:hiddenFill xmlns:a14="http://schemas.microsoft.com/office/drawing/2010/main" xmlns="">
                   <a:solidFill>
                     <a:srgbClr val="FFFFFF"/>
                   </a:solidFill>
                 </a14:hiddenFill>
               </a:ext>
               <a:ext uri="{91240B29-F687-4f45-9708-019B960494DF}">
-                <a14:hiddenLine xmlns="" xmlns:a14="http://schemas.microsoft.com/office/drawing/2010/main" w="9525">
+                <a14:hiddenLine xmlns:a14="http://schemas.microsoft.com/office/drawing/2010/main" xmlns="" w="9525">
                   <a:solidFill>
                     <a:srgbClr val="000000"/>
                   </a:solidFill>
@@ -21499,7 +21499,7 @@
             </a:ln>
             <a:extLst>
               <a:ext uri="{91240B29-F687-4f45-9708-019B960494DF}">
-                <a14:hiddenLine xmlns="" xmlns:a14="http://schemas.microsoft.com/office/drawing/2010/main" w="9525">
+                <a14:hiddenLine xmlns:a14="http://schemas.microsoft.com/office/drawing/2010/main" xmlns="" w="9525">
                   <a:solidFill>
                     <a:srgbClr val="000000"/>
                   </a:solidFill>
@@ -21685,7 +21685,7 @@
             </a:ln>
             <a:extLst>
               <a:ext uri="{91240B29-F687-4f45-9708-019B960494DF}">
-                <a14:hiddenLine xmlns="" xmlns:a14="http://schemas.microsoft.com/office/drawing/2010/main" w="9525">
+                <a14:hiddenLine xmlns:a14="http://schemas.microsoft.com/office/drawing/2010/main" xmlns="" w="9525">
                   <a:solidFill>
                     <a:srgbClr val="000000"/>
                   </a:solidFill>
@@ -21891,7 +21891,7 @@
             </a:ln>
             <a:extLst>
               <a:ext uri="{91240B29-F687-4f45-9708-019B960494DF}">
-                <a14:hiddenLine xmlns="" xmlns:a14="http://schemas.microsoft.com/office/drawing/2010/main" w="9525">
+                <a14:hiddenLine xmlns:a14="http://schemas.microsoft.com/office/drawing/2010/main" xmlns="" w="9525">
                   <a:solidFill>
                     <a:srgbClr val="000000"/>
                   </a:solidFill>
@@ -22100,7 +22100,7 @@
             </a:ln>
             <a:extLst>
               <a:ext uri="{91240B29-F687-4f45-9708-019B960494DF}">
-                <a14:hiddenLine xmlns="" xmlns:a14="http://schemas.microsoft.com/office/drawing/2010/main" w="9525">
+                <a14:hiddenLine xmlns:a14="http://schemas.microsoft.com/office/drawing/2010/main" xmlns="" w="9525">
                   <a:solidFill>
                     <a:srgbClr val="000000"/>
                   </a:solidFill>
@@ -22280,7 +22280,7 @@
             </a:ln>
             <a:extLst>
               <a:ext uri="{91240B29-F687-4f45-9708-019B960494DF}">
-                <a14:hiddenLine xmlns="" xmlns:a14="http://schemas.microsoft.com/office/drawing/2010/main" w="9525">
+                <a14:hiddenLine xmlns:a14="http://schemas.microsoft.com/office/drawing/2010/main" xmlns="" w="9525">
                   <a:solidFill>
                     <a:srgbClr val="000000"/>
                   </a:solidFill>
@@ -22340,14 +22340,14 @@
             </a:ln>
             <a:extLst>
               <a:ext uri="{909E8E84-426E-40dd-AFC4-6F175D3DCCD1}">
-                <a14:hiddenFill xmlns="" xmlns:a14="http://schemas.microsoft.com/office/drawing/2010/main">
+                <a14:hiddenFill xmlns:a14="http://schemas.microsoft.com/office/drawing/2010/main" xmlns="">
                   <a:solidFill>
                     <a:srgbClr val="FFFFFF"/>
                   </a:solidFill>
                 </a14:hiddenFill>
               </a:ext>
               <a:ext uri="{91240B29-F687-4f45-9708-019B960494DF}">
-                <a14:hiddenLine xmlns="" xmlns:a14="http://schemas.microsoft.com/office/drawing/2010/main" w="9525">
+                <a14:hiddenLine xmlns:a14="http://schemas.microsoft.com/office/drawing/2010/main" xmlns="" w="9525">
                   <a:solidFill>
                     <a:srgbClr val="000000"/>
                   </a:solidFill>
@@ -22476,7 +22476,7 @@
             </a:ln>
             <a:extLst>
               <a:ext uri="{91240B29-F687-4f45-9708-019B960494DF}">
-                <a14:hiddenLine xmlns="" xmlns:a14="http://schemas.microsoft.com/office/drawing/2010/main" w="9525">
+                <a14:hiddenLine xmlns:a14="http://schemas.microsoft.com/office/drawing/2010/main" xmlns="" w="9525">
                   <a:solidFill>
                     <a:srgbClr val="000000"/>
                   </a:solidFill>
@@ -22621,7 +22621,7 @@
             </a:ln>
             <a:extLst>
               <a:ext uri="{91240B29-F687-4f45-9708-019B960494DF}">
-                <a14:hiddenLine xmlns="" xmlns:a14="http://schemas.microsoft.com/office/drawing/2010/main" w="9525">
+                <a14:hiddenLine xmlns:a14="http://schemas.microsoft.com/office/drawing/2010/main" xmlns="" w="9525">
                   <a:solidFill>
                     <a:srgbClr val="000000"/>
                   </a:solidFill>
@@ -22830,7 +22830,7 @@
             </a:ln>
             <a:extLst>
               <a:ext uri="{91240B29-F687-4f45-9708-019B960494DF}">
-                <a14:hiddenLine xmlns="" xmlns:a14="http://schemas.microsoft.com/office/drawing/2010/main" w="9525">
+                <a14:hiddenLine xmlns:a14="http://schemas.microsoft.com/office/drawing/2010/main" xmlns="" w="9525">
                   <a:solidFill>
                     <a:srgbClr val="000000"/>
                   </a:solidFill>
@@ -27568,7 +27568,7 @@
             </a:ln>
             <a:extLst>
               <a:ext uri="{91240B29-F687-4f45-9708-019B960494DF}">
-                <a14:hiddenLine xmlns="" xmlns:a14="http://schemas.microsoft.com/office/drawing/2010/main" w="9525">
+                <a14:hiddenLine xmlns:a14="http://schemas.microsoft.com/office/drawing/2010/main" xmlns="" w="9525">
                   <a:solidFill>
                     <a:srgbClr val="000000"/>
                   </a:solidFill>
@@ -29493,14 +29493,14 @@
             </a:ln>
             <a:extLst>
               <a:ext uri="{909E8E84-426E-40dd-AFC4-6F175D3DCCD1}">
-                <a14:hiddenFill xmlns="" xmlns:a14="http://schemas.microsoft.com/office/drawing/2010/main">
+                <a14:hiddenFill xmlns:a14="http://schemas.microsoft.com/office/drawing/2010/main" xmlns="">
                   <a:solidFill>
                     <a:srgbClr val="FFFFFF"/>
                   </a:solidFill>
                 </a14:hiddenFill>
               </a:ext>
               <a:ext uri="{91240B29-F687-4f45-9708-019B960494DF}">
-                <a14:hiddenLine xmlns="" xmlns:a14="http://schemas.microsoft.com/office/drawing/2010/main" w="9525">
+                <a14:hiddenLine xmlns:a14="http://schemas.microsoft.com/office/drawing/2010/main" xmlns="" w="9525">
                   <a:solidFill>
                     <a:srgbClr val="000000"/>
                   </a:solidFill>
@@ -29659,7 +29659,7 @@
             </a:ln>
             <a:extLst>
               <a:ext uri="{91240B29-F687-4f45-9708-019B960494DF}">
-                <a14:hiddenLine xmlns="" xmlns:a14="http://schemas.microsoft.com/office/drawing/2010/main" w="9525">
+                <a14:hiddenLine xmlns:a14="http://schemas.microsoft.com/office/drawing/2010/main" xmlns="" w="9525">
                   <a:solidFill>
                     <a:srgbClr val="000000"/>
                   </a:solidFill>
@@ -29817,14 +29817,14 @@
           </a:ln>
           <a:extLst>
             <a:ext uri="{909E8E84-426E-40dd-AFC4-6F175D3DCCD1}">
-              <a14:hiddenFill xmlns="" xmlns:a14="http://schemas.microsoft.com/office/drawing/2010/main">
+              <a14:hiddenFill xmlns:a14="http://schemas.microsoft.com/office/drawing/2010/main" xmlns="">
                 <a:solidFill>
                   <a:srgbClr val="FFFFFF"/>
                 </a:solidFill>
               </a14:hiddenFill>
             </a:ext>
             <a:ext uri="{91240B29-F687-4f45-9708-019B960494DF}">
-              <a14:hiddenLine xmlns="" xmlns:a14="http://schemas.microsoft.com/office/drawing/2010/main" w="9525">
+              <a14:hiddenLine xmlns:a14="http://schemas.microsoft.com/office/drawing/2010/main" xmlns="" w="9525">
                 <a:solidFill>
                   <a:srgbClr val="000000"/>
                 </a:solidFill>
@@ -30165,7 +30165,7 @@
             </a:ln>
             <a:extLst>
               <a:ext uri="{91240B29-F687-4f45-9708-019B960494DF}">
-                <a14:hiddenLine xmlns="" xmlns:a14="http://schemas.microsoft.com/office/drawing/2010/main" w="9525">
+                <a14:hiddenLine xmlns:a14="http://schemas.microsoft.com/office/drawing/2010/main" xmlns="" w="9525">
                   <a:solidFill>
                     <a:srgbClr val="000000"/>
                   </a:solidFill>
@@ -30225,14 +30225,14 @@
             </a:ln>
             <a:extLst>
               <a:ext uri="{909E8E84-426E-40dd-AFC4-6F175D3DCCD1}">
-                <a14:hiddenFill xmlns="" xmlns:a14="http://schemas.microsoft.com/office/drawing/2010/main">
+                <a14:hiddenFill xmlns:a14="http://schemas.microsoft.com/office/drawing/2010/main" xmlns="">
                   <a:solidFill>
                     <a:srgbClr val="FFFFFF"/>
                   </a:solidFill>
                 </a14:hiddenFill>
               </a:ext>
               <a:ext uri="{91240B29-F687-4f45-9708-019B960494DF}">
-                <a14:hiddenLine xmlns="" xmlns:a14="http://schemas.microsoft.com/office/drawing/2010/main" w="9525">
+                <a14:hiddenLine xmlns:a14="http://schemas.microsoft.com/office/drawing/2010/main" xmlns="" w="9525">
                   <a:solidFill>
                     <a:srgbClr val="000000"/>
                   </a:solidFill>
@@ -30361,7 +30361,7 @@
             </a:ln>
             <a:extLst>
               <a:ext uri="{91240B29-F687-4f45-9708-019B960494DF}">
-                <a14:hiddenLine xmlns="" xmlns:a14="http://schemas.microsoft.com/office/drawing/2010/main" w="9525">
+                <a14:hiddenLine xmlns:a14="http://schemas.microsoft.com/office/drawing/2010/main" xmlns="" w="9525">
                   <a:solidFill>
                     <a:srgbClr val="000000"/>
                   </a:solidFill>
@@ -30506,7 +30506,7 @@
             </a:ln>
             <a:extLst>
               <a:ext uri="{91240B29-F687-4f45-9708-019B960494DF}">
-                <a14:hiddenLine xmlns="" xmlns:a14="http://schemas.microsoft.com/office/drawing/2010/main" w="9525">
+                <a14:hiddenLine xmlns:a14="http://schemas.microsoft.com/office/drawing/2010/main" xmlns="" w="9525">
                   <a:solidFill>
                     <a:srgbClr val="000000"/>
                   </a:solidFill>
@@ -30715,7 +30715,7 @@
             </a:ln>
             <a:extLst>
               <a:ext uri="{91240B29-F687-4f45-9708-019B960494DF}">
-                <a14:hiddenLine xmlns="" xmlns:a14="http://schemas.microsoft.com/office/drawing/2010/main" w="9525">
+                <a14:hiddenLine xmlns:a14="http://schemas.microsoft.com/office/drawing/2010/main" xmlns="" w="9525">
                   <a:solidFill>
                     <a:srgbClr val="000000"/>
                   </a:solidFill>
@@ -30902,7 +30902,7 @@
           </a:ln>
           <a:extLst>
             <a:ext uri="{91240B29-F687-4f45-9708-019B960494DF}">
-              <a14:hiddenLine xmlns="" xmlns:a14="http://schemas.microsoft.com/office/drawing/2010/main" w="9525">
+              <a14:hiddenLine xmlns:a14="http://schemas.microsoft.com/office/drawing/2010/main" xmlns="" w="9525">
                 <a:solidFill>
                   <a:srgbClr val="000000"/>
                 </a:solidFill>
@@ -31121,7 +31121,7 @@
           </a:ln>
           <a:extLst>
             <a:ext uri="{91240B29-F687-4f45-9708-019B960494DF}">
-              <a14:hiddenLine xmlns="" xmlns:a14="http://schemas.microsoft.com/office/drawing/2010/main" w="9525">
+              <a14:hiddenLine xmlns:a14="http://schemas.microsoft.com/office/drawing/2010/main" xmlns="" w="9525">
                 <a:solidFill>
                   <a:srgbClr val="000000"/>
                 </a:solidFill>
@@ -31330,7 +31330,7 @@
           </a:ln>
           <a:extLst>
             <a:ext uri="{91240B29-F687-4f45-9708-019B960494DF}">
-              <a14:hiddenLine xmlns="" xmlns:a14="http://schemas.microsoft.com/office/drawing/2010/main" w="9525">
+              <a14:hiddenLine xmlns:a14="http://schemas.microsoft.com/office/drawing/2010/main" xmlns="" w="9525">
                 <a:solidFill>
                   <a:srgbClr val="000000"/>
                 </a:solidFill>
@@ -31636,14 +31636,14 @@
             </a:ln>
             <a:extLst>
               <a:ext uri="{909E8E84-426E-40dd-AFC4-6F175D3DCCD1}">
-                <a14:hiddenFill xmlns="" xmlns:a14="http://schemas.microsoft.com/office/drawing/2010/main">
+                <a14:hiddenFill xmlns:a14="http://schemas.microsoft.com/office/drawing/2010/main" xmlns="">
                   <a:solidFill>
                     <a:srgbClr val="FFFFFF"/>
                   </a:solidFill>
                 </a14:hiddenFill>
               </a:ext>
               <a:ext uri="{91240B29-F687-4f45-9708-019B960494DF}">
-                <a14:hiddenLine xmlns="" xmlns:a14="http://schemas.microsoft.com/office/drawing/2010/main" w="9525">
+                <a14:hiddenLine xmlns:a14="http://schemas.microsoft.com/office/drawing/2010/main" xmlns="" w="9525">
                   <a:solidFill>
                     <a:srgbClr val="000000"/>
                   </a:solidFill>
@@ -31802,7 +31802,7 @@
             </a:ln>
             <a:extLst>
               <a:ext uri="{91240B29-F687-4f45-9708-019B960494DF}">
-                <a14:hiddenLine xmlns="" xmlns:a14="http://schemas.microsoft.com/office/drawing/2010/main" w="9525">
+                <a14:hiddenLine xmlns:a14="http://schemas.microsoft.com/office/drawing/2010/main" xmlns="" w="9525">
                   <a:solidFill>
                     <a:srgbClr val="000000"/>
                   </a:solidFill>
@@ -32709,14 +32709,14 @@
             </a:ln>
             <a:extLst>
               <a:ext uri="{909E8E84-426E-40dd-AFC4-6F175D3DCCD1}">
-                <a14:hiddenFill xmlns:a14="http://schemas.microsoft.com/office/drawing/2010/main" xmlns="">
+                <a14:hiddenFill xmlns="" xmlns:a14="http://schemas.microsoft.com/office/drawing/2010/main">
                   <a:solidFill>
                     <a:srgbClr val="FFFFFF"/>
                   </a:solidFill>
                 </a14:hiddenFill>
               </a:ext>
               <a:ext uri="{91240B29-F687-4f45-9708-019B960494DF}">
-                <a14:hiddenLine xmlns:a14="http://schemas.microsoft.com/office/drawing/2010/main" xmlns="" w="9525">
+                <a14:hiddenLine xmlns="" xmlns:a14="http://schemas.microsoft.com/office/drawing/2010/main" w="9525">
                   <a:solidFill>
                     <a:srgbClr val="000000"/>
                   </a:solidFill>
@@ -32776,14 +32776,14 @@
             </a:ln>
             <a:extLst>
               <a:ext uri="{909E8E84-426E-40dd-AFC4-6F175D3DCCD1}">
-                <a14:hiddenFill xmlns:a14="http://schemas.microsoft.com/office/drawing/2010/main" xmlns="">
+                <a14:hiddenFill xmlns="" xmlns:a14="http://schemas.microsoft.com/office/drawing/2010/main">
                   <a:solidFill>
                     <a:srgbClr val="FFFFFF"/>
                   </a:solidFill>
                 </a14:hiddenFill>
               </a:ext>
               <a:ext uri="{91240B29-F687-4f45-9708-019B960494DF}">
-                <a14:hiddenLine xmlns:a14="http://schemas.microsoft.com/office/drawing/2010/main" xmlns="" w="9525">
+                <a14:hiddenLine xmlns="" xmlns:a14="http://schemas.microsoft.com/office/drawing/2010/main" w="9525">
                   <a:solidFill>
                     <a:srgbClr val="000000"/>
                   </a:solidFill>
@@ -32843,14 +32843,14 @@
             </a:ln>
             <a:extLst>
               <a:ext uri="{909E8E84-426E-40dd-AFC4-6F175D3DCCD1}">
-                <a14:hiddenFill xmlns:a14="http://schemas.microsoft.com/office/drawing/2010/main" xmlns="">
+                <a14:hiddenFill xmlns="" xmlns:a14="http://schemas.microsoft.com/office/drawing/2010/main">
                   <a:solidFill>
                     <a:srgbClr val="FFFFFF"/>
                   </a:solidFill>
                 </a14:hiddenFill>
               </a:ext>
               <a:ext uri="{91240B29-F687-4f45-9708-019B960494DF}">
-                <a14:hiddenLine xmlns:a14="http://schemas.microsoft.com/office/drawing/2010/main" xmlns="" w="9525">
+                <a14:hiddenLine xmlns="" xmlns:a14="http://schemas.microsoft.com/office/drawing/2010/main" w="9525">
                   <a:solidFill>
                     <a:srgbClr val="000000"/>
                   </a:solidFill>
@@ -32910,14 +32910,14 @@
             </a:ln>
             <a:extLst>
               <a:ext uri="{909E8E84-426E-40dd-AFC4-6F175D3DCCD1}">
-                <a14:hiddenFill xmlns:a14="http://schemas.microsoft.com/office/drawing/2010/main" xmlns="">
+                <a14:hiddenFill xmlns="" xmlns:a14="http://schemas.microsoft.com/office/drawing/2010/main">
                   <a:solidFill>
                     <a:srgbClr val="FFFFFF"/>
                   </a:solidFill>
                 </a14:hiddenFill>
               </a:ext>
               <a:ext uri="{91240B29-F687-4f45-9708-019B960494DF}">
-                <a14:hiddenLine xmlns:a14="http://schemas.microsoft.com/office/drawing/2010/main" xmlns="" w="9525">
+                <a14:hiddenLine xmlns="" xmlns:a14="http://schemas.microsoft.com/office/drawing/2010/main" w="9525">
                   <a:solidFill>
                     <a:srgbClr val="000000"/>
                   </a:solidFill>
@@ -32998,14 +32998,14 @@
             </a:ln>
             <a:extLst>
               <a:ext uri="{909E8E84-426E-40dd-AFC4-6F175D3DCCD1}">
-                <a14:hiddenFill xmlns:a14="http://schemas.microsoft.com/office/drawing/2010/main" xmlns="">
+                <a14:hiddenFill xmlns="" xmlns:a14="http://schemas.microsoft.com/office/drawing/2010/main">
                   <a:solidFill>
                     <a:srgbClr val="FFFFFF"/>
                   </a:solidFill>
                 </a14:hiddenFill>
               </a:ext>
               <a:ext uri="{91240B29-F687-4f45-9708-019B960494DF}">
-                <a14:hiddenLine xmlns:a14="http://schemas.microsoft.com/office/drawing/2010/main" xmlns="" w="9525">
+                <a14:hiddenLine xmlns="" xmlns:a14="http://schemas.microsoft.com/office/drawing/2010/main" w="9525">
                   <a:solidFill>
                     <a:srgbClr val="000000"/>
                   </a:solidFill>
@@ -33065,14 +33065,14 @@
             </a:ln>
             <a:extLst>
               <a:ext uri="{909E8E84-426E-40dd-AFC4-6F175D3DCCD1}">
-                <a14:hiddenFill xmlns:a14="http://schemas.microsoft.com/office/drawing/2010/main" xmlns="">
+                <a14:hiddenFill xmlns="" xmlns:a14="http://schemas.microsoft.com/office/drawing/2010/main">
                   <a:solidFill>
                     <a:srgbClr val="FFFFFF"/>
                   </a:solidFill>
                 </a14:hiddenFill>
               </a:ext>
               <a:ext uri="{91240B29-F687-4f45-9708-019B960494DF}">
-                <a14:hiddenLine xmlns:a14="http://schemas.microsoft.com/office/drawing/2010/main" xmlns="" w="9525">
+                <a14:hiddenLine xmlns="" xmlns:a14="http://schemas.microsoft.com/office/drawing/2010/main" w="9525">
                   <a:solidFill>
                     <a:srgbClr val="000000"/>
                   </a:solidFill>
@@ -33132,14 +33132,14 @@
             </a:ln>
             <a:extLst>
               <a:ext uri="{909E8E84-426E-40dd-AFC4-6F175D3DCCD1}">
-                <a14:hiddenFill xmlns:a14="http://schemas.microsoft.com/office/drawing/2010/main" xmlns="">
+                <a14:hiddenFill xmlns="" xmlns:a14="http://schemas.microsoft.com/office/drawing/2010/main">
                   <a:solidFill>
                     <a:srgbClr val="FFFFFF"/>
                   </a:solidFill>
                 </a14:hiddenFill>
               </a:ext>
               <a:ext uri="{91240B29-F687-4f45-9708-019B960494DF}">
-                <a14:hiddenLine xmlns:a14="http://schemas.microsoft.com/office/drawing/2010/main" xmlns="" w="9525">
+                <a14:hiddenLine xmlns="" xmlns:a14="http://schemas.microsoft.com/office/drawing/2010/main" w="9525">
                   <a:solidFill>
                     <a:srgbClr val="000000"/>
                   </a:solidFill>
@@ -33199,14 +33199,14 @@
             </a:ln>
             <a:extLst>
               <a:ext uri="{909E8E84-426E-40dd-AFC4-6F175D3DCCD1}">
-                <a14:hiddenFill xmlns:a14="http://schemas.microsoft.com/office/drawing/2010/main" xmlns="">
+                <a14:hiddenFill xmlns="" xmlns:a14="http://schemas.microsoft.com/office/drawing/2010/main">
                   <a:solidFill>
                     <a:srgbClr val="FFFFFF"/>
                   </a:solidFill>
                 </a14:hiddenFill>
               </a:ext>
               <a:ext uri="{91240B29-F687-4f45-9708-019B960494DF}">
-                <a14:hiddenLine xmlns:a14="http://schemas.microsoft.com/office/drawing/2010/main" xmlns="" w="9525">
+                <a14:hiddenLine xmlns="" xmlns:a14="http://schemas.microsoft.com/office/drawing/2010/main" w="9525">
                   <a:solidFill>
                     <a:srgbClr val="000000"/>
                   </a:solidFill>
@@ -33602,7 +33602,7 @@
           </a:ln>
           <a:extLst>
             <a:ext uri="{91240B29-F687-4f45-9708-019B960494DF}">
-              <a14:hiddenLine xmlns:a14="http://schemas.microsoft.com/office/drawing/2010/main" xmlns="" w="9525">
+              <a14:hiddenLine xmlns="" xmlns:a14="http://schemas.microsoft.com/office/drawing/2010/main" w="9525">
                 <a:solidFill>
                   <a:srgbClr val="000000"/>
                 </a:solidFill>
@@ -33662,14 +33662,14 @@
           </a:ln>
           <a:extLst>
             <a:ext uri="{909E8E84-426E-40dd-AFC4-6F175D3DCCD1}">
-              <a14:hiddenFill xmlns:a14="http://schemas.microsoft.com/office/drawing/2010/main" xmlns="">
+              <a14:hiddenFill xmlns="" xmlns:a14="http://schemas.microsoft.com/office/drawing/2010/main">
                 <a:solidFill>
                   <a:srgbClr val="FFFFFF"/>
                 </a:solidFill>
               </a14:hiddenFill>
             </a:ext>
             <a:ext uri="{91240B29-F687-4f45-9708-019B960494DF}">
-              <a14:hiddenLine xmlns:a14="http://schemas.microsoft.com/office/drawing/2010/main" xmlns="" w="9525">
+              <a14:hiddenLine xmlns="" xmlns:a14="http://schemas.microsoft.com/office/drawing/2010/main" w="9525">
                 <a:solidFill>
                   <a:srgbClr val="000000"/>
                 </a:solidFill>
@@ -33798,7 +33798,7 @@
           </a:ln>
           <a:extLst>
             <a:ext uri="{91240B29-F687-4f45-9708-019B960494DF}">
-              <a14:hiddenLine xmlns:a14="http://schemas.microsoft.com/office/drawing/2010/main" xmlns="" w="9525">
+              <a14:hiddenLine xmlns="" xmlns:a14="http://schemas.microsoft.com/office/drawing/2010/main" w="9525">
                 <a:solidFill>
                   <a:srgbClr val="000000"/>
                 </a:solidFill>
@@ -33943,7 +33943,7 @@
           </a:ln>
           <a:extLst>
             <a:ext uri="{91240B29-F687-4f45-9708-019B960494DF}">
-              <a14:hiddenLine xmlns:a14="http://schemas.microsoft.com/office/drawing/2010/main" xmlns="" w="9525">
+              <a14:hiddenLine xmlns="" xmlns:a14="http://schemas.microsoft.com/office/drawing/2010/main" w="9525">
                 <a:solidFill>
                   <a:srgbClr val="000000"/>
                 </a:solidFill>
@@ -34152,7 +34152,7 @@
           </a:ln>
           <a:extLst>
             <a:ext uri="{91240B29-F687-4f45-9708-019B960494DF}">
-              <a14:hiddenLine xmlns:a14="http://schemas.microsoft.com/office/drawing/2010/main" xmlns="" w="9525">
+              <a14:hiddenLine xmlns="" xmlns:a14="http://schemas.microsoft.com/office/drawing/2010/main" w="9525">
                 <a:solidFill>
                   <a:srgbClr val="000000"/>
                 </a:solidFill>
@@ -34212,14 +34212,14 @@
           </a:ln>
           <a:extLst>
             <a:ext uri="{909E8E84-426E-40dd-AFC4-6F175D3DCCD1}">
-              <a14:hiddenFill xmlns:a14="http://schemas.microsoft.com/office/drawing/2010/main" xmlns="">
+              <a14:hiddenFill xmlns="" xmlns:a14="http://schemas.microsoft.com/office/drawing/2010/main">
                 <a:solidFill>
                   <a:srgbClr val="FFFFFF"/>
                 </a:solidFill>
               </a14:hiddenFill>
             </a:ext>
             <a:ext uri="{91240B29-F687-4f45-9708-019B960494DF}">
-              <a14:hiddenLine xmlns:a14="http://schemas.microsoft.com/office/drawing/2010/main" xmlns="" w="9525">
+              <a14:hiddenLine xmlns="" xmlns:a14="http://schemas.microsoft.com/office/drawing/2010/main" w="9525">
                 <a:solidFill>
                   <a:srgbClr val="000000"/>
                 </a:solidFill>
@@ -34378,7 +34378,7 @@
           </a:ln>
           <a:extLst>
             <a:ext uri="{91240B29-F687-4f45-9708-019B960494DF}">
-              <a14:hiddenLine xmlns:a14="http://schemas.microsoft.com/office/drawing/2010/main" xmlns="" w="9525">
+              <a14:hiddenLine xmlns="" xmlns:a14="http://schemas.microsoft.com/office/drawing/2010/main" w="9525">
                 <a:solidFill>
                   <a:srgbClr val="000000"/>
                 </a:solidFill>
@@ -34564,7 +34564,7 @@
           </a:ln>
           <a:extLst>
             <a:ext uri="{91240B29-F687-4f45-9708-019B960494DF}">
-              <a14:hiddenLine xmlns:a14="http://schemas.microsoft.com/office/drawing/2010/main" xmlns="" w="9525">
+              <a14:hiddenLine xmlns="" xmlns:a14="http://schemas.microsoft.com/office/drawing/2010/main" w="9525">
                 <a:solidFill>
                   <a:srgbClr val="000000"/>
                 </a:solidFill>
@@ -34783,7 +34783,7 @@
           </a:ln>
           <a:extLst>
             <a:ext uri="{91240B29-F687-4f45-9708-019B960494DF}">
-              <a14:hiddenLine xmlns:a14="http://schemas.microsoft.com/office/drawing/2010/main" xmlns="" w="9525">
+              <a14:hiddenLine xmlns="" xmlns:a14="http://schemas.microsoft.com/office/drawing/2010/main" w="9525">
                 <a:solidFill>
                   <a:srgbClr val="000000"/>
                 </a:solidFill>
@@ -34992,7 +34992,7 @@
           </a:ln>
           <a:extLst>
             <a:ext uri="{91240B29-F687-4f45-9708-019B960494DF}">
-              <a14:hiddenLine xmlns:a14="http://schemas.microsoft.com/office/drawing/2010/main" xmlns="" w="9525">
+              <a14:hiddenLine xmlns="" xmlns:a14="http://schemas.microsoft.com/office/drawing/2010/main" w="9525">
                 <a:solidFill>
                   <a:srgbClr val="000000"/>
                 </a:solidFill>
@@ -35887,14 +35887,14 @@
               </a:ln>
               <a:extLst>
                 <a:ext uri="{909E8E84-426E-40dd-AFC4-6F175D3DCCD1}">
-                  <a14:hiddenFill xmlns="" xmlns:a14="http://schemas.microsoft.com/office/drawing/2010/main">
+                  <a14:hiddenFill xmlns:a14="http://schemas.microsoft.com/office/drawing/2010/main" xmlns="">
                     <a:solidFill>
                       <a:srgbClr val="FFFFFF"/>
                     </a:solidFill>
                   </a14:hiddenFill>
                 </a:ext>
                 <a:ext uri="{91240B29-F687-4f45-9708-019B960494DF}">
-                  <a14:hiddenLine xmlns="" xmlns:a14="http://schemas.microsoft.com/office/drawing/2010/main" w="9525">
+                  <a14:hiddenLine xmlns:a14="http://schemas.microsoft.com/office/drawing/2010/main" xmlns="" w="9525">
                     <a:solidFill>
                       <a:srgbClr val="000000"/>
                     </a:solidFill>
@@ -37063,14 +37063,14 @@
               </a:ln>
               <a:extLst>
                 <a:ext uri="{909E8E84-426E-40dd-AFC4-6F175D3DCCD1}">
-                  <a14:hiddenFill xmlns="" xmlns:a14="http://schemas.microsoft.com/office/drawing/2010/main">
+                  <a14:hiddenFill xmlns:a14="http://schemas.microsoft.com/office/drawing/2010/main" xmlns="">
                     <a:solidFill>
                       <a:srgbClr val="FFFFFF"/>
                     </a:solidFill>
                   </a14:hiddenFill>
                 </a:ext>
                 <a:ext uri="{91240B29-F687-4f45-9708-019B960494DF}">
-                  <a14:hiddenLine xmlns="" xmlns:a14="http://schemas.microsoft.com/office/drawing/2010/main" w="9525">
+                  <a14:hiddenLine xmlns:a14="http://schemas.microsoft.com/office/drawing/2010/main" xmlns="" w="9525">
                     <a:solidFill>
                       <a:srgbClr val="000000"/>
                     </a:solidFill>
@@ -37807,7 +37807,7 @@
           </a:ln>
           <a:extLst>
             <a:ext uri="{91240B29-F687-4f45-9708-019B960494DF}">
-              <a14:hiddenLine xmlns="" xmlns:a14="http://schemas.microsoft.com/office/drawing/2010/main" w="9525">
+              <a14:hiddenLine xmlns:a14="http://schemas.microsoft.com/office/drawing/2010/main" xmlns="" w="9525">
                 <a:solidFill>
                   <a:srgbClr val="000000"/>
                 </a:solidFill>
@@ -38206,14 +38206,14 @@
             </a:ln>
             <a:extLst>
               <a:ext uri="{909E8E84-426E-40dd-AFC4-6F175D3DCCD1}">
-                <a14:hiddenFill xmlns:a14="http://schemas.microsoft.com/office/drawing/2010/main" xmlns="">
+                <a14:hiddenFill xmlns="" xmlns:a14="http://schemas.microsoft.com/office/drawing/2010/main">
                   <a:solidFill>
                     <a:srgbClr val="FFFFFF"/>
                   </a:solidFill>
                 </a14:hiddenFill>
               </a:ext>
               <a:ext uri="{91240B29-F687-4f45-9708-019B960494DF}">
-                <a14:hiddenLine xmlns:a14="http://schemas.microsoft.com/office/drawing/2010/main" xmlns="" w="9525">
+                <a14:hiddenLine xmlns="" xmlns:a14="http://schemas.microsoft.com/office/drawing/2010/main" w="9525">
                   <a:solidFill>
                     <a:srgbClr val="000000"/>
                   </a:solidFill>
@@ -38273,14 +38273,14 @@
             </a:ln>
             <a:extLst>
               <a:ext uri="{909E8E84-426E-40dd-AFC4-6F175D3DCCD1}">
-                <a14:hiddenFill xmlns:a14="http://schemas.microsoft.com/office/drawing/2010/main" xmlns="">
+                <a14:hiddenFill xmlns="" xmlns:a14="http://schemas.microsoft.com/office/drawing/2010/main">
                   <a:solidFill>
                     <a:srgbClr val="FFFFFF"/>
                   </a:solidFill>
                 </a14:hiddenFill>
               </a:ext>
               <a:ext uri="{91240B29-F687-4f45-9708-019B960494DF}">
-                <a14:hiddenLine xmlns:a14="http://schemas.microsoft.com/office/drawing/2010/main" xmlns="" w="9525">
+                <a14:hiddenLine xmlns="" xmlns:a14="http://schemas.microsoft.com/office/drawing/2010/main" w="9525">
                   <a:solidFill>
                     <a:srgbClr val="000000"/>
                   </a:solidFill>
@@ -38340,14 +38340,14 @@
             </a:ln>
             <a:extLst>
               <a:ext uri="{909E8E84-426E-40dd-AFC4-6F175D3DCCD1}">
-                <a14:hiddenFill xmlns:a14="http://schemas.microsoft.com/office/drawing/2010/main" xmlns="">
+                <a14:hiddenFill xmlns="" xmlns:a14="http://schemas.microsoft.com/office/drawing/2010/main">
                   <a:solidFill>
                     <a:srgbClr val="FFFFFF"/>
                   </a:solidFill>
                 </a14:hiddenFill>
               </a:ext>
               <a:ext uri="{91240B29-F687-4f45-9708-019B960494DF}">
-                <a14:hiddenLine xmlns:a14="http://schemas.microsoft.com/office/drawing/2010/main" xmlns="" w="9525">
+                <a14:hiddenLine xmlns="" xmlns:a14="http://schemas.microsoft.com/office/drawing/2010/main" w="9525">
                   <a:solidFill>
                     <a:srgbClr val="000000"/>
                   </a:solidFill>
@@ -38407,14 +38407,14 @@
             </a:ln>
             <a:extLst>
               <a:ext uri="{909E8E84-426E-40dd-AFC4-6F175D3DCCD1}">
-                <a14:hiddenFill xmlns:a14="http://schemas.microsoft.com/office/drawing/2010/main" xmlns="">
+                <a14:hiddenFill xmlns="" xmlns:a14="http://schemas.microsoft.com/office/drawing/2010/main">
                   <a:solidFill>
                     <a:srgbClr val="FFFFFF"/>
                   </a:solidFill>
                 </a14:hiddenFill>
               </a:ext>
               <a:ext uri="{91240B29-F687-4f45-9708-019B960494DF}">
-                <a14:hiddenLine xmlns:a14="http://schemas.microsoft.com/office/drawing/2010/main" xmlns="" w="9525">
+                <a14:hiddenLine xmlns="" xmlns:a14="http://schemas.microsoft.com/office/drawing/2010/main" w="9525">
                   <a:solidFill>
                     <a:srgbClr val="000000"/>
                   </a:solidFill>
@@ -38495,14 +38495,14 @@
             </a:ln>
             <a:extLst>
               <a:ext uri="{909E8E84-426E-40dd-AFC4-6F175D3DCCD1}">
-                <a14:hiddenFill xmlns:a14="http://schemas.microsoft.com/office/drawing/2010/main" xmlns="">
+                <a14:hiddenFill xmlns="" xmlns:a14="http://schemas.microsoft.com/office/drawing/2010/main">
                   <a:solidFill>
                     <a:srgbClr val="FFFFFF"/>
                   </a:solidFill>
                 </a14:hiddenFill>
               </a:ext>
               <a:ext uri="{91240B29-F687-4f45-9708-019B960494DF}">
-                <a14:hiddenLine xmlns:a14="http://schemas.microsoft.com/office/drawing/2010/main" xmlns="" w="9525">
+                <a14:hiddenLine xmlns="" xmlns:a14="http://schemas.microsoft.com/office/drawing/2010/main" w="9525">
                   <a:solidFill>
                     <a:srgbClr val="000000"/>
                   </a:solidFill>
@@ -38562,14 +38562,14 @@
             </a:ln>
             <a:extLst>
               <a:ext uri="{909E8E84-426E-40dd-AFC4-6F175D3DCCD1}">
-                <a14:hiddenFill xmlns:a14="http://schemas.microsoft.com/office/drawing/2010/main" xmlns="">
+                <a14:hiddenFill xmlns="" xmlns:a14="http://schemas.microsoft.com/office/drawing/2010/main">
                   <a:solidFill>
                     <a:srgbClr val="FFFFFF"/>
                   </a:solidFill>
                 </a14:hiddenFill>
               </a:ext>
               <a:ext uri="{91240B29-F687-4f45-9708-019B960494DF}">
-                <a14:hiddenLine xmlns:a14="http://schemas.microsoft.com/office/drawing/2010/main" xmlns="" w="9525">
+                <a14:hiddenLine xmlns="" xmlns:a14="http://schemas.microsoft.com/office/drawing/2010/main" w="9525">
                   <a:solidFill>
                     <a:srgbClr val="000000"/>
                   </a:solidFill>
@@ -38629,14 +38629,14 @@
             </a:ln>
             <a:extLst>
               <a:ext uri="{909E8E84-426E-40dd-AFC4-6F175D3DCCD1}">
-                <a14:hiddenFill xmlns:a14="http://schemas.microsoft.com/office/drawing/2010/main" xmlns="">
+                <a14:hiddenFill xmlns="" xmlns:a14="http://schemas.microsoft.com/office/drawing/2010/main">
                   <a:solidFill>
                     <a:srgbClr val="FFFFFF"/>
                   </a:solidFill>
                 </a14:hiddenFill>
               </a:ext>
               <a:ext uri="{91240B29-F687-4f45-9708-019B960494DF}">
-                <a14:hiddenLine xmlns:a14="http://schemas.microsoft.com/office/drawing/2010/main" xmlns="" w="9525">
+                <a14:hiddenLine xmlns="" xmlns:a14="http://schemas.microsoft.com/office/drawing/2010/main" w="9525">
                   <a:solidFill>
                     <a:srgbClr val="000000"/>
                   </a:solidFill>
@@ -38696,14 +38696,14 @@
             </a:ln>
             <a:extLst>
               <a:ext uri="{909E8E84-426E-40dd-AFC4-6F175D3DCCD1}">
-                <a14:hiddenFill xmlns:a14="http://schemas.microsoft.com/office/drawing/2010/main" xmlns="">
+                <a14:hiddenFill xmlns="" xmlns:a14="http://schemas.microsoft.com/office/drawing/2010/main">
                   <a:solidFill>
                     <a:srgbClr val="FFFFFF"/>
                   </a:solidFill>
                 </a14:hiddenFill>
               </a:ext>
               <a:ext uri="{91240B29-F687-4f45-9708-019B960494DF}">
-                <a14:hiddenLine xmlns:a14="http://schemas.microsoft.com/office/drawing/2010/main" xmlns="" w="9525">
+                <a14:hiddenLine xmlns="" xmlns:a14="http://schemas.microsoft.com/office/drawing/2010/main" w="9525">
                   <a:solidFill>
                     <a:srgbClr val="000000"/>
                   </a:solidFill>
@@ -39099,7 +39099,7 @@
           </a:ln>
           <a:extLst>
             <a:ext uri="{91240B29-F687-4f45-9708-019B960494DF}">
-              <a14:hiddenLine xmlns:a14="http://schemas.microsoft.com/office/drawing/2010/main" xmlns="" w="9525">
+              <a14:hiddenLine xmlns="" xmlns:a14="http://schemas.microsoft.com/office/drawing/2010/main" w="9525">
                 <a:solidFill>
                   <a:srgbClr val="000000"/>
                 </a:solidFill>
@@ -39159,14 +39159,14 @@
           </a:ln>
           <a:extLst>
             <a:ext uri="{909E8E84-426E-40dd-AFC4-6F175D3DCCD1}">
-              <a14:hiddenFill xmlns:a14="http://schemas.microsoft.com/office/drawing/2010/main" xmlns="">
+              <a14:hiddenFill xmlns="" xmlns:a14="http://schemas.microsoft.com/office/drawing/2010/main">
                 <a:solidFill>
                   <a:srgbClr val="FFFFFF"/>
                 </a:solidFill>
               </a14:hiddenFill>
             </a:ext>
             <a:ext uri="{91240B29-F687-4f45-9708-019B960494DF}">
-              <a14:hiddenLine xmlns:a14="http://schemas.microsoft.com/office/drawing/2010/main" xmlns="" w="9525">
+              <a14:hiddenLine xmlns="" xmlns:a14="http://schemas.microsoft.com/office/drawing/2010/main" w="9525">
                 <a:solidFill>
                   <a:srgbClr val="000000"/>
                 </a:solidFill>
@@ -39295,7 +39295,7 @@
           </a:ln>
           <a:extLst>
             <a:ext uri="{91240B29-F687-4f45-9708-019B960494DF}">
-              <a14:hiddenLine xmlns:a14="http://schemas.microsoft.com/office/drawing/2010/main" xmlns="" w="9525">
+              <a14:hiddenLine xmlns="" xmlns:a14="http://schemas.microsoft.com/office/drawing/2010/main" w="9525">
                 <a:solidFill>
                   <a:srgbClr val="000000"/>
                 </a:solidFill>
@@ -39440,7 +39440,7 @@
           </a:ln>
           <a:extLst>
             <a:ext uri="{91240B29-F687-4f45-9708-019B960494DF}">
-              <a14:hiddenLine xmlns:a14="http://schemas.microsoft.com/office/drawing/2010/main" xmlns="" w="9525">
+              <a14:hiddenLine xmlns="" xmlns:a14="http://schemas.microsoft.com/office/drawing/2010/main" w="9525">
                 <a:solidFill>
                   <a:srgbClr val="000000"/>
                 </a:solidFill>
@@ -39649,7 +39649,7 @@
           </a:ln>
           <a:extLst>
             <a:ext uri="{91240B29-F687-4f45-9708-019B960494DF}">
-              <a14:hiddenLine xmlns:a14="http://schemas.microsoft.com/office/drawing/2010/main" xmlns="" w="9525">
+              <a14:hiddenLine xmlns="" xmlns:a14="http://schemas.microsoft.com/office/drawing/2010/main" w="9525">
                 <a:solidFill>
                   <a:srgbClr val="000000"/>
                 </a:solidFill>
@@ -39709,14 +39709,14 @@
           </a:ln>
           <a:extLst>
             <a:ext uri="{909E8E84-426E-40dd-AFC4-6F175D3DCCD1}">
-              <a14:hiddenFill xmlns:a14="http://schemas.microsoft.com/office/drawing/2010/main" xmlns="">
+              <a14:hiddenFill xmlns="" xmlns:a14="http://schemas.microsoft.com/office/drawing/2010/main">
                 <a:solidFill>
                   <a:srgbClr val="FFFFFF"/>
                 </a:solidFill>
               </a14:hiddenFill>
             </a:ext>
             <a:ext uri="{91240B29-F687-4f45-9708-019B960494DF}">
-              <a14:hiddenLine xmlns:a14="http://schemas.microsoft.com/office/drawing/2010/main" xmlns="" w="9525">
+              <a14:hiddenLine xmlns="" xmlns:a14="http://schemas.microsoft.com/office/drawing/2010/main" w="9525">
                 <a:solidFill>
                   <a:srgbClr val="000000"/>
                 </a:solidFill>
@@ -39875,7 +39875,7 @@
           </a:ln>
           <a:extLst>
             <a:ext uri="{91240B29-F687-4f45-9708-019B960494DF}">
-              <a14:hiddenLine xmlns:a14="http://schemas.microsoft.com/office/drawing/2010/main" xmlns="" w="9525">
+              <a14:hiddenLine xmlns="" xmlns:a14="http://schemas.microsoft.com/office/drawing/2010/main" w="9525">
                 <a:solidFill>
                   <a:srgbClr val="000000"/>
                 </a:solidFill>
@@ -40061,7 +40061,7 @@
           </a:ln>
           <a:extLst>
             <a:ext uri="{91240B29-F687-4f45-9708-019B960494DF}">
-              <a14:hiddenLine xmlns:a14="http://schemas.microsoft.com/office/drawing/2010/main" xmlns="" w="9525">
+              <a14:hiddenLine xmlns="" xmlns:a14="http://schemas.microsoft.com/office/drawing/2010/main" w="9525">
                 <a:solidFill>
                   <a:srgbClr val="000000"/>
                 </a:solidFill>
@@ -40280,7 +40280,7 @@
           </a:ln>
           <a:extLst>
             <a:ext uri="{91240B29-F687-4f45-9708-019B960494DF}">
-              <a14:hiddenLine xmlns:a14="http://schemas.microsoft.com/office/drawing/2010/main" xmlns="" w="9525">
+              <a14:hiddenLine xmlns="" xmlns:a14="http://schemas.microsoft.com/office/drawing/2010/main" w="9525">
                 <a:solidFill>
                   <a:srgbClr val="000000"/>
                 </a:solidFill>
@@ -40489,7 +40489,7 @@
           </a:ln>
           <a:extLst>
             <a:ext uri="{91240B29-F687-4f45-9708-019B960494DF}">
-              <a14:hiddenLine xmlns:a14="http://schemas.microsoft.com/office/drawing/2010/main" xmlns="" w="9525">
+              <a14:hiddenLine xmlns="" xmlns:a14="http://schemas.microsoft.com/office/drawing/2010/main" w="9525">
                 <a:solidFill>
                   <a:srgbClr val="000000"/>
                 </a:solidFill>
@@ -41420,14 +41420,14 @@
               </a:ln>
               <a:extLst>
                 <a:ext uri="{909E8E84-426E-40dd-AFC4-6F175D3DCCD1}">
-                  <a14:hiddenFill xmlns="" xmlns:a14="http://schemas.microsoft.com/office/drawing/2010/main">
+                  <a14:hiddenFill xmlns:a14="http://schemas.microsoft.com/office/drawing/2010/main" xmlns="">
                     <a:solidFill>
                       <a:srgbClr val="FFFFFF"/>
                     </a:solidFill>
                   </a14:hiddenFill>
                 </a:ext>
                 <a:ext uri="{91240B29-F687-4f45-9708-019B960494DF}">
-                  <a14:hiddenLine xmlns="" xmlns:a14="http://schemas.microsoft.com/office/drawing/2010/main" w="9525">
+                  <a14:hiddenLine xmlns:a14="http://schemas.microsoft.com/office/drawing/2010/main" xmlns="" w="9525">
                     <a:solidFill>
                       <a:srgbClr val="000000"/>
                     </a:solidFill>
@@ -42596,14 +42596,14 @@
               </a:ln>
               <a:extLst>
                 <a:ext uri="{909E8E84-426E-40dd-AFC4-6F175D3DCCD1}">
-                  <a14:hiddenFill xmlns="" xmlns:a14="http://schemas.microsoft.com/office/drawing/2010/main">
+                  <a14:hiddenFill xmlns:a14="http://schemas.microsoft.com/office/drawing/2010/main" xmlns="">
                     <a:solidFill>
                       <a:srgbClr val="FFFFFF"/>
                     </a:solidFill>
                   </a14:hiddenFill>
                 </a:ext>
                 <a:ext uri="{91240B29-F687-4f45-9708-019B960494DF}">
-                  <a14:hiddenLine xmlns="" xmlns:a14="http://schemas.microsoft.com/office/drawing/2010/main" w="9525">
+                  <a14:hiddenLine xmlns:a14="http://schemas.microsoft.com/office/drawing/2010/main" xmlns="" w="9525">
                     <a:solidFill>
                       <a:srgbClr val="000000"/>
                     </a:solidFill>
@@ -43360,7 +43360,7 @@
             </a:ln>
             <a:extLst>
               <a:ext uri="{91240B29-F687-4f45-9708-019B960494DF}">
-                <a14:hiddenLine xmlns="" xmlns:a14="http://schemas.microsoft.com/office/drawing/2010/main" w="9525">
+                <a14:hiddenLine xmlns:a14="http://schemas.microsoft.com/office/drawing/2010/main" xmlns="" w="9525">
                   <a:solidFill>
                     <a:srgbClr val="000000"/>
                   </a:solidFill>
@@ -43891,7 +43891,7 @@
             </a:ln>
             <a:extLst>
               <a:ext uri="{91240B29-F687-4f45-9708-019B960494DF}">
-                <a14:hiddenLine xmlns="" xmlns:a14="http://schemas.microsoft.com/office/drawing/2010/main" w="9525">
+                <a14:hiddenLine xmlns:a14="http://schemas.microsoft.com/office/drawing/2010/main" xmlns="" w="9525">
                   <a:solidFill>
                     <a:srgbClr val="000000"/>
                   </a:solidFill>
@@ -44307,14 +44307,14 @@
               </a:ln>
               <a:extLst>
                 <a:ext uri="{909E8E84-426E-40dd-AFC4-6F175D3DCCD1}">
-                  <a14:hiddenFill xmlns="" xmlns:a14="http://schemas.microsoft.com/office/drawing/2010/main">
+                  <a14:hiddenFill xmlns:a14="http://schemas.microsoft.com/office/drawing/2010/main" xmlns="">
                     <a:solidFill>
                       <a:srgbClr val="FFFFFF"/>
                     </a:solidFill>
                   </a14:hiddenFill>
                 </a:ext>
                 <a:ext uri="{91240B29-F687-4f45-9708-019B960494DF}">
-                  <a14:hiddenLine xmlns="" xmlns:a14="http://schemas.microsoft.com/office/drawing/2010/main" w="9525">
+                  <a14:hiddenLine xmlns:a14="http://schemas.microsoft.com/office/drawing/2010/main" xmlns="" w="9525">
                     <a:solidFill>
                       <a:srgbClr val="000000"/>
                     </a:solidFill>
@@ -44828,14 +44828,14 @@
               </a:ln>
               <a:extLst>
                 <a:ext uri="{909E8E84-426E-40dd-AFC4-6F175D3DCCD1}">
-                  <a14:hiddenFill xmlns="" xmlns:a14="http://schemas.microsoft.com/office/drawing/2010/main">
+                  <a14:hiddenFill xmlns:a14="http://schemas.microsoft.com/office/drawing/2010/main" xmlns="">
                     <a:solidFill>
                       <a:srgbClr val="FFFFFF"/>
                     </a:solidFill>
                   </a14:hiddenFill>
                 </a:ext>
                 <a:ext uri="{91240B29-F687-4f45-9708-019B960494DF}">
-                  <a14:hiddenLine xmlns="" xmlns:a14="http://schemas.microsoft.com/office/drawing/2010/main" w="9525">
+                  <a14:hiddenLine xmlns:a14="http://schemas.microsoft.com/office/drawing/2010/main" xmlns="" w="9525">
                     <a:solidFill>
                       <a:srgbClr val="000000"/>
                     </a:solidFill>
@@ -45670,7 +45670,7 @@
               </a:ln>
               <a:extLst>
                 <a:ext uri="{91240B29-F687-4f45-9708-019B960494DF}">
-                  <a14:hiddenLine xmlns="" xmlns:a14="http://schemas.microsoft.com/office/drawing/2010/main" w="9525">
+                  <a14:hiddenLine xmlns:a14="http://schemas.microsoft.com/office/drawing/2010/main" xmlns="" w="9525">
                     <a:solidFill>
                       <a:srgbClr val="000000"/>
                     </a:solidFill>
@@ -45730,14 +45730,14 @@
               </a:ln>
               <a:extLst>
                 <a:ext uri="{909E8E84-426E-40dd-AFC4-6F175D3DCCD1}">
-                  <a14:hiddenFill xmlns="" xmlns:a14="http://schemas.microsoft.com/office/drawing/2010/main">
+                  <a14:hiddenFill xmlns:a14="http://schemas.microsoft.com/office/drawing/2010/main" xmlns="">
                     <a:solidFill>
                       <a:srgbClr val="FFFFFF"/>
                     </a:solidFill>
                   </a14:hiddenFill>
                 </a:ext>
                 <a:ext uri="{91240B29-F687-4f45-9708-019B960494DF}">
-                  <a14:hiddenLine xmlns="" xmlns:a14="http://schemas.microsoft.com/office/drawing/2010/main" w="9525">
+                  <a14:hiddenLine xmlns:a14="http://schemas.microsoft.com/office/drawing/2010/main" xmlns="" w="9525">
                     <a:solidFill>
                       <a:srgbClr val="000000"/>
                     </a:solidFill>
@@ -45866,7 +45866,7 @@
               </a:ln>
               <a:extLst>
                 <a:ext uri="{91240B29-F687-4f45-9708-019B960494DF}">
-                  <a14:hiddenLine xmlns="" xmlns:a14="http://schemas.microsoft.com/office/drawing/2010/main" w="9525">
+                  <a14:hiddenLine xmlns:a14="http://schemas.microsoft.com/office/drawing/2010/main" xmlns="" w="9525">
                     <a:solidFill>
                       <a:srgbClr val="000000"/>
                     </a:solidFill>
@@ -46011,7 +46011,7 @@
               </a:ln>
               <a:extLst>
                 <a:ext uri="{91240B29-F687-4f45-9708-019B960494DF}">
-                  <a14:hiddenLine xmlns="" xmlns:a14="http://schemas.microsoft.com/office/drawing/2010/main" w="9525">
+                  <a14:hiddenLine xmlns:a14="http://schemas.microsoft.com/office/drawing/2010/main" xmlns="" w="9525">
                     <a:solidFill>
                       <a:srgbClr val="000000"/>
                     </a:solidFill>
@@ -46220,7 +46220,7 @@
               </a:ln>
               <a:extLst>
                 <a:ext uri="{91240B29-F687-4f45-9708-019B960494DF}">
-                  <a14:hiddenLine xmlns="" xmlns:a14="http://schemas.microsoft.com/office/drawing/2010/main" w="9525">
+                  <a14:hiddenLine xmlns:a14="http://schemas.microsoft.com/office/drawing/2010/main" xmlns="" w="9525">
                     <a:solidFill>
                       <a:srgbClr val="000000"/>
                     </a:solidFill>
@@ -46400,7 +46400,7 @@
               </a:ln>
               <a:extLst>
                 <a:ext uri="{91240B29-F687-4f45-9708-019B960494DF}">
-                  <a14:hiddenLine xmlns="" xmlns:a14="http://schemas.microsoft.com/office/drawing/2010/main" w="9525">
+                  <a14:hiddenLine xmlns:a14="http://schemas.microsoft.com/office/drawing/2010/main" xmlns="" w="9525">
                     <a:solidFill>
                       <a:srgbClr val="000000"/>
                     </a:solidFill>
@@ -46586,7 +46586,7 @@
               </a:ln>
               <a:extLst>
                 <a:ext uri="{91240B29-F687-4f45-9708-019B960494DF}">
-                  <a14:hiddenLine xmlns="" xmlns:a14="http://schemas.microsoft.com/office/drawing/2010/main" w="9525">
+                  <a14:hiddenLine xmlns:a14="http://schemas.microsoft.com/office/drawing/2010/main" xmlns="" w="9525">
                     <a:solidFill>
                       <a:srgbClr val="000000"/>
                     </a:solidFill>
@@ -46805,7 +46805,7 @@
               </a:ln>
               <a:extLst>
                 <a:ext uri="{91240B29-F687-4f45-9708-019B960494DF}">
-                  <a14:hiddenLine xmlns="" xmlns:a14="http://schemas.microsoft.com/office/drawing/2010/main" w="9525">
+                  <a14:hiddenLine xmlns:a14="http://schemas.microsoft.com/office/drawing/2010/main" xmlns="" w="9525">
                     <a:solidFill>
                       <a:srgbClr val="000000"/>
                     </a:solidFill>
@@ -47014,7 +47014,7 @@
               </a:ln>
               <a:extLst>
                 <a:ext uri="{91240B29-F687-4f45-9708-019B960494DF}">
-                  <a14:hiddenLine xmlns="" xmlns:a14="http://schemas.microsoft.com/office/drawing/2010/main" w="9525">
+                  <a14:hiddenLine xmlns:a14="http://schemas.microsoft.com/office/drawing/2010/main" xmlns="" w="9525">
                     <a:solidFill>
                       <a:srgbClr val="000000"/>
                     </a:solidFill>
@@ -49790,8 +49790,8 @@
         </p:blipFill>
         <p:spPr>
           <a:xfrm>
-            <a:off x="10008423" y="12233894"/>
-            <a:ext cx="350367" cy="351736"/>
+            <a:off x="9903228" y="11788544"/>
+            <a:ext cx="214061" cy="214897"/>
           </a:xfrm>
           <a:prstGeom prst="rect">
             <a:avLst/>
@@ -49812,8 +49812,8 @@
         </p:nvSpPr>
         <p:spPr>
           <a:xfrm>
-            <a:off x="9739754" y="11821324"/>
-            <a:ext cx="878915" cy="816909"/>
+            <a:off x="9739755" y="11521217"/>
+            <a:ext cx="576553" cy="587104"/>
           </a:xfrm>
           <a:prstGeom prst="roundRect">
             <a:avLst/>
@@ -49880,8 +49880,8 @@
         </p:blipFill>
         <p:spPr>
           <a:xfrm>
-            <a:off x="9776873" y="11961034"/>
-            <a:ext cx="823035" cy="203016"/>
+            <a:off x="9783131" y="11637668"/>
+            <a:ext cx="487500" cy="120250"/>
           </a:xfrm>
           <a:prstGeom prst="rect">
             <a:avLst/>
@@ -49904,7 +49904,7 @@
         </p:nvCxnSpPr>
         <p:spPr>
           <a:xfrm>
-            <a:off x="9187362" y="12131885"/>
+            <a:off x="9187362" y="11831777"/>
             <a:ext cx="547240" cy="0"/>
           </a:xfrm>
           <a:prstGeom prst="line">
@@ -49931,6 +49931,311 @@
           </a:fontRef>
         </p:style>
       </p:cxnSp>
+      <p:sp>
+        <p:nvSpPr>
+          <p:cNvPr id="486" name="Rectangle: Rounded Corners 477">
+            <a:extLst>
+              <a:ext uri="{FF2B5EF4-FFF2-40B4-BE49-F238E27FC236}">
+                <a16:creationId xmlns:a16="http://schemas.microsoft.com/office/drawing/2014/main" id="{B3043B31-B245-D643-A661-A994048F6928}"/>
+              </a:ext>
+            </a:extLst>
+          </p:cNvPr>
+          <p:cNvSpPr/>
+          <p:nvPr/>
+        </p:nvSpPr>
+        <p:spPr>
+          <a:xfrm>
+            <a:off x="9872228" y="12199434"/>
+            <a:ext cx="674051" cy="318045"/>
+          </a:xfrm>
+          <a:prstGeom prst="roundRect">
+            <a:avLst/>
+          </a:prstGeom>
+          <a:noFill/>
+          <a:ln w="12700" cap="flat" cmpd="sng" algn="ctr">
+            <a:solidFill>
+              <a:schemeClr val="tx1"/>
+            </a:solidFill>
+            <a:prstDash val="solid"/>
+            <a:miter lim="800000"/>
+          </a:ln>
+          <a:effectLst/>
+        </p:spPr>
+        <p:txBody>
+          <a:bodyPr rot="0" spcFirstLastPara="0" vertOverflow="overflow" horzOverflow="overflow" vert="horz" wrap="square" lIns="91440" tIns="45720" rIns="91440" bIns="45720" numCol="1" spcCol="0" rtlCol="0" fromWordArt="0" anchor="ctr" anchorCtr="0" forceAA="0" compatLnSpc="1">
+            <a:prstTxWarp prst="textNoShape">
+              <a:avLst/>
+            </a:prstTxWarp>
+            <a:noAutofit/>
+          </a:bodyPr>
+          <a:lstStyle/>
+          <a:p>
+            <a:pPr algn="ctr">
+              <a:lnSpc>
+                <a:spcPct val="90000"/>
+              </a:lnSpc>
+              <a:defRPr/>
+            </a:pPr>
+            <a:endParaRPr lang="en-US" sz="2000" kern="0" dirty="0">
+              <a:solidFill>
+                <a:srgbClr val="FFFFFF"/>
+              </a:solidFill>
+              <a:latin typeface="Arial"/>
+            </a:endParaRPr>
+          </a:p>
+        </p:txBody>
+      </p:sp>
+      <p:cxnSp>
+        <p:nvCxnSpPr>
+          <p:cNvPr id="521" name="Straight Connector 520">
+            <a:extLst>
+              <a:ext uri="{FF2B5EF4-FFF2-40B4-BE49-F238E27FC236}">
+                <a16:creationId xmlns:a16="http://schemas.microsoft.com/office/drawing/2014/main" id="{6B83683E-3E11-8945-AA88-7D136122690C}"/>
+              </a:ext>
+            </a:extLst>
+          </p:cNvPr>
+          <p:cNvCxnSpPr>
+            <a:cxnSpLocks/>
+          </p:cNvCxnSpPr>
+          <p:nvPr/>
+        </p:nvCxnSpPr>
+        <p:spPr>
+          <a:xfrm>
+            <a:off x="9187362" y="12088652"/>
+            <a:ext cx="689333" cy="247834"/>
+          </a:xfrm>
+          <a:prstGeom prst="line">
+            <a:avLst/>
+          </a:prstGeom>
+          <a:ln w="19050">
+            <a:solidFill>
+              <a:schemeClr val="tx1"/>
+            </a:solidFill>
+          </a:ln>
+        </p:spPr>
+        <p:style>
+          <a:lnRef idx="1">
+            <a:schemeClr val="accent1"/>
+          </a:lnRef>
+          <a:fillRef idx="0">
+            <a:schemeClr val="accent1"/>
+          </a:fillRef>
+          <a:effectRef idx="0">
+            <a:schemeClr val="accent1"/>
+          </a:effectRef>
+          <a:fontRef idx="minor">
+            <a:schemeClr val="tx1"/>
+          </a:fontRef>
+        </p:style>
+      </p:cxnSp>
+      <p:sp>
+        <p:nvSpPr>
+          <p:cNvPr id="546" name="Rectangle: Rounded Corners 477">
+            <a:extLst>
+              <a:ext uri="{FF2B5EF4-FFF2-40B4-BE49-F238E27FC236}">
+                <a16:creationId xmlns:a16="http://schemas.microsoft.com/office/drawing/2014/main" id="{7E1E5DE9-DCD8-714D-ABFC-ECCB973064C4}"/>
+              </a:ext>
+            </a:extLst>
+          </p:cNvPr>
+          <p:cNvSpPr/>
+          <p:nvPr/>
+        </p:nvSpPr>
+        <p:spPr>
+          <a:xfrm>
+            <a:off x="9878297" y="12589634"/>
+            <a:ext cx="670757" cy="301176"/>
+          </a:xfrm>
+          <a:prstGeom prst="roundRect">
+            <a:avLst/>
+          </a:prstGeom>
+          <a:noFill/>
+          <a:ln w="12700" cap="flat" cmpd="sng" algn="ctr">
+            <a:solidFill>
+              <a:schemeClr val="tx1"/>
+            </a:solidFill>
+            <a:prstDash val="solid"/>
+            <a:miter lim="800000"/>
+          </a:ln>
+          <a:effectLst/>
+        </p:spPr>
+        <p:txBody>
+          <a:bodyPr rot="0" spcFirstLastPara="0" vertOverflow="overflow" horzOverflow="overflow" vert="horz" wrap="square" lIns="91440" tIns="45720" rIns="91440" bIns="45720" numCol="1" spcCol="0" rtlCol="0" fromWordArt="0" anchor="ctr" anchorCtr="0" forceAA="0" compatLnSpc="1">
+            <a:prstTxWarp prst="textNoShape">
+              <a:avLst/>
+            </a:prstTxWarp>
+            <a:noAutofit/>
+          </a:bodyPr>
+          <a:lstStyle/>
+          <a:p>
+            <a:pPr algn="ctr">
+              <a:lnSpc>
+                <a:spcPct val="90000"/>
+              </a:lnSpc>
+              <a:defRPr/>
+            </a:pPr>
+            <a:endParaRPr lang="en-US" sz="2000" kern="0" dirty="0">
+              <a:solidFill>
+                <a:srgbClr val="FFFFFF"/>
+              </a:solidFill>
+              <a:latin typeface="Arial"/>
+            </a:endParaRPr>
+          </a:p>
+        </p:txBody>
+      </p:sp>
+      <p:cxnSp>
+        <p:nvCxnSpPr>
+          <p:cNvPr id="547" name="Straight Connector 546">
+            <a:extLst>
+              <a:ext uri="{FF2B5EF4-FFF2-40B4-BE49-F238E27FC236}">
+                <a16:creationId xmlns:a16="http://schemas.microsoft.com/office/drawing/2014/main" id="{03722593-A2B3-7349-A8E2-1BF856166972}"/>
+              </a:ext>
+            </a:extLst>
+          </p:cNvPr>
+          <p:cNvCxnSpPr>
+            <a:cxnSpLocks/>
+            <a:endCxn id="546" idx="1"/>
+          </p:cNvCxnSpPr>
+          <p:nvPr/>
+        </p:nvCxnSpPr>
+        <p:spPr>
+          <a:xfrm>
+            <a:off x="9192075" y="12246878"/>
+            <a:ext cx="686222" cy="493344"/>
+          </a:xfrm>
+          <a:prstGeom prst="line">
+            <a:avLst/>
+          </a:prstGeom>
+          <a:ln w="19050">
+            <a:solidFill>
+              <a:schemeClr val="tx1"/>
+            </a:solidFill>
+          </a:ln>
+        </p:spPr>
+        <p:style>
+          <a:lnRef idx="1">
+            <a:schemeClr val="accent1"/>
+          </a:lnRef>
+          <a:fillRef idx="0">
+            <a:schemeClr val="accent1"/>
+          </a:fillRef>
+          <a:effectRef idx="0">
+            <a:schemeClr val="accent1"/>
+          </a:effectRef>
+          <a:fontRef idx="minor">
+            <a:schemeClr val="tx1"/>
+          </a:fontRef>
+        </p:style>
+      </p:cxnSp>
+      <p:pic>
+        <p:nvPicPr>
+          <p:cNvPr id="38" name="Picture 37">
+            <a:extLst>
+              <a:ext uri="{FF2B5EF4-FFF2-40B4-BE49-F238E27FC236}">
+                <a16:creationId xmlns:a16="http://schemas.microsoft.com/office/drawing/2014/main" id="{49B2C99B-8F33-BE43-9BDE-1A2B637ED3F0}"/>
+              </a:ext>
+            </a:extLst>
+          </p:cNvPr>
+          <p:cNvPicPr>
+            <a:picLocks noChangeAspect="1"/>
+          </p:cNvPicPr>
+          <p:nvPr/>
+        </p:nvPicPr>
+        <p:blipFill>
+          <a:blip r:embed="rId12">
+            <a:extLst>
+              <a:ext uri="{28A0092B-C50C-407E-A947-70E740481C1C}">
+                <a14:useLocalDpi xmlns:a14="http://schemas.microsoft.com/office/drawing/2010/main" val="0"/>
+              </a:ext>
+            </a:extLst>
+          </a:blip>
+          <a:stretch>
+            <a:fillRect/>
+          </a:stretch>
+        </p:blipFill>
+        <p:spPr>
+          <a:xfrm>
+            <a:off x="9897450" y="12618214"/>
+            <a:ext cx="638617" cy="242780"/>
+          </a:xfrm>
+          <a:prstGeom prst="rect">
+            <a:avLst/>
+          </a:prstGeom>
+        </p:spPr>
+      </p:pic>
+      <p:pic>
+        <p:nvPicPr>
+          <p:cNvPr id="47" name="Picture 46">
+            <a:extLst>
+              <a:ext uri="{FF2B5EF4-FFF2-40B4-BE49-F238E27FC236}">
+                <a16:creationId xmlns:a16="http://schemas.microsoft.com/office/drawing/2014/main" id="{DA15133C-4360-3846-B6BA-1A2DAAE90EC0}"/>
+              </a:ext>
+            </a:extLst>
+          </p:cNvPr>
+          <p:cNvPicPr>
+            <a:picLocks noChangeAspect="1"/>
+          </p:cNvPicPr>
+          <p:nvPr/>
+        </p:nvPicPr>
+        <p:blipFill>
+          <a:blip r:embed="rId13">
+            <a:extLst>
+              <a:ext uri="{28A0092B-C50C-407E-A947-70E740481C1C}">
+                <a14:useLocalDpi xmlns:a14="http://schemas.microsoft.com/office/drawing/2010/main" val="0"/>
+              </a:ext>
+            </a:extLst>
+          </a:blip>
+          <a:stretch>
+            <a:fillRect/>
+          </a:stretch>
+        </p:blipFill>
+        <p:spPr>
+          <a:xfrm>
+            <a:off x="9883186" y="12228731"/>
+            <a:ext cx="288241" cy="263997"/>
+          </a:xfrm>
+          <a:prstGeom prst="rect">
+            <a:avLst/>
+          </a:prstGeom>
+        </p:spPr>
+      </p:pic>
+      <p:sp>
+        <p:nvSpPr>
+          <p:cNvPr id="550" name="TextBox 549">
+            <a:extLst>
+              <a:ext uri="{FF2B5EF4-FFF2-40B4-BE49-F238E27FC236}">
+                <a16:creationId xmlns:a16="http://schemas.microsoft.com/office/drawing/2014/main" id="{F99C73CF-5C62-A644-B7F8-1537278ED98E}"/>
+              </a:ext>
+            </a:extLst>
+          </p:cNvPr>
+          <p:cNvSpPr txBox="1"/>
+          <p:nvPr/>
+        </p:nvSpPr>
+        <p:spPr>
+          <a:xfrm>
+            <a:off x="10076961" y="12241705"/>
+            <a:ext cx="485488" cy="230832"/>
+          </a:xfrm>
+          <a:prstGeom prst="rect">
+            <a:avLst/>
+          </a:prstGeom>
+          <a:noFill/>
+        </p:spPr>
+        <p:txBody>
+          <a:bodyPr wrap="square" rtlCol="0">
+            <a:spAutoFit/>
+          </a:bodyPr>
+          <a:lstStyle/>
+          <a:p>
+            <a:pPr algn="ctr"/>
+            <a:r>
+              <a:rPr lang="en-US" sz="900" dirty="0">
+                <a:cs typeface="Al Bayan Plain" pitchFamily="2" charset="-78"/>
+              </a:rPr>
+              <a:t>GitLab</a:t>
+            </a:r>
+          </a:p>
+        </p:txBody>
+      </p:sp>
     </p:spTree>
     <p:extLst>
       <p:ext uri="{BB962C8B-B14F-4D97-AF65-F5344CB8AC3E}">

</xml_diff>

<commit_message>
update for big-iq test drive
</commit_message>
<xml_diff>
--- a/docs/pptx/BlueprintDiag.pptx
+++ b/docs/pptx/BlueprintDiag.pptx
@@ -198,7 +198,7 @@
           <a:p>
             <a:fld id="{5E8AE13A-5A80-4F17-971D-03F4C3B28A8B}" type="datetimeFigureOut">
               <a:rPr lang="en-US" smtClean="0"/>
-              <a:t>9/2/20</a:t>
+              <a:t>9/10/20</a:t>
             </a:fld>
             <a:endParaRPr lang="en-US"/>
           </a:p>
@@ -1922,7 +1922,7 @@
           <a:p>
             <a:fld id="{24AFE612-74AD-4B6F-8D78-7C42EB8A6CD6}" type="datetimeFigureOut">
               <a:rPr lang="en-US" smtClean="0"/>
-              <a:t>9/2/20</a:t>
+              <a:t>9/10/20</a:t>
             </a:fld>
             <a:endParaRPr lang="en-US"/>
           </a:p>
@@ -2092,7 +2092,7 @@
           <a:p>
             <a:fld id="{24AFE612-74AD-4B6F-8D78-7C42EB8A6CD6}" type="datetimeFigureOut">
               <a:rPr lang="en-US" smtClean="0"/>
-              <a:t>9/2/20</a:t>
+              <a:t>9/10/20</a:t>
             </a:fld>
             <a:endParaRPr lang="en-US"/>
           </a:p>
@@ -2634,7 +2634,7 @@
           <a:p>
             <a:fld id="{24AFE612-74AD-4B6F-8D78-7C42EB8A6CD6}" type="datetimeFigureOut">
               <a:rPr lang="en-US" smtClean="0"/>
-              <a:t>9/2/20</a:t>
+              <a:t>9/10/20</a:t>
             </a:fld>
             <a:endParaRPr lang="en-US"/>
           </a:p>
@@ -2866,7 +2866,7 @@
           <a:p>
             <a:fld id="{24AFE612-74AD-4B6F-8D78-7C42EB8A6CD6}" type="datetimeFigureOut">
               <a:rPr lang="en-US" smtClean="0"/>
-              <a:t>9/2/20</a:t>
+              <a:t>9/10/20</a:t>
             </a:fld>
             <a:endParaRPr lang="en-US"/>
           </a:p>
@@ -3233,7 +3233,7 @@
           <a:p>
             <a:fld id="{24AFE612-74AD-4B6F-8D78-7C42EB8A6CD6}" type="datetimeFigureOut">
               <a:rPr lang="en-US" smtClean="0"/>
-              <a:t>9/2/20</a:t>
+              <a:t>9/10/20</a:t>
             </a:fld>
             <a:endParaRPr lang="en-US"/>
           </a:p>
@@ -3351,7 +3351,7 @@
           <a:p>
             <a:fld id="{24AFE612-74AD-4B6F-8D78-7C42EB8A6CD6}" type="datetimeFigureOut">
               <a:rPr lang="en-US" smtClean="0"/>
-              <a:t>9/2/20</a:t>
+              <a:t>9/10/20</a:t>
             </a:fld>
             <a:endParaRPr lang="en-US"/>
           </a:p>
@@ -3446,7 +3446,7 @@
           <a:p>
             <a:fld id="{24AFE612-74AD-4B6F-8D78-7C42EB8A6CD6}" type="datetimeFigureOut">
               <a:rPr lang="en-US" smtClean="0"/>
-              <a:t>9/2/20</a:t>
+              <a:t>9/10/20</a:t>
             </a:fld>
             <a:endParaRPr lang="en-US"/>
           </a:p>
@@ -3723,7 +3723,7 @@
           <a:p>
             <a:fld id="{24AFE612-74AD-4B6F-8D78-7C42EB8A6CD6}" type="datetimeFigureOut">
               <a:rPr lang="en-US" smtClean="0"/>
-              <a:t>9/2/20</a:t>
+              <a:t>9/10/20</a:t>
             </a:fld>
             <a:endParaRPr lang="en-US"/>
           </a:p>
@@ -3980,7 +3980,7 @@
           <a:p>
             <a:fld id="{24AFE612-74AD-4B6F-8D78-7C42EB8A6CD6}" type="datetimeFigureOut">
               <a:rPr lang="en-US" smtClean="0"/>
-              <a:t>9/2/20</a:t>
+              <a:t>9/10/20</a:t>
             </a:fld>
             <a:endParaRPr lang="en-US"/>
           </a:p>
@@ -4150,7 +4150,7 @@
           <a:p>
             <a:fld id="{24AFE612-74AD-4B6F-8D78-7C42EB8A6CD6}" type="datetimeFigureOut">
               <a:rPr lang="en-US" smtClean="0"/>
-              <a:t>9/2/20</a:t>
+              <a:t>9/10/20</a:t>
             </a:fld>
             <a:endParaRPr lang="en-US"/>
           </a:p>
@@ -4330,7 +4330,7 @@
           <a:p>
             <a:fld id="{24AFE612-74AD-4B6F-8D78-7C42EB8A6CD6}" type="datetimeFigureOut">
               <a:rPr lang="en-US" smtClean="0"/>
-              <a:t>9/2/20</a:t>
+              <a:t>9/10/20</a:t>
             </a:fld>
             <a:endParaRPr lang="en-US"/>
           </a:p>
@@ -7589,7 +7589,7 @@
           <a:p>
             <a:fld id="{24AFE612-74AD-4B6F-8D78-7C42EB8A6CD6}" type="datetimeFigureOut">
               <a:rPr lang="en-US" smtClean="0"/>
-              <a:t>9/2/20</a:t>
+              <a:t>9/10/20</a:t>
             </a:fld>
             <a:endParaRPr lang="en-US"/>
           </a:p>
@@ -9781,14 +9781,14 @@
           </a:ln>
           <a:extLst>
             <a:ext uri="{909E8E84-426E-40dd-AFC4-6F175D3DCCD1}">
-              <a14:hiddenFill xmlns:a14="http://schemas.microsoft.com/office/drawing/2010/main" xmlns="">
+              <a14:hiddenFill xmlns="" xmlns:a14="http://schemas.microsoft.com/office/drawing/2010/main">
                 <a:solidFill>
                   <a:srgbClr val="FFFFFF"/>
                 </a:solidFill>
               </a14:hiddenFill>
             </a:ext>
             <a:ext uri="{91240B29-F687-4f45-9708-019B960494DF}">
-              <a14:hiddenLine xmlns:a14="http://schemas.microsoft.com/office/drawing/2010/main" xmlns="" w="9525">
+              <a14:hiddenLine xmlns="" xmlns:a14="http://schemas.microsoft.com/office/drawing/2010/main" w="9525">
                 <a:solidFill>
                   <a:srgbClr val="000000"/>
                 </a:solidFill>
@@ -11233,7 +11233,7 @@
             </a:ln>
             <a:extLst>
               <a:ext uri="{91240B29-F687-4f45-9708-019B960494DF}">
-                <a14:hiddenLine xmlns:a14="http://schemas.microsoft.com/office/drawing/2010/main" xmlns="" w="9525">
+                <a14:hiddenLine xmlns="" xmlns:a14="http://schemas.microsoft.com/office/drawing/2010/main" w="9525">
                   <a:solidFill>
                     <a:srgbClr val="000000"/>
                   </a:solidFill>
@@ -11293,14 +11293,14 @@
             </a:ln>
             <a:extLst>
               <a:ext uri="{909E8E84-426E-40dd-AFC4-6F175D3DCCD1}">
-                <a14:hiddenFill xmlns:a14="http://schemas.microsoft.com/office/drawing/2010/main" xmlns="">
+                <a14:hiddenFill xmlns="" xmlns:a14="http://schemas.microsoft.com/office/drawing/2010/main">
                   <a:solidFill>
                     <a:srgbClr val="FFFFFF"/>
                   </a:solidFill>
                 </a14:hiddenFill>
               </a:ext>
               <a:ext uri="{91240B29-F687-4f45-9708-019B960494DF}">
-                <a14:hiddenLine xmlns:a14="http://schemas.microsoft.com/office/drawing/2010/main" xmlns="" w="9525">
+                <a14:hiddenLine xmlns="" xmlns:a14="http://schemas.microsoft.com/office/drawing/2010/main" w="9525">
                   <a:solidFill>
                     <a:srgbClr val="000000"/>
                   </a:solidFill>
@@ -11429,7 +11429,7 @@
             </a:ln>
             <a:extLst>
               <a:ext uri="{91240B29-F687-4f45-9708-019B960494DF}">
-                <a14:hiddenLine xmlns:a14="http://schemas.microsoft.com/office/drawing/2010/main" xmlns="" w="9525">
+                <a14:hiddenLine xmlns="" xmlns:a14="http://schemas.microsoft.com/office/drawing/2010/main" w="9525">
                   <a:solidFill>
                     <a:srgbClr val="000000"/>
                   </a:solidFill>
@@ -11574,7 +11574,7 @@
             </a:ln>
             <a:extLst>
               <a:ext uri="{91240B29-F687-4f45-9708-019B960494DF}">
-                <a14:hiddenLine xmlns:a14="http://schemas.microsoft.com/office/drawing/2010/main" xmlns="" w="9525">
+                <a14:hiddenLine xmlns="" xmlns:a14="http://schemas.microsoft.com/office/drawing/2010/main" w="9525">
                   <a:solidFill>
                     <a:srgbClr val="000000"/>
                   </a:solidFill>
@@ -11783,7 +11783,7 @@
             </a:ln>
             <a:extLst>
               <a:ext uri="{91240B29-F687-4f45-9708-019B960494DF}">
-                <a14:hiddenLine xmlns:a14="http://schemas.microsoft.com/office/drawing/2010/main" xmlns="" w="9525">
+                <a14:hiddenLine xmlns="" xmlns:a14="http://schemas.microsoft.com/office/drawing/2010/main" w="9525">
                   <a:solidFill>
                     <a:srgbClr val="000000"/>
                   </a:solidFill>
@@ -11943,7 +11943,7 @@
           </a:ln>
           <a:extLst>
             <a:ext uri="{91240B29-F687-4f45-9708-019B960494DF}">
-              <a14:hiddenLine xmlns:a14="http://schemas.microsoft.com/office/drawing/2010/main" xmlns="" w="9525">
+              <a14:hiddenLine xmlns="" xmlns:a14="http://schemas.microsoft.com/office/drawing/2010/main" w="9525">
                 <a:solidFill>
                   <a:srgbClr val="000000"/>
                 </a:solidFill>
@@ -12129,7 +12129,7 @@
           </a:ln>
           <a:extLst>
             <a:ext uri="{91240B29-F687-4f45-9708-019B960494DF}">
-              <a14:hiddenLine xmlns:a14="http://schemas.microsoft.com/office/drawing/2010/main" xmlns="" w="9525">
+              <a14:hiddenLine xmlns="" xmlns:a14="http://schemas.microsoft.com/office/drawing/2010/main" w="9525">
                 <a:solidFill>
                   <a:srgbClr val="000000"/>
                 </a:solidFill>
@@ -12348,7 +12348,7 @@
           </a:ln>
           <a:extLst>
             <a:ext uri="{91240B29-F687-4f45-9708-019B960494DF}">
-              <a14:hiddenLine xmlns:a14="http://schemas.microsoft.com/office/drawing/2010/main" xmlns="" w="9525">
+              <a14:hiddenLine xmlns="" xmlns:a14="http://schemas.microsoft.com/office/drawing/2010/main" w="9525">
                 <a:solidFill>
                   <a:srgbClr val="000000"/>
                 </a:solidFill>
@@ -12557,7 +12557,7 @@
           </a:ln>
           <a:extLst>
             <a:ext uri="{91240B29-F687-4f45-9708-019B960494DF}">
-              <a14:hiddenLine xmlns:a14="http://schemas.microsoft.com/office/drawing/2010/main" xmlns="" w="9525">
+              <a14:hiddenLine xmlns="" xmlns:a14="http://schemas.microsoft.com/office/drawing/2010/main" w="9525">
                 <a:solidFill>
                   <a:srgbClr val="000000"/>
                 </a:solidFill>
@@ -12817,49 +12817,6 @@
       </p:sp>
       <p:cxnSp>
         <p:nvCxnSpPr>
-          <p:cNvPr id="603" name="Straight Connector 602">
-            <a:extLst>
-              <a:ext uri="{FF2B5EF4-FFF2-40B4-BE49-F238E27FC236}">
-                <a16:creationId xmlns:a16="http://schemas.microsoft.com/office/drawing/2014/main" id="{F6391EC9-F35E-403A-A213-C1226F1791DE}"/>
-              </a:ext>
-            </a:extLst>
-          </p:cNvPr>
-          <p:cNvCxnSpPr>
-            <a:cxnSpLocks/>
-          </p:cNvCxnSpPr>
-          <p:nvPr/>
-        </p:nvCxnSpPr>
-        <p:spPr>
-          <a:xfrm flipH="1" flipV="1">
-            <a:off x="6394083" y="9574403"/>
-            <a:ext cx="1355742" cy="1979938"/>
-          </a:xfrm>
-          <a:prstGeom prst="line">
-            <a:avLst/>
-          </a:prstGeom>
-          <a:ln w="19050">
-            <a:solidFill>
-              <a:schemeClr val="accent1"/>
-            </a:solidFill>
-          </a:ln>
-        </p:spPr>
-        <p:style>
-          <a:lnRef idx="1">
-            <a:schemeClr val="accent1"/>
-          </a:lnRef>
-          <a:fillRef idx="0">
-            <a:schemeClr val="accent1"/>
-          </a:fillRef>
-          <a:effectRef idx="0">
-            <a:schemeClr val="accent1"/>
-          </a:effectRef>
-          <a:fontRef idx="minor">
-            <a:schemeClr val="tx1"/>
-          </a:fontRef>
-        </p:style>
-      </p:cxnSp>
-      <p:cxnSp>
-        <p:nvCxnSpPr>
           <p:cNvPr id="622" name="Straight Connector 621">
             <a:extLst>
               <a:ext uri="{FF2B5EF4-FFF2-40B4-BE49-F238E27FC236}">
@@ -13049,7 +13006,7 @@
             </a:ln>
             <a:extLst>
               <a:ext uri="{91240B29-F687-4f45-9708-019B960494DF}">
-                <a14:hiddenLine xmlns:a14="http://schemas.microsoft.com/office/drawing/2010/main" xmlns="" w="9525">
+                <a14:hiddenLine xmlns="" xmlns:a14="http://schemas.microsoft.com/office/drawing/2010/main" w="9525">
                   <a:solidFill>
                     <a:srgbClr val="000000"/>
                   </a:solidFill>
@@ -13109,14 +13066,14 @@
             </a:ln>
             <a:extLst>
               <a:ext uri="{909E8E84-426E-40dd-AFC4-6F175D3DCCD1}">
-                <a14:hiddenFill xmlns:a14="http://schemas.microsoft.com/office/drawing/2010/main" xmlns="">
+                <a14:hiddenFill xmlns="" xmlns:a14="http://schemas.microsoft.com/office/drawing/2010/main">
                   <a:solidFill>
                     <a:srgbClr val="FFFFFF"/>
                   </a:solidFill>
                 </a14:hiddenFill>
               </a:ext>
               <a:ext uri="{91240B29-F687-4f45-9708-019B960494DF}">
-                <a14:hiddenLine xmlns:a14="http://schemas.microsoft.com/office/drawing/2010/main" xmlns="" w="9525">
+                <a14:hiddenLine xmlns="" xmlns:a14="http://schemas.microsoft.com/office/drawing/2010/main" w="9525">
                   <a:solidFill>
                     <a:srgbClr val="000000"/>
                   </a:solidFill>
@@ -13245,7 +13202,7 @@
             </a:ln>
             <a:extLst>
               <a:ext uri="{91240B29-F687-4f45-9708-019B960494DF}">
-                <a14:hiddenLine xmlns:a14="http://schemas.microsoft.com/office/drawing/2010/main" xmlns="" w="9525">
+                <a14:hiddenLine xmlns="" xmlns:a14="http://schemas.microsoft.com/office/drawing/2010/main" w="9525">
                   <a:solidFill>
                     <a:srgbClr val="000000"/>
                   </a:solidFill>
@@ -13390,7 +13347,7 @@
             </a:ln>
             <a:extLst>
               <a:ext uri="{91240B29-F687-4f45-9708-019B960494DF}">
-                <a14:hiddenLine xmlns:a14="http://schemas.microsoft.com/office/drawing/2010/main" xmlns="" w="9525">
+                <a14:hiddenLine xmlns="" xmlns:a14="http://schemas.microsoft.com/office/drawing/2010/main" w="9525">
                   <a:solidFill>
                     <a:srgbClr val="000000"/>
                   </a:solidFill>
@@ -13599,7 +13556,7 @@
             </a:ln>
             <a:extLst>
               <a:ext uri="{91240B29-F687-4f45-9708-019B960494DF}">
-                <a14:hiddenLine xmlns:a14="http://schemas.microsoft.com/office/drawing/2010/main" xmlns="" w="9525">
+                <a14:hiddenLine xmlns="" xmlns:a14="http://schemas.microsoft.com/office/drawing/2010/main" w="9525">
                   <a:solidFill>
                     <a:srgbClr val="000000"/>
                   </a:solidFill>
@@ -13682,14 +13639,14 @@
             </a:ln>
             <a:extLst>
               <a:ext uri="{909E8E84-426E-40dd-AFC4-6F175D3DCCD1}">
-                <a14:hiddenFill xmlns:a14="http://schemas.microsoft.com/office/drawing/2010/main" xmlns="">
+                <a14:hiddenFill xmlns="" xmlns:a14="http://schemas.microsoft.com/office/drawing/2010/main">
                   <a:solidFill>
                     <a:srgbClr val="FFFFFF"/>
                   </a:solidFill>
                 </a14:hiddenFill>
               </a:ext>
               <a:ext uri="{91240B29-F687-4f45-9708-019B960494DF}">
-                <a14:hiddenLine xmlns:a14="http://schemas.microsoft.com/office/drawing/2010/main" xmlns="" w="9525">
+                <a14:hiddenLine xmlns="" xmlns:a14="http://schemas.microsoft.com/office/drawing/2010/main" w="9525">
                   <a:solidFill>
                     <a:srgbClr val="000000"/>
                   </a:solidFill>
@@ -13848,7 +13805,7 @@
             </a:ln>
             <a:extLst>
               <a:ext uri="{91240B29-F687-4f45-9708-019B960494DF}">
-                <a14:hiddenLine xmlns:a14="http://schemas.microsoft.com/office/drawing/2010/main" xmlns="" w="9525">
+                <a14:hiddenLine xmlns="" xmlns:a14="http://schemas.microsoft.com/office/drawing/2010/main" w="9525">
                   <a:solidFill>
                     <a:srgbClr val="000000"/>
                   </a:solidFill>
@@ -14034,7 +13991,7 @@
             </a:ln>
             <a:extLst>
               <a:ext uri="{91240B29-F687-4f45-9708-019B960494DF}">
-                <a14:hiddenLine xmlns:a14="http://schemas.microsoft.com/office/drawing/2010/main" xmlns="" w="9525">
+                <a14:hiddenLine xmlns="" xmlns:a14="http://schemas.microsoft.com/office/drawing/2010/main" w="9525">
                   <a:solidFill>
                     <a:srgbClr val="000000"/>
                   </a:solidFill>
@@ -14240,7 +14197,7 @@
             </a:ln>
             <a:extLst>
               <a:ext uri="{91240B29-F687-4f45-9708-019B960494DF}">
-                <a14:hiddenLine xmlns:a14="http://schemas.microsoft.com/office/drawing/2010/main" xmlns="" w="9525">
+                <a14:hiddenLine xmlns="" xmlns:a14="http://schemas.microsoft.com/office/drawing/2010/main" w="9525">
                   <a:solidFill>
                     <a:srgbClr val="000000"/>
                   </a:solidFill>
@@ -14449,7 +14406,7 @@
             </a:ln>
             <a:extLst>
               <a:ext uri="{91240B29-F687-4f45-9708-019B960494DF}">
-                <a14:hiddenLine xmlns:a14="http://schemas.microsoft.com/office/drawing/2010/main" xmlns="" w="9525">
+                <a14:hiddenLine xmlns="" xmlns:a14="http://schemas.microsoft.com/office/drawing/2010/main" w="9525">
                   <a:solidFill>
                     <a:srgbClr val="000000"/>
                   </a:solidFill>
@@ -14532,14 +14489,14 @@
             </a:ln>
             <a:extLst>
               <a:ext uri="{909E8E84-426E-40dd-AFC4-6F175D3DCCD1}">
-                <a14:hiddenFill xmlns:a14="http://schemas.microsoft.com/office/drawing/2010/main" xmlns="">
+                <a14:hiddenFill xmlns="" xmlns:a14="http://schemas.microsoft.com/office/drawing/2010/main">
                   <a:solidFill>
                     <a:srgbClr val="FFFFFF"/>
                   </a:solidFill>
                 </a14:hiddenFill>
               </a:ext>
               <a:ext uri="{91240B29-F687-4f45-9708-019B960494DF}">
-                <a14:hiddenLine xmlns:a14="http://schemas.microsoft.com/office/drawing/2010/main" xmlns="" w="9525">
+                <a14:hiddenLine xmlns="" xmlns:a14="http://schemas.microsoft.com/office/drawing/2010/main" w="9525">
                   <a:solidFill>
                     <a:srgbClr val="000000"/>
                   </a:solidFill>
@@ -14698,7 +14655,7 @@
             </a:ln>
             <a:extLst>
               <a:ext uri="{91240B29-F687-4f45-9708-019B960494DF}">
-                <a14:hiddenLine xmlns:a14="http://schemas.microsoft.com/office/drawing/2010/main" xmlns="" w="9525">
+                <a14:hiddenLine xmlns="" xmlns:a14="http://schemas.microsoft.com/office/drawing/2010/main" w="9525">
                   <a:solidFill>
                     <a:srgbClr val="000000"/>
                   </a:solidFill>
@@ -14884,7 +14841,7 @@
             </a:ln>
             <a:extLst>
               <a:ext uri="{91240B29-F687-4f45-9708-019B960494DF}">
-                <a14:hiddenLine xmlns:a14="http://schemas.microsoft.com/office/drawing/2010/main" xmlns="" w="9525">
+                <a14:hiddenLine xmlns="" xmlns:a14="http://schemas.microsoft.com/office/drawing/2010/main" w="9525">
                   <a:solidFill>
                     <a:srgbClr val="000000"/>
                   </a:solidFill>
@@ -15103,7 +15060,7 @@
             </a:ln>
             <a:extLst>
               <a:ext uri="{91240B29-F687-4f45-9708-019B960494DF}">
-                <a14:hiddenLine xmlns:a14="http://schemas.microsoft.com/office/drawing/2010/main" xmlns="" w="9525">
+                <a14:hiddenLine xmlns="" xmlns:a14="http://schemas.microsoft.com/office/drawing/2010/main" w="9525">
                   <a:solidFill>
                     <a:srgbClr val="000000"/>
                   </a:solidFill>
@@ -15312,7 +15269,7 @@
             </a:ln>
             <a:extLst>
               <a:ext uri="{91240B29-F687-4f45-9708-019B960494DF}">
-                <a14:hiddenLine xmlns:a14="http://schemas.microsoft.com/office/drawing/2010/main" xmlns="" w="9525">
+                <a14:hiddenLine xmlns="" xmlns:a14="http://schemas.microsoft.com/office/drawing/2010/main" w="9525">
                   <a:solidFill>
                     <a:srgbClr val="000000"/>
                   </a:solidFill>
@@ -15393,14 +15350,14 @@
             </a:ln>
             <a:extLst>
               <a:ext uri="{909E8E84-426E-40dd-AFC4-6F175D3DCCD1}">
-                <a14:hiddenFill xmlns="" xmlns:a14="http://schemas.microsoft.com/office/drawing/2010/main">
+                <a14:hiddenFill xmlns:a14="http://schemas.microsoft.com/office/drawing/2010/main" xmlns="">
                   <a:solidFill>
                     <a:srgbClr val="FFFFFF"/>
                   </a:solidFill>
                 </a14:hiddenFill>
               </a:ext>
               <a:ext uri="{91240B29-F687-4f45-9708-019B960494DF}">
-                <a14:hiddenLine xmlns="" xmlns:a14="http://schemas.microsoft.com/office/drawing/2010/main" w="9525">
+                <a14:hiddenLine xmlns:a14="http://schemas.microsoft.com/office/drawing/2010/main" xmlns="" w="9525">
                   <a:solidFill>
                     <a:srgbClr val="000000"/>
                   </a:solidFill>
@@ -15556,7 +15513,7 @@
             </a:ln>
             <a:extLst>
               <a:ext uri="{91240B29-F687-4f45-9708-019B960494DF}">
-                <a14:hiddenLine xmlns="" xmlns:a14="http://schemas.microsoft.com/office/drawing/2010/main" w="9525">
+                <a14:hiddenLine xmlns:a14="http://schemas.microsoft.com/office/drawing/2010/main" xmlns="" w="9525">
                   <a:solidFill>
                     <a:srgbClr val="000000"/>
                   </a:solidFill>
@@ -15672,14 +15629,14 @@
             </a:ln>
             <a:extLst>
               <a:ext uri="{909E8E84-426E-40dd-AFC4-6F175D3DCCD1}">
-                <a14:hiddenFill xmlns="" xmlns:a14="http://schemas.microsoft.com/office/drawing/2010/main">
+                <a14:hiddenFill xmlns:a14="http://schemas.microsoft.com/office/drawing/2010/main" xmlns="">
                   <a:solidFill>
                     <a:srgbClr val="FFFFFF"/>
                   </a:solidFill>
                 </a14:hiddenFill>
               </a:ext>
               <a:ext uri="{91240B29-F687-4f45-9708-019B960494DF}">
-                <a14:hiddenLine xmlns="" xmlns:a14="http://schemas.microsoft.com/office/drawing/2010/main" w="9525">
+                <a14:hiddenLine xmlns:a14="http://schemas.microsoft.com/office/drawing/2010/main" xmlns="" w="9525">
                   <a:solidFill>
                     <a:srgbClr val="000000"/>
                   </a:solidFill>
@@ -15835,7 +15792,7 @@
             </a:ln>
             <a:extLst>
               <a:ext uri="{91240B29-F687-4f45-9708-019B960494DF}">
-                <a14:hiddenLine xmlns="" xmlns:a14="http://schemas.microsoft.com/office/drawing/2010/main" w="9525">
+                <a14:hiddenLine xmlns:a14="http://schemas.microsoft.com/office/drawing/2010/main" xmlns="" w="9525">
                   <a:solidFill>
                     <a:srgbClr val="000000"/>
                   </a:solidFill>
@@ -16018,7 +15975,7 @@
             </a:ln>
             <a:extLst>
               <a:ext uri="{91240B29-F687-4f45-9708-019B960494DF}">
-                <a14:hiddenLine xmlns="" xmlns:a14="http://schemas.microsoft.com/office/drawing/2010/main" w="9525">
+                <a14:hiddenLine xmlns:a14="http://schemas.microsoft.com/office/drawing/2010/main" xmlns="" w="9525">
                   <a:solidFill>
                     <a:srgbClr val="000000"/>
                   </a:solidFill>
@@ -16176,7 +16133,7 @@
             </a:ln>
             <a:extLst>
               <a:ext uri="{91240B29-F687-4f45-9708-019B960494DF}">
-                <a14:hiddenLine xmlns="" xmlns:a14="http://schemas.microsoft.com/office/drawing/2010/main" w="9525">
+                <a14:hiddenLine xmlns:a14="http://schemas.microsoft.com/office/drawing/2010/main" xmlns="" w="9525">
                   <a:solidFill>
                     <a:srgbClr val="000000"/>
                   </a:solidFill>
@@ -16382,7 +16339,7 @@
             </a:ln>
             <a:extLst>
               <a:ext uri="{91240B29-F687-4f45-9708-019B960494DF}">
-                <a14:hiddenLine xmlns="" xmlns:a14="http://schemas.microsoft.com/office/drawing/2010/main" w="9525">
+                <a14:hiddenLine xmlns:a14="http://schemas.microsoft.com/office/drawing/2010/main" xmlns="" w="9525">
                   <a:solidFill>
                     <a:srgbClr val="000000"/>
                   </a:solidFill>
@@ -20809,7 +20766,7 @@
             </a:ln>
             <a:extLst>
               <a:ext uri="{91240B29-F687-4f45-9708-019B960494DF}">
-                <a14:hiddenLine xmlns:a14="http://schemas.microsoft.com/office/drawing/2010/main" xmlns="" w="9525">
+                <a14:hiddenLine xmlns="" xmlns:a14="http://schemas.microsoft.com/office/drawing/2010/main" w="9525">
                   <a:solidFill>
                     <a:srgbClr val="000000"/>
                   </a:solidFill>
@@ -21163,49 +21120,6 @@
           <a:xfrm flipH="1" flipV="1">
             <a:off x="3962732" y="9342971"/>
             <a:ext cx="891071" cy="1969999"/>
-          </a:xfrm>
-          <a:prstGeom prst="line">
-            <a:avLst/>
-          </a:prstGeom>
-          <a:ln w="19050">
-            <a:solidFill>
-              <a:schemeClr val="accent1"/>
-            </a:solidFill>
-          </a:ln>
-        </p:spPr>
-        <p:style>
-          <a:lnRef idx="1">
-            <a:schemeClr val="accent1"/>
-          </a:lnRef>
-          <a:fillRef idx="0">
-            <a:schemeClr val="accent1"/>
-          </a:fillRef>
-          <a:effectRef idx="0">
-            <a:schemeClr val="accent1"/>
-          </a:effectRef>
-          <a:fontRef idx="minor">
-            <a:schemeClr val="tx1"/>
-          </a:fontRef>
-        </p:style>
-      </p:cxnSp>
-      <p:cxnSp>
-        <p:nvCxnSpPr>
-          <p:cNvPr id="477" name="Straight Connector 476">
-            <a:extLst>
-              <a:ext uri="{FF2B5EF4-FFF2-40B4-BE49-F238E27FC236}">
-                <a16:creationId xmlns:a16="http://schemas.microsoft.com/office/drawing/2014/main" id="{7E8934AB-8B21-4118-9662-A0A96764EC83}"/>
-              </a:ext>
-            </a:extLst>
-          </p:cNvPr>
-          <p:cNvCxnSpPr>
-            <a:cxnSpLocks/>
-          </p:cNvCxnSpPr>
-          <p:nvPr/>
-        </p:nvCxnSpPr>
-        <p:spPr>
-          <a:xfrm flipH="1" flipV="1">
-            <a:off x="4850545" y="11314203"/>
-            <a:ext cx="2850656" cy="653584"/>
           </a:xfrm>
           <a:prstGeom prst="line">
             <a:avLst/>
@@ -22474,14 +22388,14 @@
           </a:ln>
           <a:extLst>
             <a:ext uri="{909E8E84-426E-40dd-AFC4-6F175D3DCCD1}">
-              <a14:hiddenFill xmlns:a14="http://schemas.microsoft.com/office/drawing/2010/main" xmlns="">
+              <a14:hiddenFill xmlns="" xmlns:a14="http://schemas.microsoft.com/office/drawing/2010/main">
                 <a:solidFill>
                   <a:srgbClr val="FFFFFF"/>
                 </a:solidFill>
               </a14:hiddenFill>
             </a:ext>
             <a:ext uri="{91240B29-F687-4f45-9708-019B960494DF}">
-              <a14:hiddenLine xmlns:a14="http://schemas.microsoft.com/office/drawing/2010/main" xmlns="" w="9525">
+              <a14:hiddenLine xmlns="" xmlns:a14="http://schemas.microsoft.com/office/drawing/2010/main" w="9525">
                 <a:solidFill>
                   <a:srgbClr val="000000"/>
                 </a:solidFill>
@@ -22822,7 +22736,7 @@
             </a:ln>
             <a:extLst>
               <a:ext uri="{91240B29-F687-4f45-9708-019B960494DF}">
-                <a14:hiddenLine xmlns:a14="http://schemas.microsoft.com/office/drawing/2010/main" xmlns="" w="9525">
+                <a14:hiddenLine xmlns="" xmlns:a14="http://schemas.microsoft.com/office/drawing/2010/main" w="9525">
                   <a:solidFill>
                     <a:srgbClr val="000000"/>
                   </a:solidFill>
@@ -22882,14 +22796,14 @@
             </a:ln>
             <a:extLst>
               <a:ext uri="{909E8E84-426E-40dd-AFC4-6F175D3DCCD1}">
-                <a14:hiddenFill xmlns:a14="http://schemas.microsoft.com/office/drawing/2010/main" xmlns="">
+                <a14:hiddenFill xmlns="" xmlns:a14="http://schemas.microsoft.com/office/drawing/2010/main">
                   <a:solidFill>
                     <a:srgbClr val="FFFFFF"/>
                   </a:solidFill>
                 </a14:hiddenFill>
               </a:ext>
               <a:ext uri="{91240B29-F687-4f45-9708-019B960494DF}">
-                <a14:hiddenLine xmlns:a14="http://schemas.microsoft.com/office/drawing/2010/main" xmlns="" w="9525">
+                <a14:hiddenLine xmlns="" xmlns:a14="http://schemas.microsoft.com/office/drawing/2010/main" w="9525">
                   <a:solidFill>
                     <a:srgbClr val="000000"/>
                   </a:solidFill>
@@ -23018,7 +22932,7 @@
             </a:ln>
             <a:extLst>
               <a:ext uri="{91240B29-F687-4f45-9708-019B960494DF}">
-                <a14:hiddenLine xmlns:a14="http://schemas.microsoft.com/office/drawing/2010/main" xmlns="" w="9525">
+                <a14:hiddenLine xmlns="" xmlns:a14="http://schemas.microsoft.com/office/drawing/2010/main" w="9525">
                   <a:solidFill>
                     <a:srgbClr val="000000"/>
                   </a:solidFill>
@@ -23163,7 +23077,7 @@
             </a:ln>
             <a:extLst>
               <a:ext uri="{91240B29-F687-4f45-9708-019B960494DF}">
-                <a14:hiddenLine xmlns:a14="http://schemas.microsoft.com/office/drawing/2010/main" xmlns="" w="9525">
+                <a14:hiddenLine xmlns="" xmlns:a14="http://schemas.microsoft.com/office/drawing/2010/main" w="9525">
                   <a:solidFill>
                     <a:srgbClr val="000000"/>
                   </a:solidFill>
@@ -23372,7 +23286,7 @@
             </a:ln>
             <a:extLst>
               <a:ext uri="{91240B29-F687-4f45-9708-019B960494DF}">
-                <a14:hiddenLine xmlns:a14="http://schemas.microsoft.com/office/drawing/2010/main" xmlns="" w="9525">
+                <a14:hiddenLine xmlns="" xmlns:a14="http://schemas.microsoft.com/office/drawing/2010/main" w="9525">
                   <a:solidFill>
                     <a:srgbClr val="000000"/>
                   </a:solidFill>
@@ -23559,7 +23473,7 @@
           </a:ln>
           <a:extLst>
             <a:ext uri="{91240B29-F687-4f45-9708-019B960494DF}">
-              <a14:hiddenLine xmlns:a14="http://schemas.microsoft.com/office/drawing/2010/main" xmlns="" w="9525">
+              <a14:hiddenLine xmlns="" xmlns:a14="http://schemas.microsoft.com/office/drawing/2010/main" w="9525">
                 <a:solidFill>
                   <a:srgbClr val="000000"/>
                 </a:solidFill>
@@ -23778,7 +23692,7 @@
           </a:ln>
           <a:extLst>
             <a:ext uri="{91240B29-F687-4f45-9708-019B960494DF}">
-              <a14:hiddenLine xmlns:a14="http://schemas.microsoft.com/office/drawing/2010/main" xmlns="" w="9525">
+              <a14:hiddenLine xmlns="" xmlns:a14="http://schemas.microsoft.com/office/drawing/2010/main" w="9525">
                 <a:solidFill>
                   <a:srgbClr val="000000"/>
                 </a:solidFill>
@@ -23987,7 +23901,7 @@
           </a:ln>
           <a:extLst>
             <a:ext uri="{91240B29-F687-4f45-9708-019B960494DF}">
-              <a14:hiddenLine xmlns:a14="http://schemas.microsoft.com/office/drawing/2010/main" xmlns="" w="9525">
+              <a14:hiddenLine xmlns="" xmlns:a14="http://schemas.microsoft.com/office/drawing/2010/main" w="9525">
                 <a:solidFill>
                   <a:srgbClr val="000000"/>
                 </a:solidFill>
@@ -24293,14 +24207,14 @@
             </a:ln>
             <a:extLst>
               <a:ext uri="{909E8E84-426E-40dd-AFC4-6F175D3DCCD1}">
-                <a14:hiddenFill xmlns:a14="http://schemas.microsoft.com/office/drawing/2010/main" xmlns="">
+                <a14:hiddenFill xmlns="" xmlns:a14="http://schemas.microsoft.com/office/drawing/2010/main">
                   <a:solidFill>
                     <a:srgbClr val="FFFFFF"/>
                   </a:solidFill>
                 </a14:hiddenFill>
               </a:ext>
               <a:ext uri="{91240B29-F687-4f45-9708-019B960494DF}">
-                <a14:hiddenLine xmlns:a14="http://schemas.microsoft.com/office/drawing/2010/main" xmlns="" w="9525">
+                <a14:hiddenLine xmlns="" xmlns:a14="http://schemas.microsoft.com/office/drawing/2010/main" w="9525">
                   <a:solidFill>
                     <a:srgbClr val="000000"/>
                   </a:solidFill>
@@ -24459,7 +24373,7 @@
             </a:ln>
             <a:extLst>
               <a:ext uri="{91240B29-F687-4f45-9708-019B960494DF}">
-                <a14:hiddenLine xmlns:a14="http://schemas.microsoft.com/office/drawing/2010/main" xmlns="" w="9525">
+                <a14:hiddenLine xmlns="" xmlns:a14="http://schemas.microsoft.com/office/drawing/2010/main" w="9525">
                   <a:solidFill>
                     <a:srgbClr val="000000"/>
                   </a:solidFill>
@@ -25366,14 +25280,14 @@
             </a:ln>
             <a:extLst>
               <a:ext uri="{909E8E84-426E-40dd-AFC4-6F175D3DCCD1}">
-                <a14:hiddenFill xmlns="" xmlns:a14="http://schemas.microsoft.com/office/drawing/2010/main">
+                <a14:hiddenFill xmlns:a14="http://schemas.microsoft.com/office/drawing/2010/main" xmlns="">
                   <a:solidFill>
                     <a:srgbClr val="FFFFFF"/>
                   </a:solidFill>
                 </a14:hiddenFill>
               </a:ext>
               <a:ext uri="{91240B29-F687-4f45-9708-019B960494DF}">
-                <a14:hiddenLine xmlns="" xmlns:a14="http://schemas.microsoft.com/office/drawing/2010/main" w="9525">
+                <a14:hiddenLine xmlns:a14="http://schemas.microsoft.com/office/drawing/2010/main" xmlns="" w="9525">
                   <a:solidFill>
                     <a:srgbClr val="000000"/>
                   </a:solidFill>
@@ -25433,14 +25347,14 @@
             </a:ln>
             <a:extLst>
               <a:ext uri="{909E8E84-426E-40dd-AFC4-6F175D3DCCD1}">
-                <a14:hiddenFill xmlns="" xmlns:a14="http://schemas.microsoft.com/office/drawing/2010/main">
+                <a14:hiddenFill xmlns:a14="http://schemas.microsoft.com/office/drawing/2010/main" xmlns="">
                   <a:solidFill>
                     <a:srgbClr val="FFFFFF"/>
                   </a:solidFill>
                 </a14:hiddenFill>
               </a:ext>
               <a:ext uri="{91240B29-F687-4f45-9708-019B960494DF}">
-                <a14:hiddenLine xmlns="" xmlns:a14="http://schemas.microsoft.com/office/drawing/2010/main" w="9525">
+                <a14:hiddenLine xmlns:a14="http://schemas.microsoft.com/office/drawing/2010/main" xmlns="" w="9525">
                   <a:solidFill>
                     <a:srgbClr val="000000"/>
                   </a:solidFill>
@@ -25500,14 +25414,14 @@
             </a:ln>
             <a:extLst>
               <a:ext uri="{909E8E84-426E-40dd-AFC4-6F175D3DCCD1}">
-                <a14:hiddenFill xmlns="" xmlns:a14="http://schemas.microsoft.com/office/drawing/2010/main">
+                <a14:hiddenFill xmlns:a14="http://schemas.microsoft.com/office/drawing/2010/main" xmlns="">
                   <a:solidFill>
                     <a:srgbClr val="FFFFFF"/>
                   </a:solidFill>
                 </a14:hiddenFill>
               </a:ext>
               <a:ext uri="{91240B29-F687-4f45-9708-019B960494DF}">
-                <a14:hiddenLine xmlns="" xmlns:a14="http://schemas.microsoft.com/office/drawing/2010/main" w="9525">
+                <a14:hiddenLine xmlns:a14="http://schemas.microsoft.com/office/drawing/2010/main" xmlns="" w="9525">
                   <a:solidFill>
                     <a:srgbClr val="000000"/>
                   </a:solidFill>
@@ -25567,14 +25481,14 @@
             </a:ln>
             <a:extLst>
               <a:ext uri="{909E8E84-426E-40dd-AFC4-6F175D3DCCD1}">
-                <a14:hiddenFill xmlns="" xmlns:a14="http://schemas.microsoft.com/office/drawing/2010/main">
+                <a14:hiddenFill xmlns:a14="http://schemas.microsoft.com/office/drawing/2010/main" xmlns="">
                   <a:solidFill>
                     <a:srgbClr val="FFFFFF"/>
                   </a:solidFill>
                 </a14:hiddenFill>
               </a:ext>
               <a:ext uri="{91240B29-F687-4f45-9708-019B960494DF}">
-                <a14:hiddenLine xmlns="" xmlns:a14="http://schemas.microsoft.com/office/drawing/2010/main" w="9525">
+                <a14:hiddenLine xmlns:a14="http://schemas.microsoft.com/office/drawing/2010/main" xmlns="" w="9525">
                   <a:solidFill>
                     <a:srgbClr val="000000"/>
                   </a:solidFill>
@@ -25655,14 +25569,14 @@
             </a:ln>
             <a:extLst>
               <a:ext uri="{909E8E84-426E-40dd-AFC4-6F175D3DCCD1}">
-                <a14:hiddenFill xmlns="" xmlns:a14="http://schemas.microsoft.com/office/drawing/2010/main">
+                <a14:hiddenFill xmlns:a14="http://schemas.microsoft.com/office/drawing/2010/main" xmlns="">
                   <a:solidFill>
                     <a:srgbClr val="FFFFFF"/>
                   </a:solidFill>
                 </a14:hiddenFill>
               </a:ext>
               <a:ext uri="{91240B29-F687-4f45-9708-019B960494DF}">
-                <a14:hiddenLine xmlns="" xmlns:a14="http://schemas.microsoft.com/office/drawing/2010/main" w="9525">
+                <a14:hiddenLine xmlns:a14="http://schemas.microsoft.com/office/drawing/2010/main" xmlns="" w="9525">
                   <a:solidFill>
                     <a:srgbClr val="000000"/>
                   </a:solidFill>
@@ -25722,14 +25636,14 @@
             </a:ln>
             <a:extLst>
               <a:ext uri="{909E8E84-426E-40dd-AFC4-6F175D3DCCD1}">
-                <a14:hiddenFill xmlns="" xmlns:a14="http://schemas.microsoft.com/office/drawing/2010/main">
+                <a14:hiddenFill xmlns:a14="http://schemas.microsoft.com/office/drawing/2010/main" xmlns="">
                   <a:solidFill>
                     <a:srgbClr val="FFFFFF"/>
                   </a:solidFill>
                 </a14:hiddenFill>
               </a:ext>
               <a:ext uri="{91240B29-F687-4f45-9708-019B960494DF}">
-                <a14:hiddenLine xmlns="" xmlns:a14="http://schemas.microsoft.com/office/drawing/2010/main" w="9525">
+                <a14:hiddenLine xmlns:a14="http://schemas.microsoft.com/office/drawing/2010/main" xmlns="" w="9525">
                   <a:solidFill>
                     <a:srgbClr val="000000"/>
                   </a:solidFill>
@@ -25789,14 +25703,14 @@
             </a:ln>
             <a:extLst>
               <a:ext uri="{909E8E84-426E-40dd-AFC4-6F175D3DCCD1}">
-                <a14:hiddenFill xmlns="" xmlns:a14="http://schemas.microsoft.com/office/drawing/2010/main">
+                <a14:hiddenFill xmlns:a14="http://schemas.microsoft.com/office/drawing/2010/main" xmlns="">
                   <a:solidFill>
                     <a:srgbClr val="FFFFFF"/>
                   </a:solidFill>
                 </a14:hiddenFill>
               </a:ext>
               <a:ext uri="{91240B29-F687-4f45-9708-019B960494DF}">
-                <a14:hiddenLine xmlns="" xmlns:a14="http://schemas.microsoft.com/office/drawing/2010/main" w="9525">
+                <a14:hiddenLine xmlns:a14="http://schemas.microsoft.com/office/drawing/2010/main" xmlns="" w="9525">
                   <a:solidFill>
                     <a:srgbClr val="000000"/>
                   </a:solidFill>
@@ -25856,14 +25770,14 @@
             </a:ln>
             <a:extLst>
               <a:ext uri="{909E8E84-426E-40dd-AFC4-6F175D3DCCD1}">
-                <a14:hiddenFill xmlns="" xmlns:a14="http://schemas.microsoft.com/office/drawing/2010/main">
+                <a14:hiddenFill xmlns:a14="http://schemas.microsoft.com/office/drawing/2010/main" xmlns="">
                   <a:solidFill>
                     <a:srgbClr val="FFFFFF"/>
                   </a:solidFill>
                 </a14:hiddenFill>
               </a:ext>
               <a:ext uri="{91240B29-F687-4f45-9708-019B960494DF}">
-                <a14:hiddenLine xmlns="" xmlns:a14="http://schemas.microsoft.com/office/drawing/2010/main" w="9525">
+                <a14:hiddenLine xmlns:a14="http://schemas.microsoft.com/office/drawing/2010/main" xmlns="" w="9525">
                   <a:solidFill>
                     <a:srgbClr val="000000"/>
                   </a:solidFill>
@@ -26259,7 +26173,7 @@
           </a:ln>
           <a:extLst>
             <a:ext uri="{91240B29-F687-4f45-9708-019B960494DF}">
-              <a14:hiddenLine xmlns="" xmlns:a14="http://schemas.microsoft.com/office/drawing/2010/main" w="9525">
+              <a14:hiddenLine xmlns:a14="http://schemas.microsoft.com/office/drawing/2010/main" xmlns="" w="9525">
                 <a:solidFill>
                   <a:srgbClr val="000000"/>
                 </a:solidFill>
@@ -26319,14 +26233,14 @@
           </a:ln>
           <a:extLst>
             <a:ext uri="{909E8E84-426E-40dd-AFC4-6F175D3DCCD1}">
-              <a14:hiddenFill xmlns="" xmlns:a14="http://schemas.microsoft.com/office/drawing/2010/main">
+              <a14:hiddenFill xmlns:a14="http://schemas.microsoft.com/office/drawing/2010/main" xmlns="">
                 <a:solidFill>
                   <a:srgbClr val="FFFFFF"/>
                 </a:solidFill>
               </a14:hiddenFill>
             </a:ext>
             <a:ext uri="{91240B29-F687-4f45-9708-019B960494DF}">
-              <a14:hiddenLine xmlns="" xmlns:a14="http://schemas.microsoft.com/office/drawing/2010/main" w="9525">
+              <a14:hiddenLine xmlns:a14="http://schemas.microsoft.com/office/drawing/2010/main" xmlns="" w="9525">
                 <a:solidFill>
                   <a:srgbClr val="000000"/>
                 </a:solidFill>
@@ -26455,7 +26369,7 @@
           </a:ln>
           <a:extLst>
             <a:ext uri="{91240B29-F687-4f45-9708-019B960494DF}">
-              <a14:hiddenLine xmlns="" xmlns:a14="http://schemas.microsoft.com/office/drawing/2010/main" w="9525">
+              <a14:hiddenLine xmlns:a14="http://schemas.microsoft.com/office/drawing/2010/main" xmlns="" w="9525">
                 <a:solidFill>
                   <a:srgbClr val="000000"/>
                 </a:solidFill>
@@ -26600,7 +26514,7 @@
           </a:ln>
           <a:extLst>
             <a:ext uri="{91240B29-F687-4f45-9708-019B960494DF}">
-              <a14:hiddenLine xmlns="" xmlns:a14="http://schemas.microsoft.com/office/drawing/2010/main" w="9525">
+              <a14:hiddenLine xmlns:a14="http://schemas.microsoft.com/office/drawing/2010/main" xmlns="" w="9525">
                 <a:solidFill>
                   <a:srgbClr val="000000"/>
                 </a:solidFill>
@@ -26809,7 +26723,7 @@
           </a:ln>
           <a:extLst>
             <a:ext uri="{91240B29-F687-4f45-9708-019B960494DF}">
-              <a14:hiddenLine xmlns="" xmlns:a14="http://schemas.microsoft.com/office/drawing/2010/main" w="9525">
+              <a14:hiddenLine xmlns:a14="http://schemas.microsoft.com/office/drawing/2010/main" xmlns="" w="9525">
                 <a:solidFill>
                   <a:srgbClr val="000000"/>
                 </a:solidFill>
@@ -26869,14 +26783,14 @@
           </a:ln>
           <a:extLst>
             <a:ext uri="{909E8E84-426E-40dd-AFC4-6F175D3DCCD1}">
-              <a14:hiddenFill xmlns="" xmlns:a14="http://schemas.microsoft.com/office/drawing/2010/main">
+              <a14:hiddenFill xmlns:a14="http://schemas.microsoft.com/office/drawing/2010/main" xmlns="">
                 <a:solidFill>
                   <a:srgbClr val="FFFFFF"/>
                 </a:solidFill>
               </a14:hiddenFill>
             </a:ext>
             <a:ext uri="{91240B29-F687-4f45-9708-019B960494DF}">
-              <a14:hiddenLine xmlns="" xmlns:a14="http://schemas.microsoft.com/office/drawing/2010/main" w="9525">
+              <a14:hiddenLine xmlns:a14="http://schemas.microsoft.com/office/drawing/2010/main" xmlns="" w="9525">
                 <a:solidFill>
                   <a:srgbClr val="000000"/>
                 </a:solidFill>
@@ -27035,7 +26949,7 @@
           </a:ln>
           <a:extLst>
             <a:ext uri="{91240B29-F687-4f45-9708-019B960494DF}">
-              <a14:hiddenLine xmlns="" xmlns:a14="http://schemas.microsoft.com/office/drawing/2010/main" w="9525">
+              <a14:hiddenLine xmlns:a14="http://schemas.microsoft.com/office/drawing/2010/main" xmlns="" w="9525">
                 <a:solidFill>
                   <a:srgbClr val="000000"/>
                 </a:solidFill>
@@ -27221,7 +27135,7 @@
           </a:ln>
           <a:extLst>
             <a:ext uri="{91240B29-F687-4f45-9708-019B960494DF}">
-              <a14:hiddenLine xmlns="" xmlns:a14="http://schemas.microsoft.com/office/drawing/2010/main" w="9525">
+              <a14:hiddenLine xmlns:a14="http://schemas.microsoft.com/office/drawing/2010/main" xmlns="" w="9525">
                 <a:solidFill>
                   <a:srgbClr val="000000"/>
                 </a:solidFill>
@@ -27440,7 +27354,7 @@
           </a:ln>
           <a:extLst>
             <a:ext uri="{91240B29-F687-4f45-9708-019B960494DF}">
-              <a14:hiddenLine xmlns="" xmlns:a14="http://schemas.microsoft.com/office/drawing/2010/main" w="9525">
+              <a14:hiddenLine xmlns:a14="http://schemas.microsoft.com/office/drawing/2010/main" xmlns="" w="9525">
                 <a:solidFill>
                   <a:srgbClr val="000000"/>
                 </a:solidFill>
@@ -27649,7 +27563,7 @@
           </a:ln>
           <a:extLst>
             <a:ext uri="{91240B29-F687-4f45-9708-019B960494DF}">
-              <a14:hiddenLine xmlns="" xmlns:a14="http://schemas.microsoft.com/office/drawing/2010/main" w="9525">
+              <a14:hiddenLine xmlns:a14="http://schemas.microsoft.com/office/drawing/2010/main" xmlns="" w="9525">
                 <a:solidFill>
                   <a:srgbClr val="000000"/>
                 </a:solidFill>
@@ -28544,14 +28458,14 @@
               </a:ln>
               <a:extLst>
                 <a:ext uri="{909E8E84-426E-40dd-AFC4-6F175D3DCCD1}">
-                  <a14:hiddenFill xmlns:a14="http://schemas.microsoft.com/office/drawing/2010/main" xmlns="">
+                  <a14:hiddenFill xmlns="" xmlns:a14="http://schemas.microsoft.com/office/drawing/2010/main">
                     <a:solidFill>
                       <a:srgbClr val="FFFFFF"/>
                     </a:solidFill>
                   </a14:hiddenFill>
                 </a:ext>
                 <a:ext uri="{91240B29-F687-4f45-9708-019B960494DF}">
-                  <a14:hiddenLine xmlns:a14="http://schemas.microsoft.com/office/drawing/2010/main" xmlns="" w="9525">
+                  <a14:hiddenLine xmlns="" xmlns:a14="http://schemas.microsoft.com/office/drawing/2010/main" w="9525">
                     <a:solidFill>
                       <a:srgbClr val="000000"/>
                     </a:solidFill>
@@ -29720,14 +29634,14 @@
               </a:ln>
               <a:extLst>
                 <a:ext uri="{909E8E84-426E-40dd-AFC4-6F175D3DCCD1}">
-                  <a14:hiddenFill xmlns:a14="http://schemas.microsoft.com/office/drawing/2010/main" xmlns="">
+                  <a14:hiddenFill xmlns="" xmlns:a14="http://schemas.microsoft.com/office/drawing/2010/main">
                     <a:solidFill>
                       <a:srgbClr val="FFFFFF"/>
                     </a:solidFill>
                   </a14:hiddenFill>
                 </a:ext>
                 <a:ext uri="{91240B29-F687-4f45-9708-019B960494DF}">
-                  <a14:hiddenLine xmlns:a14="http://schemas.microsoft.com/office/drawing/2010/main" xmlns="" w="9525">
+                  <a14:hiddenLine xmlns="" xmlns:a14="http://schemas.microsoft.com/office/drawing/2010/main" w="9525">
                     <a:solidFill>
                       <a:srgbClr val="000000"/>
                     </a:solidFill>
@@ -30464,7 +30378,7 @@
           </a:ln>
           <a:extLst>
             <a:ext uri="{91240B29-F687-4f45-9708-019B960494DF}">
-              <a14:hiddenLine xmlns:a14="http://schemas.microsoft.com/office/drawing/2010/main" xmlns="" w="9525">
+              <a14:hiddenLine xmlns="" xmlns:a14="http://schemas.microsoft.com/office/drawing/2010/main" w="9525">
                 <a:solidFill>
                   <a:srgbClr val="000000"/>
                 </a:solidFill>
@@ -30863,14 +30777,14 @@
             </a:ln>
             <a:extLst>
               <a:ext uri="{909E8E84-426E-40dd-AFC4-6F175D3DCCD1}">
-                <a14:hiddenFill xmlns="" xmlns:a14="http://schemas.microsoft.com/office/drawing/2010/main">
+                <a14:hiddenFill xmlns:a14="http://schemas.microsoft.com/office/drawing/2010/main" xmlns="">
                   <a:solidFill>
                     <a:srgbClr val="FFFFFF"/>
                   </a:solidFill>
                 </a14:hiddenFill>
               </a:ext>
               <a:ext uri="{91240B29-F687-4f45-9708-019B960494DF}">
-                <a14:hiddenLine xmlns="" xmlns:a14="http://schemas.microsoft.com/office/drawing/2010/main" w="9525">
+                <a14:hiddenLine xmlns:a14="http://schemas.microsoft.com/office/drawing/2010/main" xmlns="" w="9525">
                   <a:solidFill>
                     <a:srgbClr val="000000"/>
                   </a:solidFill>
@@ -30930,14 +30844,14 @@
             </a:ln>
             <a:extLst>
               <a:ext uri="{909E8E84-426E-40dd-AFC4-6F175D3DCCD1}">
-                <a14:hiddenFill xmlns="" xmlns:a14="http://schemas.microsoft.com/office/drawing/2010/main">
+                <a14:hiddenFill xmlns:a14="http://schemas.microsoft.com/office/drawing/2010/main" xmlns="">
                   <a:solidFill>
                     <a:srgbClr val="FFFFFF"/>
                   </a:solidFill>
                 </a14:hiddenFill>
               </a:ext>
               <a:ext uri="{91240B29-F687-4f45-9708-019B960494DF}">
-                <a14:hiddenLine xmlns="" xmlns:a14="http://schemas.microsoft.com/office/drawing/2010/main" w="9525">
+                <a14:hiddenLine xmlns:a14="http://schemas.microsoft.com/office/drawing/2010/main" xmlns="" w="9525">
                   <a:solidFill>
                     <a:srgbClr val="000000"/>
                   </a:solidFill>
@@ -30997,14 +30911,14 @@
             </a:ln>
             <a:extLst>
               <a:ext uri="{909E8E84-426E-40dd-AFC4-6F175D3DCCD1}">
-                <a14:hiddenFill xmlns="" xmlns:a14="http://schemas.microsoft.com/office/drawing/2010/main">
+                <a14:hiddenFill xmlns:a14="http://schemas.microsoft.com/office/drawing/2010/main" xmlns="">
                   <a:solidFill>
                     <a:srgbClr val="FFFFFF"/>
                   </a:solidFill>
                 </a14:hiddenFill>
               </a:ext>
               <a:ext uri="{91240B29-F687-4f45-9708-019B960494DF}">
-                <a14:hiddenLine xmlns="" xmlns:a14="http://schemas.microsoft.com/office/drawing/2010/main" w="9525">
+                <a14:hiddenLine xmlns:a14="http://schemas.microsoft.com/office/drawing/2010/main" xmlns="" w="9525">
                   <a:solidFill>
                     <a:srgbClr val="000000"/>
                   </a:solidFill>
@@ -31064,14 +30978,14 @@
             </a:ln>
             <a:extLst>
               <a:ext uri="{909E8E84-426E-40dd-AFC4-6F175D3DCCD1}">
-                <a14:hiddenFill xmlns="" xmlns:a14="http://schemas.microsoft.com/office/drawing/2010/main">
+                <a14:hiddenFill xmlns:a14="http://schemas.microsoft.com/office/drawing/2010/main" xmlns="">
                   <a:solidFill>
                     <a:srgbClr val="FFFFFF"/>
                   </a:solidFill>
                 </a14:hiddenFill>
               </a:ext>
               <a:ext uri="{91240B29-F687-4f45-9708-019B960494DF}">
-                <a14:hiddenLine xmlns="" xmlns:a14="http://schemas.microsoft.com/office/drawing/2010/main" w="9525">
+                <a14:hiddenLine xmlns:a14="http://schemas.microsoft.com/office/drawing/2010/main" xmlns="" w="9525">
                   <a:solidFill>
                     <a:srgbClr val="000000"/>
                   </a:solidFill>
@@ -31152,14 +31066,14 @@
             </a:ln>
             <a:extLst>
               <a:ext uri="{909E8E84-426E-40dd-AFC4-6F175D3DCCD1}">
-                <a14:hiddenFill xmlns="" xmlns:a14="http://schemas.microsoft.com/office/drawing/2010/main">
+                <a14:hiddenFill xmlns:a14="http://schemas.microsoft.com/office/drawing/2010/main" xmlns="">
                   <a:solidFill>
                     <a:srgbClr val="FFFFFF"/>
                   </a:solidFill>
                 </a14:hiddenFill>
               </a:ext>
               <a:ext uri="{91240B29-F687-4f45-9708-019B960494DF}">
-                <a14:hiddenLine xmlns="" xmlns:a14="http://schemas.microsoft.com/office/drawing/2010/main" w="9525">
+                <a14:hiddenLine xmlns:a14="http://schemas.microsoft.com/office/drawing/2010/main" xmlns="" w="9525">
                   <a:solidFill>
                     <a:srgbClr val="000000"/>
                   </a:solidFill>
@@ -31219,14 +31133,14 @@
             </a:ln>
             <a:extLst>
               <a:ext uri="{909E8E84-426E-40dd-AFC4-6F175D3DCCD1}">
-                <a14:hiddenFill xmlns="" xmlns:a14="http://schemas.microsoft.com/office/drawing/2010/main">
+                <a14:hiddenFill xmlns:a14="http://schemas.microsoft.com/office/drawing/2010/main" xmlns="">
                   <a:solidFill>
                     <a:srgbClr val="FFFFFF"/>
                   </a:solidFill>
                 </a14:hiddenFill>
               </a:ext>
               <a:ext uri="{91240B29-F687-4f45-9708-019B960494DF}">
-                <a14:hiddenLine xmlns="" xmlns:a14="http://schemas.microsoft.com/office/drawing/2010/main" w="9525">
+                <a14:hiddenLine xmlns:a14="http://schemas.microsoft.com/office/drawing/2010/main" xmlns="" w="9525">
                   <a:solidFill>
                     <a:srgbClr val="000000"/>
                   </a:solidFill>
@@ -31286,14 +31200,14 @@
             </a:ln>
             <a:extLst>
               <a:ext uri="{909E8E84-426E-40dd-AFC4-6F175D3DCCD1}">
-                <a14:hiddenFill xmlns="" xmlns:a14="http://schemas.microsoft.com/office/drawing/2010/main">
+                <a14:hiddenFill xmlns:a14="http://schemas.microsoft.com/office/drawing/2010/main" xmlns="">
                   <a:solidFill>
                     <a:srgbClr val="FFFFFF"/>
                   </a:solidFill>
                 </a14:hiddenFill>
               </a:ext>
               <a:ext uri="{91240B29-F687-4f45-9708-019B960494DF}">
-                <a14:hiddenLine xmlns="" xmlns:a14="http://schemas.microsoft.com/office/drawing/2010/main" w="9525">
+                <a14:hiddenLine xmlns:a14="http://schemas.microsoft.com/office/drawing/2010/main" xmlns="" w="9525">
                   <a:solidFill>
                     <a:srgbClr val="000000"/>
                   </a:solidFill>
@@ -31353,14 +31267,14 @@
             </a:ln>
             <a:extLst>
               <a:ext uri="{909E8E84-426E-40dd-AFC4-6F175D3DCCD1}">
-                <a14:hiddenFill xmlns="" xmlns:a14="http://schemas.microsoft.com/office/drawing/2010/main">
+                <a14:hiddenFill xmlns:a14="http://schemas.microsoft.com/office/drawing/2010/main" xmlns="">
                   <a:solidFill>
                     <a:srgbClr val="FFFFFF"/>
                   </a:solidFill>
                 </a14:hiddenFill>
               </a:ext>
               <a:ext uri="{91240B29-F687-4f45-9708-019B960494DF}">
-                <a14:hiddenLine xmlns="" xmlns:a14="http://schemas.microsoft.com/office/drawing/2010/main" w="9525">
+                <a14:hiddenLine xmlns:a14="http://schemas.microsoft.com/office/drawing/2010/main" xmlns="" w="9525">
                   <a:solidFill>
                     <a:srgbClr val="000000"/>
                   </a:solidFill>
@@ -31756,7 +31670,7 @@
           </a:ln>
           <a:extLst>
             <a:ext uri="{91240B29-F687-4f45-9708-019B960494DF}">
-              <a14:hiddenLine xmlns="" xmlns:a14="http://schemas.microsoft.com/office/drawing/2010/main" w="9525">
+              <a14:hiddenLine xmlns:a14="http://schemas.microsoft.com/office/drawing/2010/main" xmlns="" w="9525">
                 <a:solidFill>
                   <a:srgbClr val="000000"/>
                 </a:solidFill>
@@ -31816,14 +31730,14 @@
           </a:ln>
           <a:extLst>
             <a:ext uri="{909E8E84-426E-40dd-AFC4-6F175D3DCCD1}">
-              <a14:hiddenFill xmlns="" xmlns:a14="http://schemas.microsoft.com/office/drawing/2010/main">
+              <a14:hiddenFill xmlns:a14="http://schemas.microsoft.com/office/drawing/2010/main" xmlns="">
                 <a:solidFill>
                   <a:srgbClr val="FFFFFF"/>
                 </a:solidFill>
               </a14:hiddenFill>
             </a:ext>
             <a:ext uri="{91240B29-F687-4f45-9708-019B960494DF}">
-              <a14:hiddenLine xmlns="" xmlns:a14="http://schemas.microsoft.com/office/drawing/2010/main" w="9525">
+              <a14:hiddenLine xmlns:a14="http://schemas.microsoft.com/office/drawing/2010/main" xmlns="" w="9525">
                 <a:solidFill>
                   <a:srgbClr val="000000"/>
                 </a:solidFill>
@@ -31952,7 +31866,7 @@
           </a:ln>
           <a:extLst>
             <a:ext uri="{91240B29-F687-4f45-9708-019B960494DF}">
-              <a14:hiddenLine xmlns="" xmlns:a14="http://schemas.microsoft.com/office/drawing/2010/main" w="9525">
+              <a14:hiddenLine xmlns:a14="http://schemas.microsoft.com/office/drawing/2010/main" xmlns="" w="9525">
                 <a:solidFill>
                   <a:srgbClr val="000000"/>
                 </a:solidFill>
@@ -32097,7 +32011,7 @@
           </a:ln>
           <a:extLst>
             <a:ext uri="{91240B29-F687-4f45-9708-019B960494DF}">
-              <a14:hiddenLine xmlns="" xmlns:a14="http://schemas.microsoft.com/office/drawing/2010/main" w="9525">
+              <a14:hiddenLine xmlns:a14="http://schemas.microsoft.com/office/drawing/2010/main" xmlns="" w="9525">
                 <a:solidFill>
                   <a:srgbClr val="000000"/>
                 </a:solidFill>
@@ -32306,7 +32220,7 @@
           </a:ln>
           <a:extLst>
             <a:ext uri="{91240B29-F687-4f45-9708-019B960494DF}">
-              <a14:hiddenLine xmlns="" xmlns:a14="http://schemas.microsoft.com/office/drawing/2010/main" w="9525">
+              <a14:hiddenLine xmlns:a14="http://schemas.microsoft.com/office/drawing/2010/main" xmlns="" w="9525">
                 <a:solidFill>
                   <a:srgbClr val="000000"/>
                 </a:solidFill>
@@ -32366,14 +32280,14 @@
           </a:ln>
           <a:extLst>
             <a:ext uri="{909E8E84-426E-40dd-AFC4-6F175D3DCCD1}">
-              <a14:hiddenFill xmlns="" xmlns:a14="http://schemas.microsoft.com/office/drawing/2010/main">
+              <a14:hiddenFill xmlns:a14="http://schemas.microsoft.com/office/drawing/2010/main" xmlns="">
                 <a:solidFill>
                   <a:srgbClr val="FFFFFF"/>
                 </a:solidFill>
               </a14:hiddenFill>
             </a:ext>
             <a:ext uri="{91240B29-F687-4f45-9708-019B960494DF}">
-              <a14:hiddenLine xmlns="" xmlns:a14="http://schemas.microsoft.com/office/drawing/2010/main" w="9525">
+              <a14:hiddenLine xmlns:a14="http://schemas.microsoft.com/office/drawing/2010/main" xmlns="" w="9525">
                 <a:solidFill>
                   <a:srgbClr val="000000"/>
                 </a:solidFill>
@@ -32532,7 +32446,7 @@
           </a:ln>
           <a:extLst>
             <a:ext uri="{91240B29-F687-4f45-9708-019B960494DF}">
-              <a14:hiddenLine xmlns="" xmlns:a14="http://schemas.microsoft.com/office/drawing/2010/main" w="9525">
+              <a14:hiddenLine xmlns:a14="http://schemas.microsoft.com/office/drawing/2010/main" xmlns="" w="9525">
                 <a:solidFill>
                   <a:srgbClr val="000000"/>
                 </a:solidFill>
@@ -32718,7 +32632,7 @@
           </a:ln>
           <a:extLst>
             <a:ext uri="{91240B29-F687-4f45-9708-019B960494DF}">
-              <a14:hiddenLine xmlns="" xmlns:a14="http://schemas.microsoft.com/office/drawing/2010/main" w="9525">
+              <a14:hiddenLine xmlns:a14="http://schemas.microsoft.com/office/drawing/2010/main" xmlns="" w="9525">
                 <a:solidFill>
                   <a:srgbClr val="000000"/>
                 </a:solidFill>
@@ -32937,7 +32851,7 @@
           </a:ln>
           <a:extLst>
             <a:ext uri="{91240B29-F687-4f45-9708-019B960494DF}">
-              <a14:hiddenLine xmlns="" xmlns:a14="http://schemas.microsoft.com/office/drawing/2010/main" w="9525">
+              <a14:hiddenLine xmlns:a14="http://schemas.microsoft.com/office/drawing/2010/main" xmlns="" w="9525">
                 <a:solidFill>
                   <a:srgbClr val="000000"/>
                 </a:solidFill>
@@ -33146,7 +33060,7 @@
           </a:ln>
           <a:extLst>
             <a:ext uri="{91240B29-F687-4f45-9708-019B960494DF}">
-              <a14:hiddenLine xmlns="" xmlns:a14="http://schemas.microsoft.com/office/drawing/2010/main" w="9525">
+              <a14:hiddenLine xmlns:a14="http://schemas.microsoft.com/office/drawing/2010/main" xmlns="" w="9525">
                 <a:solidFill>
                   <a:srgbClr val="000000"/>
                 </a:solidFill>
@@ -34077,14 +33991,14 @@
               </a:ln>
               <a:extLst>
                 <a:ext uri="{909E8E84-426E-40dd-AFC4-6F175D3DCCD1}">
-                  <a14:hiddenFill xmlns:a14="http://schemas.microsoft.com/office/drawing/2010/main" xmlns="">
+                  <a14:hiddenFill xmlns="" xmlns:a14="http://schemas.microsoft.com/office/drawing/2010/main">
                     <a:solidFill>
                       <a:srgbClr val="FFFFFF"/>
                     </a:solidFill>
                   </a14:hiddenFill>
                 </a:ext>
                 <a:ext uri="{91240B29-F687-4f45-9708-019B960494DF}">
-                  <a14:hiddenLine xmlns:a14="http://schemas.microsoft.com/office/drawing/2010/main" xmlns="" w="9525">
+                  <a14:hiddenLine xmlns="" xmlns:a14="http://schemas.microsoft.com/office/drawing/2010/main" w="9525">
                     <a:solidFill>
                       <a:srgbClr val="000000"/>
                     </a:solidFill>
@@ -35253,14 +35167,14 @@
               </a:ln>
               <a:extLst>
                 <a:ext uri="{909E8E84-426E-40dd-AFC4-6F175D3DCCD1}">
-                  <a14:hiddenFill xmlns:a14="http://schemas.microsoft.com/office/drawing/2010/main" xmlns="">
+                  <a14:hiddenFill xmlns="" xmlns:a14="http://schemas.microsoft.com/office/drawing/2010/main">
                     <a:solidFill>
                       <a:srgbClr val="FFFFFF"/>
                     </a:solidFill>
                   </a14:hiddenFill>
                 </a:ext>
                 <a:ext uri="{91240B29-F687-4f45-9708-019B960494DF}">
-                  <a14:hiddenLine xmlns:a14="http://schemas.microsoft.com/office/drawing/2010/main" xmlns="" w="9525">
+                  <a14:hiddenLine xmlns="" xmlns:a14="http://schemas.microsoft.com/office/drawing/2010/main" w="9525">
                     <a:solidFill>
                       <a:srgbClr val="000000"/>
                     </a:solidFill>
@@ -36017,7 +35931,7 @@
             </a:ln>
             <a:extLst>
               <a:ext uri="{91240B29-F687-4f45-9708-019B960494DF}">
-                <a14:hiddenLine xmlns:a14="http://schemas.microsoft.com/office/drawing/2010/main" xmlns="" w="9525">
+                <a14:hiddenLine xmlns="" xmlns:a14="http://schemas.microsoft.com/office/drawing/2010/main" w="9525">
                   <a:solidFill>
                     <a:srgbClr val="000000"/>
                   </a:solidFill>
@@ -36485,7 +36399,7 @@
                 </a:ln>
                 <a:extLst>
                   <a:ext uri="{91240B29-F687-4f45-9708-019B960494DF}">
-                    <a14:hiddenLine xmlns="" xmlns:a14="http://schemas.microsoft.com/office/drawing/2010/main" w="9525">
+                    <a14:hiddenLine xmlns:a14="http://schemas.microsoft.com/office/drawing/2010/main" xmlns="" w="9525">
                       <a:solidFill>
                         <a:srgbClr val="000000"/>
                       </a:solidFill>
@@ -36638,7 +36552,7 @@
                 </a:ln>
                 <a:extLst>
                   <a:ext uri="{91240B29-F687-4f45-9708-019B960494DF}">
-                    <a14:hiddenLine xmlns="" xmlns:a14="http://schemas.microsoft.com/office/drawing/2010/main" w="9525">
+                    <a14:hiddenLine xmlns:a14="http://schemas.microsoft.com/office/drawing/2010/main" xmlns="" w="9525">
                       <a:solidFill>
                         <a:srgbClr val="000000"/>
                       </a:solidFill>
@@ -36791,7 +36705,7 @@
                 </a:ln>
                 <a:extLst>
                   <a:ext uri="{91240B29-F687-4f45-9708-019B960494DF}">
-                    <a14:hiddenLine xmlns="" xmlns:a14="http://schemas.microsoft.com/office/drawing/2010/main" w="9525">
+                    <a14:hiddenLine xmlns:a14="http://schemas.microsoft.com/office/drawing/2010/main" xmlns="" w="9525">
                       <a:solidFill>
                         <a:srgbClr val="000000"/>
                       </a:solidFill>
@@ -36944,7 +36858,7 @@
                 </a:ln>
                 <a:extLst>
                   <a:ext uri="{91240B29-F687-4f45-9708-019B960494DF}">
-                    <a14:hiddenLine xmlns="" xmlns:a14="http://schemas.microsoft.com/office/drawing/2010/main" w="9525">
+                    <a14:hiddenLine xmlns:a14="http://schemas.microsoft.com/office/drawing/2010/main" xmlns="" w="9525">
                       <a:solidFill>
                         <a:srgbClr val="000000"/>
                       </a:solidFill>
@@ -37097,7 +37011,7 @@
                 </a:ln>
                 <a:extLst>
                   <a:ext uri="{91240B29-F687-4f45-9708-019B960494DF}">
-                    <a14:hiddenLine xmlns="" xmlns:a14="http://schemas.microsoft.com/office/drawing/2010/main" w="9525">
+                    <a14:hiddenLine xmlns:a14="http://schemas.microsoft.com/office/drawing/2010/main" xmlns="" w="9525">
                       <a:solidFill>
                         <a:srgbClr val="000000"/>
                       </a:solidFill>
@@ -37250,7 +37164,7 @@
                 </a:ln>
                 <a:extLst>
                   <a:ext uri="{91240B29-F687-4f45-9708-019B960494DF}">
-                    <a14:hiddenLine xmlns="" xmlns:a14="http://schemas.microsoft.com/office/drawing/2010/main" w="9525">
+                    <a14:hiddenLine xmlns:a14="http://schemas.microsoft.com/office/drawing/2010/main" xmlns="" w="9525">
                       <a:solidFill>
                         <a:srgbClr val="000000"/>
                       </a:solidFill>
@@ -37403,7 +37317,7 @@
                 </a:ln>
                 <a:extLst>
                   <a:ext uri="{91240B29-F687-4f45-9708-019B960494DF}">
-                    <a14:hiddenLine xmlns="" xmlns:a14="http://schemas.microsoft.com/office/drawing/2010/main" w="9525">
+                    <a14:hiddenLine xmlns:a14="http://schemas.microsoft.com/office/drawing/2010/main" xmlns="" w="9525">
                       <a:solidFill>
                         <a:srgbClr val="000000"/>
                       </a:solidFill>
@@ -37556,7 +37470,7 @@
                 </a:ln>
                 <a:extLst>
                   <a:ext uri="{91240B29-F687-4f45-9708-019B960494DF}">
-                    <a14:hiddenLine xmlns="" xmlns:a14="http://schemas.microsoft.com/office/drawing/2010/main" w="9525">
+                    <a14:hiddenLine xmlns:a14="http://schemas.microsoft.com/office/drawing/2010/main" xmlns="" w="9525">
                       <a:solidFill>
                         <a:srgbClr val="000000"/>
                       </a:solidFill>
@@ -37709,7 +37623,7 @@
                 </a:ln>
                 <a:extLst>
                   <a:ext uri="{91240B29-F687-4f45-9708-019B960494DF}">
-                    <a14:hiddenLine xmlns="" xmlns:a14="http://schemas.microsoft.com/office/drawing/2010/main" w="9525">
+                    <a14:hiddenLine xmlns:a14="http://schemas.microsoft.com/office/drawing/2010/main" xmlns="" w="9525">
                       <a:solidFill>
                         <a:srgbClr val="000000"/>
                       </a:solidFill>
@@ -37862,7 +37776,7 @@
                 </a:ln>
                 <a:extLst>
                   <a:ext uri="{91240B29-F687-4f45-9708-019B960494DF}">
-                    <a14:hiddenLine xmlns="" xmlns:a14="http://schemas.microsoft.com/office/drawing/2010/main" w="9525">
+                    <a14:hiddenLine xmlns:a14="http://schemas.microsoft.com/office/drawing/2010/main" xmlns="" w="9525">
                       <a:solidFill>
                         <a:srgbClr val="000000"/>
                       </a:solidFill>
@@ -38015,7 +37929,7 @@
                 </a:ln>
                 <a:extLst>
                   <a:ext uri="{91240B29-F687-4f45-9708-019B960494DF}">
-                    <a14:hiddenLine xmlns="" xmlns:a14="http://schemas.microsoft.com/office/drawing/2010/main" w="9525">
+                    <a14:hiddenLine xmlns:a14="http://schemas.microsoft.com/office/drawing/2010/main" xmlns="" w="9525">
                       <a:solidFill>
                         <a:srgbClr val="000000"/>
                       </a:solidFill>
@@ -38168,7 +38082,7 @@
                 </a:ln>
                 <a:extLst>
                   <a:ext uri="{91240B29-F687-4f45-9708-019B960494DF}">
-                    <a14:hiddenLine xmlns="" xmlns:a14="http://schemas.microsoft.com/office/drawing/2010/main" w="9525">
+                    <a14:hiddenLine xmlns:a14="http://schemas.microsoft.com/office/drawing/2010/main" xmlns="" w="9525">
                       <a:solidFill>
                         <a:srgbClr val="000000"/>
                       </a:solidFill>
@@ -38492,7 +38406,7 @@
           </a:ln>
           <a:extLst>
             <a:ext uri="{91240B29-F687-4f45-9708-019B960494DF}">
-              <a14:hiddenLine xmlns:a14="http://schemas.microsoft.com/office/drawing/2010/main" xmlns="" w="9525">
+              <a14:hiddenLine xmlns="" xmlns:a14="http://schemas.microsoft.com/office/drawing/2010/main" w="9525">
                 <a:solidFill>
                   <a:srgbClr val="000000"/>
                 </a:solidFill>
@@ -38874,7 +38788,7 @@
           </a:ln>
           <a:extLst>
             <a:ext uri="{91240B29-F687-4f45-9708-019B960494DF}">
-              <a14:hiddenLine xmlns:a14="http://schemas.microsoft.com/office/drawing/2010/main" xmlns="" w="9525">
+              <a14:hiddenLine xmlns="" xmlns:a14="http://schemas.microsoft.com/office/drawing/2010/main" w="9525">
                 <a:solidFill>
                   <a:srgbClr val="000000"/>
                 </a:solidFill>
@@ -39156,7 +39070,7 @@
           </a:ln>
           <a:extLst>
             <a:ext uri="{91240B29-F687-4f45-9708-019B960494DF}">
-              <a14:hiddenLine xmlns:a14="http://schemas.microsoft.com/office/drawing/2010/main" xmlns="" w="9525">
+              <a14:hiddenLine xmlns="" xmlns:a14="http://schemas.microsoft.com/office/drawing/2010/main" w="9525">
                 <a:solidFill>
                   <a:srgbClr val="000000"/>
                 </a:solidFill>
@@ -41092,14 +41006,14 @@
             </a:ln>
             <a:extLst>
               <a:ext uri="{909E8E84-426E-40dd-AFC4-6F175D3DCCD1}">
-                <a14:hiddenFill xmlns="" xmlns:a14="http://schemas.microsoft.com/office/drawing/2010/main">
+                <a14:hiddenFill xmlns:a14="http://schemas.microsoft.com/office/drawing/2010/main" xmlns="">
                   <a:solidFill>
                     <a:srgbClr val="FFFFFF"/>
                   </a:solidFill>
                 </a14:hiddenFill>
               </a:ext>
               <a:ext uri="{91240B29-F687-4f45-9708-019B960494DF}">
-                <a14:hiddenLine xmlns="" xmlns:a14="http://schemas.microsoft.com/office/drawing/2010/main" w="9525">
+                <a14:hiddenLine xmlns:a14="http://schemas.microsoft.com/office/drawing/2010/main" xmlns="" w="9525">
                   <a:solidFill>
                     <a:srgbClr val="000000"/>
                   </a:solidFill>
@@ -41255,7 +41169,7 @@
             </a:ln>
             <a:extLst>
               <a:ext uri="{91240B29-F687-4f45-9708-019B960494DF}">
-                <a14:hiddenLine xmlns="" xmlns:a14="http://schemas.microsoft.com/office/drawing/2010/main" w="9525">
+                <a14:hiddenLine xmlns:a14="http://schemas.microsoft.com/office/drawing/2010/main" xmlns="" w="9525">
                   <a:solidFill>
                     <a:srgbClr val="000000"/>
                   </a:solidFill>
@@ -41335,14 +41249,14 @@
             </a:ln>
             <a:extLst>
               <a:ext uri="{909E8E84-426E-40dd-AFC4-6F175D3DCCD1}">
-                <a14:hiddenFill xmlns:a14="http://schemas.microsoft.com/office/drawing/2010/main" xmlns="">
+                <a14:hiddenFill xmlns="" xmlns:a14="http://schemas.microsoft.com/office/drawing/2010/main">
                   <a:solidFill>
                     <a:srgbClr val="FFFFFF"/>
                   </a:solidFill>
                 </a14:hiddenFill>
               </a:ext>
               <a:ext uri="{91240B29-F687-4f45-9708-019B960494DF}">
-                <a14:hiddenLine xmlns:a14="http://schemas.microsoft.com/office/drawing/2010/main" xmlns="" w="9525">
+                <a14:hiddenLine xmlns="" xmlns:a14="http://schemas.microsoft.com/office/drawing/2010/main" w="9525">
                   <a:solidFill>
                     <a:srgbClr val="000000"/>
                   </a:solidFill>
@@ -41501,7 +41415,7 @@
             </a:ln>
             <a:extLst>
               <a:ext uri="{91240B29-F687-4f45-9708-019B960494DF}">
-                <a14:hiddenLine xmlns:a14="http://schemas.microsoft.com/office/drawing/2010/main" xmlns="" w="9525">
+                <a14:hiddenLine xmlns="" xmlns:a14="http://schemas.microsoft.com/office/drawing/2010/main" w="9525">
                   <a:solidFill>
                     <a:srgbClr val="000000"/>
                   </a:solidFill>
@@ -41687,7 +41601,7 @@
             </a:ln>
             <a:extLst>
               <a:ext uri="{91240B29-F687-4f45-9708-019B960494DF}">
-                <a14:hiddenLine xmlns:a14="http://schemas.microsoft.com/office/drawing/2010/main" xmlns="" w="9525">
+                <a14:hiddenLine xmlns="" xmlns:a14="http://schemas.microsoft.com/office/drawing/2010/main" w="9525">
                   <a:solidFill>
                     <a:srgbClr val="000000"/>
                   </a:solidFill>
@@ -41906,7 +41820,7 @@
             </a:ln>
             <a:extLst>
               <a:ext uri="{91240B29-F687-4f45-9708-019B960494DF}">
-                <a14:hiddenLine xmlns:a14="http://schemas.microsoft.com/office/drawing/2010/main" xmlns="" w="9525">
+                <a14:hiddenLine xmlns="" xmlns:a14="http://schemas.microsoft.com/office/drawing/2010/main" w="9525">
                   <a:solidFill>
                     <a:srgbClr val="000000"/>
                   </a:solidFill>
@@ -42115,7 +42029,7 @@
             </a:ln>
             <a:extLst>
               <a:ext uri="{91240B29-F687-4f45-9708-019B960494DF}">
-                <a14:hiddenLine xmlns:a14="http://schemas.microsoft.com/office/drawing/2010/main" xmlns="" w="9525">
+                <a14:hiddenLine xmlns="" xmlns:a14="http://schemas.microsoft.com/office/drawing/2010/main" w="9525">
                   <a:solidFill>
                     <a:srgbClr val="000000"/>
                   </a:solidFill>
@@ -42196,14 +42110,14 @@
             </a:ln>
             <a:extLst>
               <a:ext uri="{909E8E84-426E-40dd-AFC4-6F175D3DCCD1}">
-                <a14:hiddenFill xmlns="" xmlns:a14="http://schemas.microsoft.com/office/drawing/2010/main">
+                <a14:hiddenFill xmlns:a14="http://schemas.microsoft.com/office/drawing/2010/main" xmlns="">
                   <a:solidFill>
                     <a:srgbClr val="FFFFFF"/>
                   </a:solidFill>
                 </a14:hiddenFill>
               </a:ext>
               <a:ext uri="{91240B29-F687-4f45-9708-019B960494DF}">
-                <a14:hiddenLine xmlns="" xmlns:a14="http://schemas.microsoft.com/office/drawing/2010/main" w="9525">
+                <a14:hiddenLine xmlns:a14="http://schemas.microsoft.com/office/drawing/2010/main" xmlns="" w="9525">
                   <a:solidFill>
                     <a:srgbClr val="000000"/>
                   </a:solidFill>
@@ -42359,7 +42273,7 @@
             </a:ln>
             <a:extLst>
               <a:ext uri="{91240B29-F687-4f45-9708-019B960494DF}">
-                <a14:hiddenLine xmlns="" xmlns:a14="http://schemas.microsoft.com/office/drawing/2010/main" w="9525">
+                <a14:hiddenLine xmlns:a14="http://schemas.microsoft.com/office/drawing/2010/main" xmlns="" w="9525">
                   <a:solidFill>
                     <a:srgbClr val="000000"/>
                   </a:solidFill>
@@ -42514,14 +42428,14 @@
             </a:ln>
             <a:extLst>
               <a:ext uri="{909E8E84-426E-40dd-AFC4-6F175D3DCCD1}">
-                <a14:hiddenFill xmlns:a14="http://schemas.microsoft.com/office/drawing/2010/main" xmlns="">
+                <a14:hiddenFill xmlns="" xmlns:a14="http://schemas.microsoft.com/office/drawing/2010/main">
                   <a:solidFill>
                     <a:srgbClr val="FFFFFF"/>
                   </a:solidFill>
                 </a14:hiddenFill>
               </a:ext>
               <a:ext uri="{91240B29-F687-4f45-9708-019B960494DF}">
-                <a14:hiddenLine xmlns:a14="http://schemas.microsoft.com/office/drawing/2010/main" xmlns="" w="9525">
+                <a14:hiddenLine xmlns="" xmlns:a14="http://schemas.microsoft.com/office/drawing/2010/main" w="9525">
                   <a:solidFill>
                     <a:srgbClr val="000000"/>
                   </a:solidFill>
@@ -42680,7 +42594,7 @@
             </a:ln>
             <a:extLst>
               <a:ext uri="{91240B29-F687-4f45-9708-019B960494DF}">
-                <a14:hiddenLine xmlns:a14="http://schemas.microsoft.com/office/drawing/2010/main" xmlns="" w="9525">
+                <a14:hiddenLine xmlns="" xmlns:a14="http://schemas.microsoft.com/office/drawing/2010/main" w="9525">
                   <a:solidFill>
                     <a:srgbClr val="000000"/>
                   </a:solidFill>
@@ -42866,7 +42780,7 @@
             </a:ln>
             <a:extLst>
               <a:ext uri="{91240B29-F687-4f45-9708-019B960494DF}">
-                <a14:hiddenLine xmlns:a14="http://schemas.microsoft.com/office/drawing/2010/main" xmlns="" w="9525">
+                <a14:hiddenLine xmlns="" xmlns:a14="http://schemas.microsoft.com/office/drawing/2010/main" w="9525">
                   <a:solidFill>
                     <a:srgbClr val="000000"/>
                   </a:solidFill>
@@ -43072,7 +42986,7 @@
             </a:ln>
             <a:extLst>
               <a:ext uri="{91240B29-F687-4f45-9708-019B960494DF}">
-                <a14:hiddenLine xmlns:a14="http://schemas.microsoft.com/office/drawing/2010/main" xmlns="" w="9525">
+                <a14:hiddenLine xmlns="" xmlns:a14="http://schemas.microsoft.com/office/drawing/2010/main" w="9525">
                   <a:solidFill>
                     <a:srgbClr val="000000"/>
                   </a:solidFill>
@@ -43281,7 +43195,7 @@
             </a:ln>
             <a:extLst>
               <a:ext uri="{91240B29-F687-4f45-9708-019B960494DF}">
-                <a14:hiddenLine xmlns:a14="http://schemas.microsoft.com/office/drawing/2010/main" xmlns="" w="9525">
+                <a14:hiddenLine xmlns="" xmlns:a14="http://schemas.microsoft.com/office/drawing/2010/main" w="9525">
                   <a:solidFill>
                     <a:srgbClr val="000000"/>
                   </a:solidFill>
@@ -43461,7 +43375,7 @@
             </a:ln>
             <a:extLst>
               <a:ext uri="{91240B29-F687-4f45-9708-019B960494DF}">
-                <a14:hiddenLine xmlns:a14="http://schemas.microsoft.com/office/drawing/2010/main" xmlns="" w="9525">
+                <a14:hiddenLine xmlns="" xmlns:a14="http://schemas.microsoft.com/office/drawing/2010/main" w="9525">
                   <a:solidFill>
                     <a:srgbClr val="000000"/>
                   </a:solidFill>
@@ -43521,14 +43435,14 @@
             </a:ln>
             <a:extLst>
               <a:ext uri="{909E8E84-426E-40dd-AFC4-6F175D3DCCD1}">
-                <a14:hiddenFill xmlns:a14="http://schemas.microsoft.com/office/drawing/2010/main" xmlns="">
+                <a14:hiddenFill xmlns="" xmlns:a14="http://schemas.microsoft.com/office/drawing/2010/main">
                   <a:solidFill>
                     <a:srgbClr val="FFFFFF"/>
                   </a:solidFill>
                 </a14:hiddenFill>
               </a:ext>
               <a:ext uri="{91240B29-F687-4f45-9708-019B960494DF}">
-                <a14:hiddenLine xmlns:a14="http://schemas.microsoft.com/office/drawing/2010/main" xmlns="" w="9525">
+                <a14:hiddenLine xmlns="" xmlns:a14="http://schemas.microsoft.com/office/drawing/2010/main" w="9525">
                   <a:solidFill>
                     <a:srgbClr val="000000"/>
                   </a:solidFill>
@@ -43657,7 +43571,7 @@
             </a:ln>
             <a:extLst>
               <a:ext uri="{91240B29-F687-4f45-9708-019B960494DF}">
-                <a14:hiddenLine xmlns:a14="http://schemas.microsoft.com/office/drawing/2010/main" xmlns="" w="9525">
+                <a14:hiddenLine xmlns="" xmlns:a14="http://schemas.microsoft.com/office/drawing/2010/main" w="9525">
                   <a:solidFill>
                     <a:srgbClr val="000000"/>
                   </a:solidFill>
@@ -43802,7 +43716,7 @@
             </a:ln>
             <a:extLst>
               <a:ext uri="{91240B29-F687-4f45-9708-019B960494DF}">
-                <a14:hiddenLine xmlns:a14="http://schemas.microsoft.com/office/drawing/2010/main" xmlns="" w="9525">
+                <a14:hiddenLine xmlns="" xmlns:a14="http://schemas.microsoft.com/office/drawing/2010/main" w="9525">
                   <a:solidFill>
                     <a:srgbClr val="000000"/>
                   </a:solidFill>
@@ -44011,7 +43925,7 @@
             </a:ln>
             <a:extLst>
               <a:ext uri="{91240B29-F687-4f45-9708-019B960494DF}">
-                <a14:hiddenLine xmlns:a14="http://schemas.microsoft.com/office/drawing/2010/main" xmlns="" w="9525">
+                <a14:hiddenLine xmlns="" xmlns:a14="http://schemas.microsoft.com/office/drawing/2010/main" w="9525">
                   <a:solidFill>
                     <a:srgbClr val="000000"/>
                   </a:solidFill>
@@ -44092,14 +44006,14 @@
             </a:ln>
             <a:extLst>
               <a:ext uri="{909E8E84-426E-40dd-AFC4-6F175D3DCCD1}">
-                <a14:hiddenFill xmlns:a14="http://schemas.microsoft.com/office/drawing/2010/main" xmlns="">
+                <a14:hiddenFill xmlns="" xmlns:a14="http://schemas.microsoft.com/office/drawing/2010/main">
                   <a:solidFill>
                     <a:srgbClr val="FFFFFF"/>
                   </a:solidFill>
                 </a14:hiddenFill>
               </a:ext>
               <a:ext uri="{91240B29-F687-4f45-9708-019B960494DF}">
-                <a14:hiddenLine xmlns:a14="http://schemas.microsoft.com/office/drawing/2010/main" xmlns="" w="9525">
+                <a14:hiddenLine xmlns="" xmlns:a14="http://schemas.microsoft.com/office/drawing/2010/main" w="9525">
                   <a:solidFill>
                     <a:srgbClr val="000000"/>
                   </a:solidFill>
@@ -44258,7 +44172,7 @@
             </a:ln>
             <a:extLst>
               <a:ext uri="{91240B29-F687-4f45-9708-019B960494DF}">
-                <a14:hiddenLine xmlns:a14="http://schemas.microsoft.com/office/drawing/2010/main" xmlns="" w="9525">
+                <a14:hiddenLine xmlns="" xmlns:a14="http://schemas.microsoft.com/office/drawing/2010/main" w="9525">
                   <a:solidFill>
                     <a:srgbClr val="000000"/>
                   </a:solidFill>
@@ -46347,6 +46261,92 @@
           <a:xfrm>
             <a:off x="6477851" y="8302707"/>
             <a:ext cx="1371191" cy="3193371"/>
+          </a:xfrm>
+          <a:prstGeom prst="line">
+            <a:avLst/>
+          </a:prstGeom>
+          <a:ln w="19050">
+            <a:solidFill>
+              <a:schemeClr val="accent1"/>
+            </a:solidFill>
+          </a:ln>
+        </p:spPr>
+        <p:style>
+          <a:lnRef idx="1">
+            <a:schemeClr val="accent1"/>
+          </a:lnRef>
+          <a:fillRef idx="0">
+            <a:schemeClr val="accent1"/>
+          </a:fillRef>
+          <a:effectRef idx="0">
+            <a:schemeClr val="accent1"/>
+          </a:effectRef>
+          <a:fontRef idx="minor">
+            <a:schemeClr val="tx1"/>
+          </a:fontRef>
+        </p:style>
+      </p:cxnSp>
+      <p:cxnSp>
+        <p:nvCxnSpPr>
+          <p:cNvPr id="603" name="Straight Connector 602">
+            <a:extLst>
+              <a:ext uri="{FF2B5EF4-FFF2-40B4-BE49-F238E27FC236}">
+                <a16:creationId xmlns:a16="http://schemas.microsoft.com/office/drawing/2014/main" id="{F6391EC9-F35E-403A-A213-C1226F1791DE}"/>
+              </a:ext>
+            </a:extLst>
+          </p:cNvPr>
+          <p:cNvCxnSpPr>
+            <a:cxnSpLocks/>
+          </p:cNvCxnSpPr>
+          <p:nvPr/>
+        </p:nvCxnSpPr>
+        <p:spPr>
+          <a:xfrm flipH="1" flipV="1">
+            <a:off x="6394083" y="9574403"/>
+            <a:ext cx="1355742" cy="1979938"/>
+          </a:xfrm>
+          <a:prstGeom prst="line">
+            <a:avLst/>
+          </a:prstGeom>
+          <a:ln w="19050">
+            <a:solidFill>
+              <a:schemeClr val="accent1"/>
+            </a:solidFill>
+          </a:ln>
+        </p:spPr>
+        <p:style>
+          <a:lnRef idx="1">
+            <a:schemeClr val="accent1"/>
+          </a:lnRef>
+          <a:fillRef idx="0">
+            <a:schemeClr val="accent1"/>
+          </a:fillRef>
+          <a:effectRef idx="0">
+            <a:schemeClr val="accent1"/>
+          </a:effectRef>
+          <a:fontRef idx="minor">
+            <a:schemeClr val="tx1"/>
+          </a:fontRef>
+        </p:style>
+      </p:cxnSp>
+      <p:cxnSp>
+        <p:nvCxnSpPr>
+          <p:cNvPr id="477" name="Straight Connector 476">
+            <a:extLst>
+              <a:ext uri="{FF2B5EF4-FFF2-40B4-BE49-F238E27FC236}">
+                <a16:creationId xmlns:a16="http://schemas.microsoft.com/office/drawing/2014/main" id="{7E8934AB-8B21-4118-9662-A0A96764EC83}"/>
+              </a:ext>
+            </a:extLst>
+          </p:cNvPr>
+          <p:cNvCxnSpPr>
+            <a:cxnSpLocks/>
+          </p:cNvCxnSpPr>
+          <p:nvPr/>
+        </p:nvCxnSpPr>
+        <p:spPr>
+          <a:xfrm flipH="1" flipV="1">
+            <a:off x="4850545" y="11314203"/>
+            <a:ext cx="2850656" cy="653584"/>
           </a:xfrm>
           <a:prstGeom prst="line">
             <a:avLst/>

</xml_diff>